<commit_message>
one slide added as per team suggestion
</commit_message>
<xml_diff>
--- a/Project_Presentation_Employee_Attrition_Prediction.pptx
+++ b/Project_Presentation_Employee_Attrition_Prediction.pptx
@@ -5,17 +5,18 @@
     <p:sldMasterId id="2147483648" r:id="rId1"/>
   </p:sldMasterIdLst>
   <p:notesMasterIdLst>
-    <p:notesMasterId r:id="rId10"/>
+    <p:notesMasterId r:id="rId11"/>
   </p:notesMasterIdLst>
   <p:sldIdLst>
     <p:sldId id="259" r:id="rId2"/>
     <p:sldId id="263" r:id="rId3"/>
     <p:sldId id="257" r:id="rId4"/>
-    <p:sldId id="258" r:id="rId5"/>
-    <p:sldId id="261" r:id="rId6"/>
-    <p:sldId id="1603" r:id="rId7"/>
-    <p:sldId id="262" r:id="rId8"/>
-    <p:sldId id="265" r:id="rId9"/>
+    <p:sldId id="1605" r:id="rId5"/>
+    <p:sldId id="258" r:id="rId6"/>
+    <p:sldId id="261" r:id="rId7"/>
+    <p:sldId id="1603" r:id="rId8"/>
+    <p:sldId id="262" r:id="rId9"/>
+    <p:sldId id="265" r:id="rId10"/>
   </p:sldIdLst>
   <p:sldSz cx="12192000" cy="6858000"/>
   <p:notesSz cx="6858000" cy="9144000"/>
@@ -11726,7 +11727,7 @@
           <a:p>
             <a:fld id="{D9DC0902-B928-4F0F-BBCD-04DEB66ED9A2}" type="slidenum">
               <a:rPr lang="en-US" smtClean="0"/>
-              <a:t>4</a:t>
+              <a:t>5</a:t>
             </a:fld>
             <a:endParaRPr lang="en-US"/>
           </a:p>
@@ -11810,7 +11811,7 @@
           <a:p>
             <a:fld id="{D9DC0902-B928-4F0F-BBCD-04DEB66ED9A2}" type="slidenum">
               <a:rPr lang="en-US" smtClean="0"/>
-              <a:t>8</a:t>
+              <a:t>9</a:t>
             </a:fld>
             <a:endParaRPr lang="en-US"/>
           </a:p>
@@ -16984,6 +16985,410 @@
           <a:chExt cx="0" cy="0"/>
         </a:xfrm>
       </p:grpSpPr>
+      <p:pic>
+        <p:nvPicPr>
+          <p:cNvPr id="4" name="Picture 3" descr="A blue squares with white text&#10;&#10;Description automatically generated">
+            <a:extLst>
+              <a:ext uri="{FF2B5EF4-FFF2-40B4-BE49-F238E27FC236}">
+                <a16:creationId xmlns:a16="http://schemas.microsoft.com/office/drawing/2014/main" id="{E8CCB4C3-A1E3-C498-4505-DC6818B92938}"/>
+              </a:ext>
+            </a:extLst>
+          </p:cNvPr>
+          <p:cNvPicPr>
+            <a:picLocks noChangeAspect="1"/>
+          </p:cNvPicPr>
+          <p:nvPr/>
+        </p:nvPicPr>
+        <p:blipFill>
+          <a:blip r:embed="rId2"/>
+          <a:stretch>
+            <a:fillRect/>
+          </a:stretch>
+        </p:blipFill>
+        <p:spPr>
+          <a:xfrm>
+            <a:off x="4322200" y="1773903"/>
+            <a:ext cx="3517119" cy="3270920"/>
+          </a:xfrm>
+          <a:prstGeom prst="rect">
+            <a:avLst/>
+          </a:prstGeom>
+        </p:spPr>
+      </p:pic>
+      <p:cxnSp>
+        <p:nvCxnSpPr>
+          <p:cNvPr id="11" name="Straight Connector 10">
+            <a:extLst>
+              <a:ext uri="{FF2B5EF4-FFF2-40B4-BE49-F238E27FC236}">
+                <a16:creationId xmlns:a16="http://schemas.microsoft.com/office/drawing/2014/main" id="{DCD67800-37AC-4E14-89B0-F79DCB3FB86D}"/>
+              </a:ext>
+              <a:ext uri="{C183D7F6-B498-43B3-948B-1728B52AA6E4}">
+                <adec:decorative xmlns:adec="http://schemas.microsoft.com/office/drawing/2017/decorative" val="1"/>
+              </a:ext>
+            </a:extLst>
+          </p:cNvPr>
+          <p:cNvCxnSpPr>
+            <a:cxnSpLocks noGrp="1" noRot="1" noChangeAspect="1" noMove="1" noResize="1" noEditPoints="1" noAdjustHandles="1" noChangeArrowheads="1" noChangeShapeType="1"/>
+          </p:cNvCxnSpPr>
+          <p:nvPr>
+            <p:extLst>
+              <p:ext uri="{386F3935-93C4-4BCD-93E2-E3B085C9AB24}">
+                <p16:designElem xmlns:p16="http://schemas.microsoft.com/office/powerpoint/2015/main" val="1"/>
+              </p:ext>
+            </p:extLst>
+          </p:nvPr>
+        </p:nvCxnSpPr>
+        <p:spPr>
+          <a:xfrm>
+            <a:off x="4165600" y="1573887"/>
+            <a:ext cx="0" cy="3710227"/>
+          </a:xfrm>
+          <a:prstGeom prst="line">
+            <a:avLst/>
+          </a:prstGeom>
+          <a:ln w="19050">
+            <a:solidFill>
+              <a:srgbClr val="7F7F7F"/>
+            </a:solidFill>
+          </a:ln>
+        </p:spPr>
+        <p:style>
+          <a:lnRef idx="1">
+            <a:schemeClr val="accent1"/>
+          </a:lnRef>
+          <a:fillRef idx="0">
+            <a:schemeClr val="accent1"/>
+          </a:fillRef>
+          <a:effectRef idx="0">
+            <a:schemeClr val="accent1"/>
+          </a:effectRef>
+          <a:fontRef idx="minor">
+            <a:schemeClr val="tx1"/>
+          </a:fontRef>
+        </p:style>
+      </p:cxnSp>
+      <p:pic>
+        <p:nvPicPr>
+          <p:cNvPr id="5" name="Content Placeholder 9" descr="A blue squares with white text&#10;&#10;Description automatically generated">
+            <a:extLst>
+              <a:ext uri="{FF2B5EF4-FFF2-40B4-BE49-F238E27FC236}">
+                <a16:creationId xmlns:a16="http://schemas.microsoft.com/office/drawing/2014/main" id="{51257B1A-7131-4C21-57DB-A94CCD2D56AC}"/>
+              </a:ext>
+            </a:extLst>
+          </p:cNvPr>
+          <p:cNvPicPr>
+            <a:picLocks noChangeAspect="1"/>
+          </p:cNvPicPr>
+          <p:nvPr/>
+        </p:nvPicPr>
+        <p:blipFill>
+          <a:blip r:embed="rId3"/>
+          <a:stretch>
+            <a:fillRect/>
+          </a:stretch>
+        </p:blipFill>
+        <p:spPr>
+          <a:xfrm>
+            <a:off x="7869801" y="1790467"/>
+            <a:ext cx="3537345" cy="3254356"/>
+          </a:xfrm>
+          <a:prstGeom prst="rect">
+            <a:avLst/>
+          </a:prstGeom>
+        </p:spPr>
+      </p:pic>
+      <p:cxnSp>
+        <p:nvCxnSpPr>
+          <p:cNvPr id="13" name="Straight Connector 12">
+            <a:extLst>
+              <a:ext uri="{FF2B5EF4-FFF2-40B4-BE49-F238E27FC236}">
+                <a16:creationId xmlns:a16="http://schemas.microsoft.com/office/drawing/2014/main" id="{20F1788F-A5AE-4188-8274-F7F2E3833ECD}"/>
+              </a:ext>
+              <a:ext uri="{C183D7F6-B498-43B3-948B-1728B52AA6E4}">
+                <adec:decorative xmlns:adec="http://schemas.microsoft.com/office/drawing/2017/decorative" val="1"/>
+              </a:ext>
+            </a:extLst>
+          </p:cNvPr>
+          <p:cNvCxnSpPr>
+            <a:cxnSpLocks noGrp="1" noRot="1" noChangeAspect="1" noMove="1" noResize="1" noEditPoints="1" noAdjustHandles="1" noChangeArrowheads="1" noChangeShapeType="1"/>
+          </p:cNvCxnSpPr>
+          <p:nvPr>
+            <p:extLst>
+              <p:ext uri="{386F3935-93C4-4BCD-93E2-E3B085C9AB24}">
+                <p16:designElem xmlns:p16="http://schemas.microsoft.com/office/powerpoint/2015/main" val="1"/>
+              </p:ext>
+            </p:extLst>
+          </p:nvPr>
+        </p:nvCxnSpPr>
+        <p:spPr>
+          <a:xfrm>
+            <a:off x="7995920" y="1573887"/>
+            <a:ext cx="0" cy="3710227"/>
+          </a:xfrm>
+          <a:prstGeom prst="line">
+            <a:avLst/>
+          </a:prstGeom>
+          <a:ln w="19050">
+            <a:solidFill>
+              <a:srgbClr val="7F7F7F"/>
+            </a:solidFill>
+          </a:ln>
+        </p:spPr>
+        <p:style>
+          <a:lnRef idx="1">
+            <a:schemeClr val="accent1"/>
+          </a:lnRef>
+          <a:fillRef idx="0">
+            <a:schemeClr val="accent1"/>
+          </a:fillRef>
+          <a:effectRef idx="0">
+            <a:schemeClr val="accent1"/>
+          </a:effectRef>
+          <a:fontRef idx="minor">
+            <a:schemeClr val="tx1"/>
+          </a:fontRef>
+        </p:style>
+      </p:cxnSp>
+      <p:pic>
+        <p:nvPicPr>
+          <p:cNvPr id="6" name="Content Placeholder 15" descr="A blue and white graph&#10;&#10;Description automatically generated">
+            <a:extLst>
+              <a:ext uri="{FF2B5EF4-FFF2-40B4-BE49-F238E27FC236}">
+                <a16:creationId xmlns:a16="http://schemas.microsoft.com/office/drawing/2014/main" id="{7A9D9373-1E99-1F6B-1EE4-10E10364F865}"/>
+              </a:ext>
+            </a:extLst>
+          </p:cNvPr>
+          <p:cNvPicPr>
+            <a:picLocks noChangeAspect="1"/>
+          </p:cNvPicPr>
+          <p:nvPr/>
+        </p:nvPicPr>
+        <p:blipFill>
+          <a:blip r:embed="rId4"/>
+          <a:stretch>
+            <a:fillRect/>
+          </a:stretch>
+        </p:blipFill>
+        <p:spPr>
+          <a:xfrm>
+            <a:off x="461400" y="1773903"/>
+            <a:ext cx="3517120" cy="3244543"/>
+          </a:xfrm>
+          <a:prstGeom prst="rect">
+            <a:avLst/>
+          </a:prstGeom>
+          <a:solidFill>
+            <a:srgbClr val="FFFFFF">
+              <a:shade val="85000"/>
+            </a:srgbClr>
+          </a:solidFill>
+          <a:scene3d>
+            <a:camera prst="orthographicFront"/>
+            <a:lightRig rig="twoPt" dir="t">
+              <a:rot lat="0" lon="0" rev="7200000"/>
+            </a:lightRig>
+          </a:scene3d>
+          <a:sp3d>
+            <a:bevelT w="25400" h="19050"/>
+            <a:contourClr>
+              <a:srgbClr val="FFFFFF"/>
+            </a:contourClr>
+          </a:sp3d>
+        </p:spPr>
+      </p:pic>
+      <p:sp>
+        <p:nvSpPr>
+          <p:cNvPr id="7" name="&quot;Not Allowed&quot; Symbol 6">
+            <a:extLst>
+              <a:ext uri="{FF2B5EF4-FFF2-40B4-BE49-F238E27FC236}">
+                <a16:creationId xmlns:a16="http://schemas.microsoft.com/office/drawing/2014/main" id="{E1D54D72-ED59-C6A9-1DB3-EE69161881A4}"/>
+              </a:ext>
+            </a:extLst>
+          </p:cNvPr>
+          <p:cNvSpPr/>
+          <p:nvPr/>
+        </p:nvSpPr>
+        <p:spPr>
+          <a:xfrm>
+            <a:off x="1371600" y="4280170"/>
+            <a:ext cx="214009" cy="204281"/>
+          </a:xfrm>
+          <a:prstGeom prst="noSmoking">
+            <a:avLst/>
+          </a:prstGeom>
+          <a:solidFill>
+            <a:schemeClr val="accent2"/>
+          </a:solidFill>
+        </p:spPr>
+        <p:style>
+          <a:lnRef idx="2">
+            <a:schemeClr val="accent1">
+              <a:shade val="15000"/>
+            </a:schemeClr>
+          </a:lnRef>
+          <a:fillRef idx="1">
+            <a:schemeClr val="accent1"/>
+          </a:fillRef>
+          <a:effectRef idx="0">
+            <a:schemeClr val="accent1"/>
+          </a:effectRef>
+          <a:fontRef idx="minor">
+            <a:schemeClr val="lt1"/>
+          </a:fontRef>
+        </p:style>
+        <p:txBody>
+          <a:bodyPr rtlCol="0" anchor="ctr"/>
+          <a:lstStyle/>
+          <a:p>
+            <a:pPr algn="ctr"/>
+            <a:endParaRPr lang="en-US">
+              <a:solidFill>
+                <a:schemeClr val="tx1"/>
+              </a:solidFill>
+            </a:endParaRPr>
+          </a:p>
+        </p:txBody>
+      </p:sp>
+      <p:sp>
+        <p:nvSpPr>
+          <p:cNvPr id="8" name="&quot;Not Allowed&quot; Symbol 7">
+            <a:extLst>
+              <a:ext uri="{FF2B5EF4-FFF2-40B4-BE49-F238E27FC236}">
+                <a16:creationId xmlns:a16="http://schemas.microsoft.com/office/drawing/2014/main" id="{C154E393-62AE-0634-D826-132AEA4DB35B}"/>
+              </a:ext>
+            </a:extLst>
+          </p:cNvPr>
+          <p:cNvSpPr/>
+          <p:nvPr/>
+        </p:nvSpPr>
+        <p:spPr>
+          <a:xfrm>
+            <a:off x="5078998" y="4280170"/>
+            <a:ext cx="214009" cy="204281"/>
+          </a:xfrm>
+          <a:prstGeom prst="noSmoking">
+            <a:avLst/>
+          </a:prstGeom>
+          <a:solidFill>
+            <a:schemeClr val="accent2"/>
+          </a:solidFill>
+        </p:spPr>
+        <p:style>
+          <a:lnRef idx="2">
+            <a:schemeClr val="accent1">
+              <a:shade val="15000"/>
+            </a:schemeClr>
+          </a:lnRef>
+          <a:fillRef idx="1">
+            <a:schemeClr val="accent1"/>
+          </a:fillRef>
+          <a:effectRef idx="0">
+            <a:schemeClr val="accent1"/>
+          </a:effectRef>
+          <a:fontRef idx="minor">
+            <a:schemeClr val="lt1"/>
+          </a:fontRef>
+        </p:style>
+        <p:txBody>
+          <a:bodyPr rtlCol="0" anchor="ctr"/>
+          <a:lstStyle/>
+          <a:p>
+            <a:pPr algn="ctr"/>
+            <a:endParaRPr lang="en-US">
+              <a:solidFill>
+                <a:schemeClr val="tx1"/>
+              </a:solidFill>
+            </a:endParaRPr>
+          </a:p>
+        </p:txBody>
+      </p:sp>
+      <p:sp>
+        <p:nvSpPr>
+          <p:cNvPr id="9" name="Smiley Face 8">
+            <a:extLst>
+              <a:ext uri="{FF2B5EF4-FFF2-40B4-BE49-F238E27FC236}">
+                <a16:creationId xmlns:a16="http://schemas.microsoft.com/office/drawing/2014/main" id="{EBB507D8-7FDC-7945-4CF3-370117E96D55}"/>
+              </a:ext>
+            </a:extLst>
+          </p:cNvPr>
+          <p:cNvSpPr/>
+          <p:nvPr/>
+        </p:nvSpPr>
+        <p:spPr>
+          <a:xfrm>
+            <a:off x="8791470" y="4280170"/>
+            <a:ext cx="214003" cy="204281"/>
+          </a:xfrm>
+          <a:prstGeom prst="smileyFace">
+            <a:avLst/>
+          </a:prstGeom>
+          <a:solidFill>
+            <a:schemeClr val="accent2"/>
+          </a:solidFill>
+        </p:spPr>
+        <p:style>
+          <a:lnRef idx="2">
+            <a:schemeClr val="accent1">
+              <a:shade val="15000"/>
+            </a:schemeClr>
+          </a:lnRef>
+          <a:fillRef idx="1">
+            <a:schemeClr val="accent1"/>
+          </a:fillRef>
+          <a:effectRef idx="0">
+            <a:schemeClr val="accent1"/>
+          </a:effectRef>
+          <a:fontRef idx="minor">
+            <a:schemeClr val="lt1"/>
+          </a:fontRef>
+        </p:style>
+        <p:txBody>
+          <a:bodyPr rtlCol="0" anchor="ctr"/>
+          <a:lstStyle/>
+          <a:p>
+            <a:pPr algn="ctr"/>
+            <a:endParaRPr lang="en-US"/>
+          </a:p>
+        </p:txBody>
+      </p:sp>
+    </p:spTree>
+    <p:extLst>
+      <p:ext uri="{BB962C8B-B14F-4D97-AF65-F5344CB8AC3E}">
+        <p14:creationId xmlns:p14="http://schemas.microsoft.com/office/powerpoint/2010/main" val="3805467070"/>
+      </p:ext>
+    </p:extLst>
+  </p:cSld>
+  <p:clrMapOvr>
+    <a:masterClrMapping/>
+  </p:clrMapOvr>
+</p:sld>
+</file>
+
+<file path=ppt/slides/slide5.xml><?xml version="1.0" encoding="utf-8"?>
+<p:sld xmlns:a="http://schemas.openxmlformats.org/drawingml/2006/main" xmlns:r="http://schemas.openxmlformats.org/officeDocument/2006/relationships" xmlns:p="http://schemas.openxmlformats.org/presentationml/2006/main">
+  <p:cSld>
+    <p:bg>
+      <p:bgPr>
+        <a:solidFill>
+          <a:schemeClr val="bg1"/>
+        </a:solidFill>
+        <a:effectLst/>
+      </p:bgPr>
+    </p:bg>
+    <p:spTree>
+      <p:nvGrpSpPr>
+        <p:cNvPr id="1" name=""/>
+        <p:cNvGrpSpPr/>
+        <p:nvPr/>
+      </p:nvGrpSpPr>
+      <p:grpSpPr>
+        <a:xfrm>
+          <a:off x="0" y="0"/>
+          <a:ext cx="0" cy="0"/>
+          <a:chOff x="0" y="0"/>
+          <a:chExt cx="0" cy="0"/>
+        </a:xfrm>
+      </p:grpSpPr>
       <p:sp useBgFill="1">
         <p:nvSpPr>
           <p:cNvPr id="64" name="Rectangle 63">
@@ -17446,7 +17851,7 @@
 </p:sld>
 </file>
 
-<file path=ppt/slides/slide5.xml><?xml version="1.0" encoding="utf-8"?>
+<file path=ppt/slides/slide6.xml><?xml version="1.0" encoding="utf-8"?>
 <p:sld xmlns:a="http://schemas.openxmlformats.org/drawingml/2006/main" xmlns:r="http://schemas.openxmlformats.org/officeDocument/2006/relationships" xmlns:p="http://schemas.openxmlformats.org/presentationml/2006/main">
   <p:cSld>
     <p:bg>
@@ -17904,7 +18309,7 @@
             </a:r>
             <a:r>
               <a:rPr lang="en-US" sz="2000" dirty="0" err="1"/>
-              <a:t>y_nn_pred</a:t>
+              <a:t>y_pred</a:t>
             </a:r>
             <a:r>
               <a:rPr lang="en-US" sz="2000" dirty="0"/>
@@ -17966,7 +18371,7 @@
 </p:sld>
 </file>
 
-<file path=ppt/slides/slide6.xml><?xml version="1.0" encoding="utf-8"?>
+<file path=ppt/slides/slide7.xml><?xml version="1.0" encoding="utf-8"?>
 <p:sld xmlns:a="http://schemas.openxmlformats.org/drawingml/2006/main" xmlns:r="http://schemas.openxmlformats.org/officeDocument/2006/relationships" xmlns:p="http://schemas.openxmlformats.org/presentationml/2006/main">
   <p:cSld>
     <p:spTree>
@@ -17995,7 +18400,13 @@
           <p:cNvGraphicFramePr>
             <a:graphicFrameLocks noGrp="1"/>
           </p:cNvGraphicFramePr>
-          <p:nvPr/>
+          <p:nvPr>
+            <p:extLst>
+              <p:ext uri="{D42A27DB-BD31-4B8C-83A1-F6EECF244321}">
+                <p14:modId xmlns:p14="http://schemas.microsoft.com/office/powerpoint/2010/main" val="1200863350"/>
+              </p:ext>
+            </p:extLst>
+          </p:nvPr>
         </p:nvGraphicFramePr>
         <p:xfrm>
           <a:off x="80682" y="71719"/>
@@ -18442,7 +18853,7 @@
                           <a:latin typeface="Arial" panose="020B0604020202020204" pitchFamily="34" charset="0"/>
                           <a:cs typeface="Arial" panose="020B0604020202020204" pitchFamily="34" charset="0"/>
                         </a:rPr>
-                        <a:t>Data </a:t>
+                        <a:t>Data Team No 15</a:t>
                       </a:r>
                     </a:p>
                   </a:txBody>
@@ -19685,7 +20096,7 @@
 </p:sld>
 </file>
 
-<file path=ppt/slides/slide7.xml><?xml version="1.0" encoding="utf-8"?>
+<file path=ppt/slides/slide8.xml><?xml version="1.0" encoding="utf-8"?>
 <p:sld xmlns:a="http://schemas.openxmlformats.org/drawingml/2006/main" xmlns:r="http://schemas.openxmlformats.org/officeDocument/2006/relationships" xmlns:p="http://schemas.openxmlformats.org/presentationml/2006/main">
   <p:cSld>
     <p:bg>
@@ -20521,7 +20932,7 @@
 </p:sld>
 </file>
 
-<file path=ppt/slides/slide8.xml><?xml version="1.0" encoding="utf-8"?>
+<file path=ppt/slides/slide9.xml><?xml version="1.0" encoding="utf-8"?>
 <p:sld xmlns:a="http://schemas.openxmlformats.org/drawingml/2006/main" xmlns:r="http://schemas.openxmlformats.org/officeDocument/2006/relationships" xmlns:p="http://schemas.openxmlformats.org/presentationml/2006/main">
   <p:cSld>
     <p:bg>
@@ -21003,6 +21414,55 @@
           <a:lnRef idx="2">
             <a:schemeClr val="accent1">
               <a:shade val="50000"/>
+            </a:schemeClr>
+          </a:lnRef>
+          <a:fillRef idx="1">
+            <a:schemeClr val="accent1"/>
+          </a:fillRef>
+          <a:effectRef idx="0">
+            <a:schemeClr val="accent1"/>
+          </a:effectRef>
+          <a:fontRef idx="minor">
+            <a:schemeClr val="lt1"/>
+          </a:fontRef>
+        </p:style>
+        <p:txBody>
+          <a:bodyPr rtlCol="0" anchor="ctr"/>
+          <a:lstStyle/>
+          <a:p>
+            <a:pPr algn="ctr"/>
+            <a:endParaRPr lang="en-US"/>
+          </a:p>
+        </p:txBody>
+      </p:sp>
+      <p:sp>
+        <p:nvSpPr>
+          <p:cNvPr id="3" name="Smiley Face 2">
+            <a:extLst>
+              <a:ext uri="{FF2B5EF4-FFF2-40B4-BE49-F238E27FC236}">
+                <a16:creationId xmlns:a16="http://schemas.microsoft.com/office/drawing/2014/main" id="{68860FC2-820D-AA2C-D176-9DB8B8ADE4C1}"/>
+              </a:ext>
+            </a:extLst>
+          </p:cNvPr>
+          <p:cNvSpPr/>
+          <p:nvPr/>
+        </p:nvSpPr>
+        <p:spPr>
+          <a:xfrm>
+            <a:off x="8220451" y="5310973"/>
+            <a:ext cx="675974" cy="686797"/>
+          </a:xfrm>
+          <a:prstGeom prst="smileyFace">
+            <a:avLst/>
+          </a:prstGeom>
+          <a:solidFill>
+            <a:schemeClr val="accent2"/>
+          </a:solidFill>
+        </p:spPr>
+        <p:style>
+          <a:lnRef idx="2">
+            <a:schemeClr val="accent1">
+              <a:shade val="15000"/>
             </a:schemeClr>
           </a:lnRef>
           <a:fillRef idx="1">

</xml_diff>

<commit_message>
Add one more slide in PPT
</commit_message>
<xml_diff>
--- a/Project_Presentation_Employee_Attrition_Prediction.pptx
+++ b/Project_Presentation_Employee_Attrition_Prediction.pptx
@@ -5,24 +5,25 @@
     <p:sldMasterId id="2147483648" r:id="rId1"/>
   </p:sldMasterIdLst>
   <p:notesMasterIdLst>
-    <p:notesMasterId r:id="rId17"/>
+    <p:notesMasterId r:id="rId18"/>
   </p:notesMasterIdLst>
   <p:sldIdLst>
     <p:sldId id="259" r:id="rId2"/>
-    <p:sldId id="263" r:id="rId3"/>
-    <p:sldId id="1606" r:id="rId4"/>
-    <p:sldId id="1609" r:id="rId5"/>
-    <p:sldId id="1610" r:id="rId6"/>
-    <p:sldId id="1611" r:id="rId7"/>
-    <p:sldId id="257" r:id="rId8"/>
-    <p:sldId id="258" r:id="rId9"/>
-    <p:sldId id="1605" r:id="rId10"/>
-    <p:sldId id="261" r:id="rId11"/>
-    <p:sldId id="1612" r:id="rId12"/>
-    <p:sldId id="1613" r:id="rId13"/>
-    <p:sldId id="1603" r:id="rId14"/>
-    <p:sldId id="262" r:id="rId15"/>
-    <p:sldId id="265" r:id="rId16"/>
+    <p:sldId id="1614" r:id="rId3"/>
+    <p:sldId id="263" r:id="rId4"/>
+    <p:sldId id="1606" r:id="rId5"/>
+    <p:sldId id="1609" r:id="rId6"/>
+    <p:sldId id="1610" r:id="rId7"/>
+    <p:sldId id="1611" r:id="rId8"/>
+    <p:sldId id="257" r:id="rId9"/>
+    <p:sldId id="258" r:id="rId10"/>
+    <p:sldId id="1605" r:id="rId11"/>
+    <p:sldId id="261" r:id="rId12"/>
+    <p:sldId id="1612" r:id="rId13"/>
+    <p:sldId id="1613" r:id="rId14"/>
+    <p:sldId id="1603" r:id="rId15"/>
+    <p:sldId id="262" r:id="rId16"/>
+    <p:sldId id="265" r:id="rId17"/>
   </p:sldIdLst>
   <p:sldSz cx="12192000" cy="6858000"/>
   <p:notesSz cx="6858000" cy="9144000"/>
@@ -11800,7 +11801,7 @@
           <a:p>
             <a:fld id="{D9DC0902-B928-4F0F-BBCD-04DEB66ED9A2}" type="slidenum">
               <a:rPr lang="en-US" smtClean="0"/>
-              <a:t>8</a:t>
+              <a:t>4</a:t>
             </a:fld>
             <a:endParaRPr lang="en-US"/>
           </a:p>
@@ -11809,7 +11810,7 @@
     </p:spTree>
     <p:extLst>
       <p:ext uri="{BB962C8B-B14F-4D97-AF65-F5344CB8AC3E}">
-        <p14:creationId xmlns:p14="http://schemas.microsoft.com/office/powerpoint/2010/main" val="3674954994"/>
+        <p14:creationId xmlns:p14="http://schemas.microsoft.com/office/powerpoint/2010/main" val="4148062861"/>
       </p:ext>
     </p:extLst>
   </p:cSld>
@@ -11884,7 +11885,91 @@
           <a:p>
             <a:fld id="{D9DC0902-B928-4F0F-BBCD-04DEB66ED9A2}" type="slidenum">
               <a:rPr lang="en-US" smtClean="0"/>
-              <a:t>15</a:t>
+              <a:t>9</a:t>
+            </a:fld>
+            <a:endParaRPr lang="en-US"/>
+          </a:p>
+        </p:txBody>
+      </p:sp>
+    </p:spTree>
+    <p:extLst>
+      <p:ext uri="{BB962C8B-B14F-4D97-AF65-F5344CB8AC3E}">
+        <p14:creationId xmlns:p14="http://schemas.microsoft.com/office/powerpoint/2010/main" val="3674954994"/>
+      </p:ext>
+    </p:extLst>
+  </p:cSld>
+  <p:clrMapOvr>
+    <a:masterClrMapping/>
+  </p:clrMapOvr>
+</p:notes>
+</file>
+
+<file path=ppt/notesSlides/notesSlide3.xml><?xml version="1.0" encoding="utf-8"?>
+<p:notes xmlns:a="http://schemas.openxmlformats.org/drawingml/2006/main" xmlns:r="http://schemas.openxmlformats.org/officeDocument/2006/relationships" xmlns:p="http://schemas.openxmlformats.org/presentationml/2006/main">
+  <p:cSld>
+    <p:spTree>
+      <p:nvGrpSpPr>
+        <p:cNvPr id="1" name=""/>
+        <p:cNvGrpSpPr/>
+        <p:nvPr/>
+      </p:nvGrpSpPr>
+      <p:grpSpPr>
+        <a:xfrm>
+          <a:off x="0" y="0"/>
+          <a:ext cx="0" cy="0"/>
+          <a:chOff x="0" y="0"/>
+          <a:chExt cx="0" cy="0"/>
+        </a:xfrm>
+      </p:grpSpPr>
+      <p:sp>
+        <p:nvSpPr>
+          <p:cNvPr id="2" name="Slide Image Placeholder 1"/>
+          <p:cNvSpPr>
+            <a:spLocks noGrp="1" noRot="1" noChangeAspect="1"/>
+          </p:cNvSpPr>
+          <p:nvPr>
+            <p:ph type="sldImg"/>
+          </p:nvPr>
+        </p:nvSpPr>
+        <p:spPr/>
+      </p:sp>
+      <p:sp>
+        <p:nvSpPr>
+          <p:cNvPr id="3" name="Notes Placeholder 2"/>
+          <p:cNvSpPr>
+            <a:spLocks noGrp="1"/>
+          </p:cNvSpPr>
+          <p:nvPr>
+            <p:ph type="body" idx="1"/>
+          </p:nvPr>
+        </p:nvSpPr>
+        <p:spPr/>
+        <p:txBody>
+          <a:bodyPr/>
+          <a:lstStyle/>
+          <a:p>
+            <a:endParaRPr lang="en-US" dirty="0"/>
+          </a:p>
+        </p:txBody>
+      </p:sp>
+      <p:sp>
+        <p:nvSpPr>
+          <p:cNvPr id="4" name="Slide Number Placeholder 3"/>
+          <p:cNvSpPr>
+            <a:spLocks noGrp="1"/>
+          </p:cNvSpPr>
+          <p:nvPr>
+            <p:ph type="sldNum" sz="quarter" idx="5"/>
+          </p:nvPr>
+        </p:nvSpPr>
+        <p:spPr/>
+        <p:txBody>
+          <a:bodyPr/>
+          <a:lstStyle/>
+          <a:p>
+            <a:fld id="{D9DC0902-B928-4F0F-BBCD-04DEB66ED9A2}" type="slidenum">
+              <a:rPr lang="en-US" smtClean="0"/>
+              <a:t>16</a:t>
             </a:fld>
             <a:endParaRPr lang="en-US"/>
           </a:p>
@@ -16306,6 +16391,410 @@
           <a:chExt cx="0" cy="0"/>
         </a:xfrm>
       </p:grpSpPr>
+      <p:pic>
+        <p:nvPicPr>
+          <p:cNvPr id="4" name="Picture 3" descr="A blue squares with white text&#10;&#10;Description automatically generated">
+            <a:extLst>
+              <a:ext uri="{FF2B5EF4-FFF2-40B4-BE49-F238E27FC236}">
+                <a16:creationId xmlns:a16="http://schemas.microsoft.com/office/drawing/2014/main" id="{E8CCB4C3-A1E3-C498-4505-DC6818B92938}"/>
+              </a:ext>
+            </a:extLst>
+          </p:cNvPr>
+          <p:cNvPicPr>
+            <a:picLocks noChangeAspect="1"/>
+          </p:cNvPicPr>
+          <p:nvPr/>
+        </p:nvPicPr>
+        <p:blipFill>
+          <a:blip r:embed="rId2"/>
+          <a:stretch>
+            <a:fillRect/>
+          </a:stretch>
+        </p:blipFill>
+        <p:spPr>
+          <a:xfrm>
+            <a:off x="4322200" y="1773903"/>
+            <a:ext cx="3517119" cy="3270920"/>
+          </a:xfrm>
+          <a:prstGeom prst="rect">
+            <a:avLst/>
+          </a:prstGeom>
+        </p:spPr>
+      </p:pic>
+      <p:cxnSp>
+        <p:nvCxnSpPr>
+          <p:cNvPr id="11" name="Straight Connector 10">
+            <a:extLst>
+              <a:ext uri="{FF2B5EF4-FFF2-40B4-BE49-F238E27FC236}">
+                <a16:creationId xmlns:a16="http://schemas.microsoft.com/office/drawing/2014/main" id="{DCD67800-37AC-4E14-89B0-F79DCB3FB86D}"/>
+              </a:ext>
+              <a:ext uri="{C183D7F6-B498-43B3-948B-1728B52AA6E4}">
+                <adec:decorative xmlns:adec="http://schemas.microsoft.com/office/drawing/2017/decorative" val="1"/>
+              </a:ext>
+            </a:extLst>
+          </p:cNvPr>
+          <p:cNvCxnSpPr>
+            <a:cxnSpLocks noGrp="1" noRot="1" noChangeAspect="1" noMove="1" noResize="1" noEditPoints="1" noAdjustHandles="1" noChangeArrowheads="1" noChangeShapeType="1"/>
+          </p:cNvCxnSpPr>
+          <p:nvPr>
+            <p:extLst>
+              <p:ext uri="{386F3935-93C4-4BCD-93E2-E3B085C9AB24}">
+                <p16:designElem xmlns:p16="http://schemas.microsoft.com/office/powerpoint/2015/main" val="1"/>
+              </p:ext>
+            </p:extLst>
+          </p:nvPr>
+        </p:nvCxnSpPr>
+        <p:spPr>
+          <a:xfrm>
+            <a:off x="4165600" y="1573887"/>
+            <a:ext cx="0" cy="3710227"/>
+          </a:xfrm>
+          <a:prstGeom prst="line">
+            <a:avLst/>
+          </a:prstGeom>
+          <a:ln w="19050">
+            <a:solidFill>
+              <a:srgbClr val="7F7F7F"/>
+            </a:solidFill>
+          </a:ln>
+        </p:spPr>
+        <p:style>
+          <a:lnRef idx="1">
+            <a:schemeClr val="accent1"/>
+          </a:lnRef>
+          <a:fillRef idx="0">
+            <a:schemeClr val="accent1"/>
+          </a:fillRef>
+          <a:effectRef idx="0">
+            <a:schemeClr val="accent1"/>
+          </a:effectRef>
+          <a:fontRef idx="minor">
+            <a:schemeClr val="tx1"/>
+          </a:fontRef>
+        </p:style>
+      </p:cxnSp>
+      <p:pic>
+        <p:nvPicPr>
+          <p:cNvPr id="5" name="Content Placeholder 9" descr="A blue squares with white text&#10;&#10;Description automatically generated">
+            <a:extLst>
+              <a:ext uri="{FF2B5EF4-FFF2-40B4-BE49-F238E27FC236}">
+                <a16:creationId xmlns:a16="http://schemas.microsoft.com/office/drawing/2014/main" id="{51257B1A-7131-4C21-57DB-A94CCD2D56AC}"/>
+              </a:ext>
+            </a:extLst>
+          </p:cNvPr>
+          <p:cNvPicPr>
+            <a:picLocks noChangeAspect="1"/>
+          </p:cNvPicPr>
+          <p:nvPr/>
+        </p:nvPicPr>
+        <p:blipFill>
+          <a:blip r:embed="rId3"/>
+          <a:stretch>
+            <a:fillRect/>
+          </a:stretch>
+        </p:blipFill>
+        <p:spPr>
+          <a:xfrm>
+            <a:off x="7869801" y="1790467"/>
+            <a:ext cx="3537345" cy="3254356"/>
+          </a:xfrm>
+          <a:prstGeom prst="rect">
+            <a:avLst/>
+          </a:prstGeom>
+        </p:spPr>
+      </p:pic>
+      <p:cxnSp>
+        <p:nvCxnSpPr>
+          <p:cNvPr id="13" name="Straight Connector 12">
+            <a:extLst>
+              <a:ext uri="{FF2B5EF4-FFF2-40B4-BE49-F238E27FC236}">
+                <a16:creationId xmlns:a16="http://schemas.microsoft.com/office/drawing/2014/main" id="{20F1788F-A5AE-4188-8274-F7F2E3833ECD}"/>
+              </a:ext>
+              <a:ext uri="{C183D7F6-B498-43B3-948B-1728B52AA6E4}">
+                <adec:decorative xmlns:adec="http://schemas.microsoft.com/office/drawing/2017/decorative" val="1"/>
+              </a:ext>
+            </a:extLst>
+          </p:cNvPr>
+          <p:cNvCxnSpPr>
+            <a:cxnSpLocks noGrp="1" noRot="1" noChangeAspect="1" noMove="1" noResize="1" noEditPoints="1" noAdjustHandles="1" noChangeArrowheads="1" noChangeShapeType="1"/>
+          </p:cNvCxnSpPr>
+          <p:nvPr>
+            <p:extLst>
+              <p:ext uri="{386F3935-93C4-4BCD-93E2-E3B085C9AB24}">
+                <p16:designElem xmlns:p16="http://schemas.microsoft.com/office/powerpoint/2015/main" val="1"/>
+              </p:ext>
+            </p:extLst>
+          </p:nvPr>
+        </p:nvCxnSpPr>
+        <p:spPr>
+          <a:xfrm>
+            <a:off x="7995920" y="1573887"/>
+            <a:ext cx="0" cy="3710227"/>
+          </a:xfrm>
+          <a:prstGeom prst="line">
+            <a:avLst/>
+          </a:prstGeom>
+          <a:ln w="19050">
+            <a:solidFill>
+              <a:srgbClr val="7F7F7F"/>
+            </a:solidFill>
+          </a:ln>
+        </p:spPr>
+        <p:style>
+          <a:lnRef idx="1">
+            <a:schemeClr val="accent1"/>
+          </a:lnRef>
+          <a:fillRef idx="0">
+            <a:schemeClr val="accent1"/>
+          </a:fillRef>
+          <a:effectRef idx="0">
+            <a:schemeClr val="accent1"/>
+          </a:effectRef>
+          <a:fontRef idx="minor">
+            <a:schemeClr val="tx1"/>
+          </a:fontRef>
+        </p:style>
+      </p:cxnSp>
+      <p:pic>
+        <p:nvPicPr>
+          <p:cNvPr id="6" name="Content Placeholder 15" descr="A blue and white graph&#10;&#10;Description automatically generated">
+            <a:extLst>
+              <a:ext uri="{FF2B5EF4-FFF2-40B4-BE49-F238E27FC236}">
+                <a16:creationId xmlns:a16="http://schemas.microsoft.com/office/drawing/2014/main" id="{7A9D9373-1E99-1F6B-1EE4-10E10364F865}"/>
+              </a:ext>
+            </a:extLst>
+          </p:cNvPr>
+          <p:cNvPicPr>
+            <a:picLocks noChangeAspect="1"/>
+          </p:cNvPicPr>
+          <p:nvPr/>
+        </p:nvPicPr>
+        <p:blipFill>
+          <a:blip r:embed="rId4"/>
+          <a:stretch>
+            <a:fillRect/>
+          </a:stretch>
+        </p:blipFill>
+        <p:spPr>
+          <a:xfrm>
+            <a:off x="461400" y="1773903"/>
+            <a:ext cx="3517120" cy="3244543"/>
+          </a:xfrm>
+          <a:prstGeom prst="rect">
+            <a:avLst/>
+          </a:prstGeom>
+          <a:solidFill>
+            <a:srgbClr val="FFFFFF">
+              <a:shade val="85000"/>
+            </a:srgbClr>
+          </a:solidFill>
+          <a:scene3d>
+            <a:camera prst="orthographicFront"/>
+            <a:lightRig rig="twoPt" dir="t">
+              <a:rot lat="0" lon="0" rev="7200000"/>
+            </a:lightRig>
+          </a:scene3d>
+          <a:sp3d>
+            <a:bevelT w="25400" h="19050"/>
+            <a:contourClr>
+              <a:srgbClr val="FFFFFF"/>
+            </a:contourClr>
+          </a:sp3d>
+        </p:spPr>
+      </p:pic>
+      <p:sp>
+        <p:nvSpPr>
+          <p:cNvPr id="7" name="&quot;Not Allowed&quot; Symbol 6">
+            <a:extLst>
+              <a:ext uri="{FF2B5EF4-FFF2-40B4-BE49-F238E27FC236}">
+                <a16:creationId xmlns:a16="http://schemas.microsoft.com/office/drawing/2014/main" id="{E1D54D72-ED59-C6A9-1DB3-EE69161881A4}"/>
+              </a:ext>
+            </a:extLst>
+          </p:cNvPr>
+          <p:cNvSpPr/>
+          <p:nvPr/>
+        </p:nvSpPr>
+        <p:spPr>
+          <a:xfrm>
+            <a:off x="1371600" y="4280170"/>
+            <a:ext cx="214009" cy="204281"/>
+          </a:xfrm>
+          <a:prstGeom prst="noSmoking">
+            <a:avLst/>
+          </a:prstGeom>
+          <a:solidFill>
+            <a:schemeClr val="accent2"/>
+          </a:solidFill>
+        </p:spPr>
+        <p:style>
+          <a:lnRef idx="2">
+            <a:schemeClr val="accent1">
+              <a:shade val="15000"/>
+            </a:schemeClr>
+          </a:lnRef>
+          <a:fillRef idx="1">
+            <a:schemeClr val="accent1"/>
+          </a:fillRef>
+          <a:effectRef idx="0">
+            <a:schemeClr val="accent1"/>
+          </a:effectRef>
+          <a:fontRef idx="minor">
+            <a:schemeClr val="lt1"/>
+          </a:fontRef>
+        </p:style>
+        <p:txBody>
+          <a:bodyPr rtlCol="0" anchor="ctr"/>
+          <a:lstStyle/>
+          <a:p>
+            <a:pPr algn="ctr"/>
+            <a:endParaRPr lang="en-US">
+              <a:solidFill>
+                <a:schemeClr val="tx1"/>
+              </a:solidFill>
+            </a:endParaRPr>
+          </a:p>
+        </p:txBody>
+      </p:sp>
+      <p:sp>
+        <p:nvSpPr>
+          <p:cNvPr id="8" name="&quot;Not Allowed&quot; Symbol 7">
+            <a:extLst>
+              <a:ext uri="{FF2B5EF4-FFF2-40B4-BE49-F238E27FC236}">
+                <a16:creationId xmlns:a16="http://schemas.microsoft.com/office/drawing/2014/main" id="{C154E393-62AE-0634-D826-132AEA4DB35B}"/>
+              </a:ext>
+            </a:extLst>
+          </p:cNvPr>
+          <p:cNvSpPr/>
+          <p:nvPr/>
+        </p:nvSpPr>
+        <p:spPr>
+          <a:xfrm>
+            <a:off x="5078998" y="4280170"/>
+            <a:ext cx="214009" cy="204281"/>
+          </a:xfrm>
+          <a:prstGeom prst="noSmoking">
+            <a:avLst/>
+          </a:prstGeom>
+          <a:solidFill>
+            <a:schemeClr val="accent2"/>
+          </a:solidFill>
+        </p:spPr>
+        <p:style>
+          <a:lnRef idx="2">
+            <a:schemeClr val="accent1">
+              <a:shade val="15000"/>
+            </a:schemeClr>
+          </a:lnRef>
+          <a:fillRef idx="1">
+            <a:schemeClr val="accent1"/>
+          </a:fillRef>
+          <a:effectRef idx="0">
+            <a:schemeClr val="accent1"/>
+          </a:effectRef>
+          <a:fontRef idx="minor">
+            <a:schemeClr val="lt1"/>
+          </a:fontRef>
+        </p:style>
+        <p:txBody>
+          <a:bodyPr rtlCol="0" anchor="ctr"/>
+          <a:lstStyle/>
+          <a:p>
+            <a:pPr algn="ctr"/>
+            <a:endParaRPr lang="en-US">
+              <a:solidFill>
+                <a:schemeClr val="tx1"/>
+              </a:solidFill>
+            </a:endParaRPr>
+          </a:p>
+        </p:txBody>
+      </p:sp>
+      <p:sp>
+        <p:nvSpPr>
+          <p:cNvPr id="9" name="Smiley Face 8">
+            <a:extLst>
+              <a:ext uri="{FF2B5EF4-FFF2-40B4-BE49-F238E27FC236}">
+                <a16:creationId xmlns:a16="http://schemas.microsoft.com/office/drawing/2014/main" id="{EBB507D8-7FDC-7945-4CF3-370117E96D55}"/>
+              </a:ext>
+            </a:extLst>
+          </p:cNvPr>
+          <p:cNvSpPr/>
+          <p:nvPr/>
+        </p:nvSpPr>
+        <p:spPr>
+          <a:xfrm>
+            <a:off x="8791470" y="4280170"/>
+            <a:ext cx="214003" cy="204281"/>
+          </a:xfrm>
+          <a:prstGeom prst="smileyFace">
+            <a:avLst/>
+          </a:prstGeom>
+          <a:solidFill>
+            <a:schemeClr val="accent2"/>
+          </a:solidFill>
+        </p:spPr>
+        <p:style>
+          <a:lnRef idx="2">
+            <a:schemeClr val="accent1">
+              <a:shade val="15000"/>
+            </a:schemeClr>
+          </a:lnRef>
+          <a:fillRef idx="1">
+            <a:schemeClr val="accent1"/>
+          </a:fillRef>
+          <a:effectRef idx="0">
+            <a:schemeClr val="accent1"/>
+          </a:effectRef>
+          <a:fontRef idx="minor">
+            <a:schemeClr val="lt1"/>
+          </a:fontRef>
+        </p:style>
+        <p:txBody>
+          <a:bodyPr rtlCol="0" anchor="ctr"/>
+          <a:lstStyle/>
+          <a:p>
+            <a:pPr algn="ctr"/>
+            <a:endParaRPr lang="en-US"/>
+          </a:p>
+        </p:txBody>
+      </p:sp>
+    </p:spTree>
+    <p:extLst>
+      <p:ext uri="{BB962C8B-B14F-4D97-AF65-F5344CB8AC3E}">
+        <p14:creationId xmlns:p14="http://schemas.microsoft.com/office/powerpoint/2010/main" val="3805467070"/>
+      </p:ext>
+    </p:extLst>
+  </p:cSld>
+  <p:clrMapOvr>
+    <a:masterClrMapping/>
+  </p:clrMapOvr>
+</p:sld>
+</file>
+
+<file path=ppt/slides/slide11.xml><?xml version="1.0" encoding="utf-8"?>
+<p:sld xmlns:a="http://schemas.openxmlformats.org/drawingml/2006/main" xmlns:r="http://schemas.openxmlformats.org/officeDocument/2006/relationships" xmlns:p="http://schemas.openxmlformats.org/presentationml/2006/main">
+  <p:cSld>
+    <p:bg>
+      <p:bgPr>
+        <a:solidFill>
+          <a:schemeClr val="bg1"/>
+        </a:solidFill>
+        <a:effectLst/>
+      </p:bgPr>
+    </p:bg>
+    <p:spTree>
+      <p:nvGrpSpPr>
+        <p:cNvPr id="1" name=""/>
+        <p:cNvGrpSpPr/>
+        <p:nvPr/>
+      </p:nvGrpSpPr>
+      <p:grpSpPr>
+        <a:xfrm>
+          <a:off x="0" y="0"/>
+          <a:ext cx="0" cy="0"/>
+          <a:chOff x="0" y="0"/>
+          <a:chExt cx="0" cy="0"/>
+        </a:xfrm>
+      </p:grpSpPr>
       <p:sp useBgFill="1">
         <p:nvSpPr>
           <p:cNvPr id="10" name="Rectangle 9">
@@ -16801,7 +17290,7 @@
 </p:sld>
 </file>
 
-<file path=ppt/slides/slide11.xml><?xml version="1.0" encoding="utf-8"?>
+<file path=ppt/slides/slide12.xml><?xml version="1.0" encoding="utf-8"?>
 <p:sld xmlns:a="http://schemas.openxmlformats.org/drawingml/2006/main" xmlns:r="http://schemas.openxmlformats.org/officeDocument/2006/relationships" xmlns:p="http://schemas.openxmlformats.org/presentationml/2006/main">
   <p:cSld>
     <p:bg>
@@ -17835,7 +18324,7 @@
 </p:sld>
 </file>
 
-<file path=ppt/slides/slide12.xml><?xml version="1.0" encoding="utf-8"?>
+<file path=ppt/slides/slide13.xml><?xml version="1.0" encoding="utf-8"?>
 <p:sld xmlns:a="http://schemas.openxmlformats.org/drawingml/2006/main" xmlns:r="http://schemas.openxmlformats.org/officeDocument/2006/relationships" xmlns:p="http://schemas.openxmlformats.org/presentationml/2006/main">
   <p:cSld>
     <p:bg>
@@ -18455,7 +18944,7 @@
 </p:sld>
 </file>
 
-<file path=ppt/slides/slide13.xml><?xml version="1.0" encoding="utf-8"?>
+<file path=ppt/slides/slide14.xml><?xml version="1.0" encoding="utf-8"?>
 <p:sld xmlns:a="http://schemas.openxmlformats.org/drawingml/2006/main" xmlns:r="http://schemas.openxmlformats.org/officeDocument/2006/relationships" xmlns:p="http://schemas.openxmlformats.org/presentationml/2006/main">
   <p:cSld>
     <p:spTree>
@@ -20180,7 +20669,7 @@
 </p:sld>
 </file>
 
-<file path=ppt/slides/slide14.xml><?xml version="1.0" encoding="utf-8"?>
+<file path=ppt/slides/slide15.xml><?xml version="1.0" encoding="utf-8"?>
 <p:sld xmlns:a="http://schemas.openxmlformats.org/drawingml/2006/main" xmlns:r="http://schemas.openxmlformats.org/officeDocument/2006/relationships" xmlns:p="http://schemas.openxmlformats.org/presentationml/2006/main">
   <p:cSld>
     <p:bg>
@@ -21008,7 +21497,7 @@
 </p:sld>
 </file>
 
-<file path=ppt/slides/slide15.xml><?xml version="1.0" encoding="utf-8"?>
+<file path=ppt/slides/slide16.xml><?xml version="1.0" encoding="utf-8"?>
 <p:sld xmlns:a="http://schemas.openxmlformats.org/drawingml/2006/main" xmlns:r="http://schemas.openxmlformats.org/officeDocument/2006/relationships" xmlns:p="http://schemas.openxmlformats.org/presentationml/2006/main">
   <p:cSld>
     <p:bg>
@@ -21600,10 +22089,10 @@
       </p:grpSpPr>
       <p:sp useBgFill="1">
         <p:nvSpPr>
-          <p:cNvPr id="10" name="Rectangle 9">
+          <p:cNvPr id="18" name="Rectangle 17">
             <a:extLst>
               <a:ext uri="{FF2B5EF4-FFF2-40B4-BE49-F238E27FC236}">
-                <a16:creationId xmlns:a16="http://schemas.microsoft.com/office/drawing/2014/main" id="{B14C2221-2B8C-494D-9442-F812DF4E8794}"/>
+                <a16:creationId xmlns:a16="http://schemas.microsoft.com/office/drawing/2014/main" id="{7B831B6F-405A-4B47-B9BB-5CA88F285844}"/>
               </a:ext>
               <a:ext uri="{C183D7F6-B498-43B3-948B-1728B52AA6E4}">
                 <adec:decorative xmlns:adec="http://schemas.microsoft.com/office/drawing/2017/decorative" val="1"/>
@@ -21623,7 +22112,867 @@
         </p:nvSpPr>
         <p:spPr>
           <a:xfrm>
-            <a:off x="0" y="-1"/>
+            <a:off x="0" y="0"/>
+            <a:ext cx="12192000" cy="6858000"/>
+          </a:xfrm>
+          <a:prstGeom prst="rect">
+            <a:avLst/>
+          </a:prstGeom>
+          <a:ln>
+            <a:noFill/>
+          </a:ln>
+        </p:spPr>
+        <p:style>
+          <a:lnRef idx="2">
+            <a:schemeClr val="accent1">
+              <a:shade val="50000"/>
+            </a:schemeClr>
+          </a:lnRef>
+          <a:fillRef idx="1">
+            <a:schemeClr val="accent1"/>
+          </a:fillRef>
+          <a:effectRef idx="0">
+            <a:schemeClr val="accent1"/>
+          </a:effectRef>
+          <a:fontRef idx="minor">
+            <a:schemeClr val="lt1"/>
+          </a:fontRef>
+        </p:style>
+        <p:txBody>
+          <a:bodyPr rtlCol="0" anchor="ctr"/>
+          <a:lstStyle/>
+          <a:p>
+            <a:pPr algn="ctr"/>
+            <a:endParaRPr lang="en-US"/>
+          </a:p>
+        </p:txBody>
+      </p:sp>
+      <p:pic>
+        <p:nvPicPr>
+          <p:cNvPr id="7" name="Graphic 6" descr="Group Brainstorm">
+            <a:extLst>
+              <a:ext uri="{FF2B5EF4-FFF2-40B4-BE49-F238E27FC236}">
+                <a16:creationId xmlns:a16="http://schemas.microsoft.com/office/drawing/2014/main" id="{914605AD-87B0-DB25-F507-4077C213479A}"/>
+              </a:ext>
+            </a:extLst>
+          </p:cNvPr>
+          <p:cNvPicPr>
+            <a:picLocks noChangeAspect="1"/>
+          </p:cNvPicPr>
+          <p:nvPr/>
+        </p:nvPicPr>
+        <p:blipFill>
+          <a:blip r:embed="rId2">
+            <a:extLst>
+              <a:ext uri="{28A0092B-C50C-407E-A947-70E740481C1C}">
+                <a14:useLocalDpi xmlns:a14="http://schemas.microsoft.com/office/drawing/2010/main" val="0"/>
+              </a:ext>
+              <a:ext uri="{96DAC541-7B7A-43D3-8B79-37D633B846F1}">
+                <asvg:svgBlip xmlns:asvg="http://schemas.microsoft.com/office/drawing/2016/SVG/main" r:embed="rId3"/>
+              </a:ext>
+            </a:extLst>
+          </a:blip>
+          <a:stretch>
+            <a:fillRect/>
+          </a:stretch>
+        </p:blipFill>
+        <p:spPr>
+          <a:xfrm>
+            <a:off x="764988" y="1744515"/>
+            <a:ext cx="3368969" cy="3368969"/>
+          </a:xfrm>
+          <a:prstGeom prst="rect">
+            <a:avLst/>
+          </a:prstGeom>
+        </p:spPr>
+      </p:pic>
+      <p:sp>
+        <p:nvSpPr>
+          <p:cNvPr id="19" name="Freeform: Shape 13">
+            <a:extLst>
+              <a:ext uri="{FF2B5EF4-FFF2-40B4-BE49-F238E27FC236}">
+                <a16:creationId xmlns:a16="http://schemas.microsoft.com/office/drawing/2014/main" id="{15109354-9C5D-4F8C-B0E6-D1043C7BF20A}"/>
+              </a:ext>
+              <a:ext uri="{C183D7F6-B498-43B3-948B-1728B52AA6E4}">
+                <adec:decorative xmlns:adec="http://schemas.microsoft.com/office/drawing/2017/decorative" val="1"/>
+              </a:ext>
+            </a:extLst>
+          </p:cNvPr>
+          <p:cNvSpPr>
+            <a:spLocks noGrp="1" noRot="1" noChangeAspect="1" noMove="1" noResize="1" noEditPoints="1" noAdjustHandles="1" noChangeArrowheads="1" noChangeShapeType="1" noTextEdit="1"/>
+          </p:cNvSpPr>
+          <p:nvPr>
+            <p:extLst>
+              <p:ext uri="{386F3935-93C4-4BCD-93E2-E3B085C9AB24}">
+                <p16:designElem xmlns:p16="http://schemas.microsoft.com/office/powerpoint/2015/main" val="1"/>
+              </p:ext>
+            </p:extLst>
+          </p:nvPr>
+        </p:nvSpPr>
+        <p:spPr>
+          <a:xfrm>
+            <a:off x="4629992" y="0"/>
+            <a:ext cx="7562008" cy="6858000"/>
+          </a:xfrm>
+          <a:custGeom>
+            <a:avLst/>
+            <a:gdLst>
+              <a:gd name="connsiteX0" fmla="*/ 7529613 w 7529613"/>
+              <a:gd name="connsiteY0" fmla="*/ 0 h 6858000"/>
+              <a:gd name="connsiteX1" fmla="*/ 1222331 w 7529613"/>
+              <a:gd name="connsiteY1" fmla="*/ 0 h 6858000"/>
+              <a:gd name="connsiteX2" fmla="*/ 1126483 w 7529613"/>
+              <a:gd name="connsiteY2" fmla="*/ 148742 h 6858000"/>
+              <a:gd name="connsiteX3" fmla="*/ 767554 w 7529613"/>
+              <a:gd name="connsiteY3" fmla="*/ 819975 h 6858000"/>
+              <a:gd name="connsiteX4" fmla="*/ 742103 w 7529613"/>
+              <a:gd name="connsiteY4" fmla="*/ 854514 h 6858000"/>
+              <a:gd name="connsiteX5" fmla="*/ 785881 w 7529613"/>
+              <a:gd name="connsiteY5" fmla="*/ 750263 h 6858000"/>
+              <a:gd name="connsiteX6" fmla="*/ 978978 w 7529613"/>
+              <a:gd name="connsiteY6" fmla="*/ 331786 h 6858000"/>
+              <a:gd name="connsiteX7" fmla="*/ 1155717 w 7529613"/>
+              <a:gd name="connsiteY7" fmla="*/ 0 h 6858000"/>
+              <a:gd name="connsiteX8" fmla="*/ 1098249 w 7529613"/>
+              <a:gd name="connsiteY8" fmla="*/ 0 h 6858000"/>
+              <a:gd name="connsiteX9" fmla="*/ 991458 w 7529613"/>
+              <a:gd name="connsiteY9" fmla="*/ 196614 h 6858000"/>
+              <a:gd name="connsiteX10" fmla="*/ 493941 w 7529613"/>
+              <a:gd name="connsiteY10" fmla="*/ 1371196 h 6858000"/>
+              <a:gd name="connsiteX11" fmla="*/ 46485 w 7529613"/>
+              <a:gd name="connsiteY11" fmla="*/ 3331516 h 6858000"/>
+              <a:gd name="connsiteX12" fmla="*/ 12252 w 7529613"/>
+              <a:gd name="connsiteY12" fmla="*/ 4357388 h 6858000"/>
+              <a:gd name="connsiteX13" fmla="*/ 170821 w 7529613"/>
+              <a:gd name="connsiteY13" fmla="*/ 5552906 h 6858000"/>
+              <a:gd name="connsiteX14" fmla="*/ 537265 w 7529613"/>
+              <a:gd name="connsiteY14" fmla="*/ 6828295 h 6858000"/>
+              <a:gd name="connsiteX15" fmla="*/ 549692 w 7529613"/>
+              <a:gd name="connsiteY15" fmla="*/ 6858000 h 6858000"/>
+              <a:gd name="connsiteX16" fmla="*/ 602234 w 7529613"/>
+              <a:gd name="connsiteY16" fmla="*/ 6858000 h 6858000"/>
+              <a:gd name="connsiteX17" fmla="*/ 595414 w 7529613"/>
+              <a:gd name="connsiteY17" fmla="*/ 6841549 h 6858000"/>
+              <a:gd name="connsiteX18" fmla="*/ 364260 w 7529613"/>
+              <a:gd name="connsiteY18" fmla="*/ 6142729 h 6858000"/>
+              <a:gd name="connsiteX19" fmla="*/ 213071 w 7529613"/>
+              <a:gd name="connsiteY19" fmla="*/ 5513923 h 6858000"/>
+              <a:gd name="connsiteX20" fmla="*/ 211290 w 7529613"/>
+              <a:gd name="connsiteY20" fmla="*/ 5480401 h 6858000"/>
+              <a:gd name="connsiteX21" fmla="*/ 311446 w 7529613"/>
+              <a:gd name="connsiteY21" fmla="*/ 5830359 h 6858000"/>
+              <a:gd name="connsiteX22" fmla="*/ 622963 w 7529613"/>
+              <a:gd name="connsiteY22" fmla="*/ 6670527 h 6858000"/>
+              <a:gd name="connsiteX23" fmla="*/ 710464 w 7529613"/>
+              <a:gd name="connsiteY23" fmla="*/ 6858000 h 6858000"/>
+              <a:gd name="connsiteX24" fmla="*/ 7529613 w 7529613"/>
+              <a:gd name="connsiteY24" fmla="*/ 6858000 h 6858000"/>
+            </a:gdLst>
+            <a:ahLst/>
+            <a:cxnLst>
+              <a:cxn ang="0">
+                <a:pos x="connsiteX0" y="connsiteY0"/>
+              </a:cxn>
+              <a:cxn ang="0">
+                <a:pos x="connsiteX1" y="connsiteY1"/>
+              </a:cxn>
+              <a:cxn ang="0">
+                <a:pos x="connsiteX2" y="connsiteY2"/>
+              </a:cxn>
+              <a:cxn ang="0">
+                <a:pos x="connsiteX3" y="connsiteY3"/>
+              </a:cxn>
+              <a:cxn ang="0">
+                <a:pos x="connsiteX4" y="connsiteY4"/>
+              </a:cxn>
+              <a:cxn ang="0">
+                <a:pos x="connsiteX5" y="connsiteY5"/>
+              </a:cxn>
+              <a:cxn ang="0">
+                <a:pos x="connsiteX6" y="connsiteY6"/>
+              </a:cxn>
+              <a:cxn ang="0">
+                <a:pos x="connsiteX7" y="connsiteY7"/>
+              </a:cxn>
+              <a:cxn ang="0">
+                <a:pos x="connsiteX8" y="connsiteY8"/>
+              </a:cxn>
+              <a:cxn ang="0">
+                <a:pos x="connsiteX9" y="connsiteY9"/>
+              </a:cxn>
+              <a:cxn ang="0">
+                <a:pos x="connsiteX10" y="connsiteY10"/>
+              </a:cxn>
+              <a:cxn ang="0">
+                <a:pos x="connsiteX11" y="connsiteY11"/>
+              </a:cxn>
+              <a:cxn ang="0">
+                <a:pos x="connsiteX12" y="connsiteY12"/>
+              </a:cxn>
+              <a:cxn ang="0">
+                <a:pos x="connsiteX13" y="connsiteY13"/>
+              </a:cxn>
+              <a:cxn ang="0">
+                <a:pos x="connsiteX14" y="connsiteY14"/>
+              </a:cxn>
+              <a:cxn ang="0">
+                <a:pos x="connsiteX15" y="connsiteY15"/>
+              </a:cxn>
+              <a:cxn ang="0">
+                <a:pos x="connsiteX16" y="connsiteY16"/>
+              </a:cxn>
+              <a:cxn ang="0">
+                <a:pos x="connsiteX17" y="connsiteY17"/>
+              </a:cxn>
+              <a:cxn ang="0">
+                <a:pos x="connsiteX18" y="connsiteY18"/>
+              </a:cxn>
+              <a:cxn ang="0">
+                <a:pos x="connsiteX19" y="connsiteY19"/>
+              </a:cxn>
+              <a:cxn ang="0">
+                <a:pos x="connsiteX20" y="connsiteY20"/>
+              </a:cxn>
+              <a:cxn ang="0">
+                <a:pos x="connsiteX21" y="connsiteY21"/>
+              </a:cxn>
+              <a:cxn ang="0">
+                <a:pos x="connsiteX22" y="connsiteY22"/>
+              </a:cxn>
+              <a:cxn ang="0">
+                <a:pos x="connsiteX23" y="connsiteY23"/>
+              </a:cxn>
+              <a:cxn ang="0">
+                <a:pos x="connsiteX24" y="connsiteY24"/>
+              </a:cxn>
+            </a:cxnLst>
+            <a:rect l="l" t="t" r="r" b="b"/>
+            <a:pathLst>
+              <a:path w="7529613" h="6858000">
+                <a:moveTo>
+                  <a:pt x="7529613" y="0"/>
+                </a:moveTo>
+                <a:lnTo>
+                  <a:pt x="1222331" y="0"/>
+                </a:lnTo>
+                <a:lnTo>
+                  <a:pt x="1126483" y="148742"/>
+                </a:lnTo>
+                <a:cubicBezTo>
+                  <a:pt x="995323" y="365513"/>
+                  <a:pt x="876174" y="589569"/>
+                  <a:pt x="767554" y="819975"/>
+                </a:cubicBezTo>
+                <a:cubicBezTo>
+                  <a:pt x="762210" y="833492"/>
+                  <a:pt x="753441" y="845393"/>
+                  <a:pt x="742103" y="854514"/>
+                </a:cubicBezTo>
+                <a:cubicBezTo>
+                  <a:pt x="756737" y="819849"/>
+                  <a:pt x="770991" y="784928"/>
+                  <a:pt x="785881" y="750263"/>
+                </a:cubicBezTo>
+                <a:cubicBezTo>
+                  <a:pt x="846713" y="608712"/>
+                  <a:pt x="910948" y="469145"/>
+                  <a:pt x="978978" y="331786"/>
+                </a:cubicBezTo>
+                <a:lnTo>
+                  <a:pt x="1155717" y="0"/>
+                </a:lnTo>
+                <a:lnTo>
+                  <a:pt x="1098249" y="0"/>
+                </a:lnTo>
+                <a:lnTo>
+                  <a:pt x="991458" y="196614"/>
+                </a:lnTo>
+                <a:cubicBezTo>
+                  <a:pt x="797017" y="573253"/>
+                  <a:pt x="633548" y="966066"/>
+                  <a:pt x="493941" y="1371196"/>
+                </a:cubicBezTo>
+                <a:cubicBezTo>
+                  <a:pt x="276630" y="2007265"/>
+                  <a:pt x="126659" y="2664286"/>
+                  <a:pt x="46485" y="3331516"/>
+                </a:cubicBezTo>
+                <a:cubicBezTo>
+                  <a:pt x="4488" y="3672965"/>
+                  <a:pt x="-14219" y="4013908"/>
+                  <a:pt x="12252" y="4357388"/>
+                </a:cubicBezTo>
+                <a:cubicBezTo>
+                  <a:pt x="43558" y="4758899"/>
+                  <a:pt x="90773" y="5157998"/>
+                  <a:pt x="170821" y="5552906"/>
+                </a:cubicBezTo>
+                <a:cubicBezTo>
+                  <a:pt x="259109" y="5988893"/>
+                  <a:pt x="378967" y="6414594"/>
+                  <a:pt x="537265" y="6828295"/>
+                </a:cubicBezTo>
+                <a:lnTo>
+                  <a:pt x="549692" y="6858000"/>
+                </a:lnTo>
+                <a:lnTo>
+                  <a:pt x="602234" y="6858000"/>
+                </a:lnTo>
+                <a:lnTo>
+                  <a:pt x="595414" y="6841549"/>
+                </a:lnTo>
+                <a:cubicBezTo>
+                  <a:pt x="507884" y="6614016"/>
+                  <a:pt x="431296" y="6380817"/>
+                  <a:pt x="364260" y="6142729"/>
+                </a:cubicBezTo>
+                <a:cubicBezTo>
+                  <a:pt x="305974" y="5935370"/>
+                  <a:pt x="262958" y="5723695"/>
+                  <a:pt x="213071" y="5513923"/>
+                </a:cubicBezTo>
+                <a:cubicBezTo>
+                  <a:pt x="211892" y="5502788"/>
+                  <a:pt x="211299" y="5491601"/>
+                  <a:pt x="211290" y="5480401"/>
+                </a:cubicBezTo>
+                <a:cubicBezTo>
+                  <a:pt x="247814" y="5607635"/>
+                  <a:pt x="276958" y="5719759"/>
+                  <a:pt x="311446" y="5830359"/>
+                </a:cubicBezTo>
+                <a:cubicBezTo>
+                  <a:pt x="401357" y="6118381"/>
+                  <a:pt x="505060" y="6398531"/>
+                  <a:pt x="622963" y="6670527"/>
+                </a:cubicBezTo>
+                <a:lnTo>
+                  <a:pt x="710464" y="6858000"/>
+                </a:lnTo>
+                <a:lnTo>
+                  <a:pt x="7529613" y="6858000"/>
+                </a:lnTo>
+                <a:close/>
+              </a:path>
+            </a:pathLst>
+          </a:custGeom>
+          <a:solidFill>
+            <a:schemeClr val="accent2"/>
+          </a:solidFill>
+          <a:ln w="6857" cap="flat">
+            <a:noFill/>
+            <a:prstDash val="solid"/>
+            <a:miter/>
+          </a:ln>
+        </p:spPr>
+        <p:txBody>
+          <a:bodyPr wrap="square" rtlCol="0" anchor="ctr">
+            <a:noAutofit/>
+          </a:bodyPr>
+          <a:lstStyle/>
+          <a:p>
+            <a:endParaRPr lang="en-US"/>
+          </a:p>
+        </p:txBody>
+      </p:sp>
+      <p:sp>
+        <p:nvSpPr>
+          <p:cNvPr id="2" name="Title 1"/>
+          <p:cNvSpPr>
+            <a:spLocks noGrp="1"/>
+          </p:cNvSpPr>
+          <p:nvPr>
+            <p:ph type="title"/>
+          </p:nvPr>
+        </p:nvSpPr>
+        <p:spPr>
+          <a:xfrm>
+            <a:off x="5759354" y="457201"/>
+            <a:ext cx="5337270" cy="1835911"/>
+          </a:xfrm>
+        </p:spPr>
+        <p:txBody>
+          <a:bodyPr anchor="b">
+            <a:normAutofit/>
+          </a:bodyPr>
+          <a:lstStyle/>
+          <a:p>
+            <a:r>
+              <a:rPr lang="en-IN" sz="5400">
+                <a:solidFill>
+                  <a:srgbClr val="FFFFFF"/>
+                </a:solidFill>
+              </a:rPr>
+              <a:t>Abstract</a:t>
+            </a:r>
+          </a:p>
+        </p:txBody>
+      </p:sp>
+      <p:sp>
+        <p:nvSpPr>
+          <p:cNvPr id="20" name="sketch line">
+            <a:extLst>
+              <a:ext uri="{FF2B5EF4-FFF2-40B4-BE49-F238E27FC236}">
+                <a16:creationId xmlns:a16="http://schemas.microsoft.com/office/drawing/2014/main" id="{49B530FE-A87D-41A0-A920-ADC6539EAA44}"/>
+              </a:ext>
+              <a:ext uri="{C183D7F6-B498-43B3-948B-1728B52AA6E4}">
+                <adec:decorative xmlns:adec="http://schemas.microsoft.com/office/drawing/2017/decorative" val="1"/>
+              </a:ext>
+            </a:extLst>
+          </p:cNvPr>
+          <p:cNvSpPr>
+            <a:spLocks noGrp="1" noRot="1" noChangeAspect="1" noMove="1" noResize="1" noEditPoints="1" noAdjustHandles="1" noChangeArrowheads="1" noChangeShapeType="1" noTextEdit="1"/>
+          </p:cNvSpPr>
+          <p:nvPr>
+            <p:extLst>
+              <p:ext uri="{386F3935-93C4-4BCD-93E2-E3B085C9AB24}">
+                <p16:designElem xmlns:p16="http://schemas.microsoft.com/office/powerpoint/2015/main" val="1"/>
+              </p:ext>
+            </p:extLst>
+          </p:nvPr>
+        </p:nvSpPr>
+        <p:spPr>
+          <a:xfrm>
+            <a:off x="5759353" y="2560829"/>
+            <a:ext cx="5029200" cy="18288"/>
+          </a:xfrm>
+          <a:custGeom>
+            <a:avLst/>
+            <a:gdLst>
+              <a:gd name="connsiteX0" fmla="*/ 0 w 5029200"/>
+              <a:gd name="connsiteY0" fmla="*/ 0 h 18288"/>
+              <a:gd name="connsiteX1" fmla="*/ 528066 w 5029200"/>
+              <a:gd name="connsiteY1" fmla="*/ 0 h 18288"/>
+              <a:gd name="connsiteX2" fmla="*/ 1207008 w 5029200"/>
+              <a:gd name="connsiteY2" fmla="*/ 0 h 18288"/>
+              <a:gd name="connsiteX3" fmla="*/ 1785366 w 5029200"/>
+              <a:gd name="connsiteY3" fmla="*/ 0 h 18288"/>
+              <a:gd name="connsiteX4" fmla="*/ 2313432 w 5029200"/>
+              <a:gd name="connsiteY4" fmla="*/ 0 h 18288"/>
+              <a:gd name="connsiteX5" fmla="*/ 2992374 w 5029200"/>
+              <a:gd name="connsiteY5" fmla="*/ 0 h 18288"/>
+              <a:gd name="connsiteX6" fmla="*/ 3621024 w 5029200"/>
+              <a:gd name="connsiteY6" fmla="*/ 0 h 18288"/>
+              <a:gd name="connsiteX7" fmla="*/ 4249674 w 5029200"/>
+              <a:gd name="connsiteY7" fmla="*/ 0 h 18288"/>
+              <a:gd name="connsiteX8" fmla="*/ 5029200 w 5029200"/>
+              <a:gd name="connsiteY8" fmla="*/ 0 h 18288"/>
+              <a:gd name="connsiteX9" fmla="*/ 5029200 w 5029200"/>
+              <a:gd name="connsiteY9" fmla="*/ 18288 h 18288"/>
+              <a:gd name="connsiteX10" fmla="*/ 4501134 w 5029200"/>
+              <a:gd name="connsiteY10" fmla="*/ 18288 h 18288"/>
+              <a:gd name="connsiteX11" fmla="*/ 4023360 w 5029200"/>
+              <a:gd name="connsiteY11" fmla="*/ 18288 h 18288"/>
+              <a:gd name="connsiteX12" fmla="*/ 3344418 w 5029200"/>
+              <a:gd name="connsiteY12" fmla="*/ 18288 h 18288"/>
+              <a:gd name="connsiteX13" fmla="*/ 2816352 w 5029200"/>
+              <a:gd name="connsiteY13" fmla="*/ 18288 h 18288"/>
+              <a:gd name="connsiteX14" fmla="*/ 2137410 w 5029200"/>
+              <a:gd name="connsiteY14" fmla="*/ 18288 h 18288"/>
+              <a:gd name="connsiteX15" fmla="*/ 1408176 w 5029200"/>
+              <a:gd name="connsiteY15" fmla="*/ 18288 h 18288"/>
+              <a:gd name="connsiteX16" fmla="*/ 829818 w 5029200"/>
+              <a:gd name="connsiteY16" fmla="*/ 18288 h 18288"/>
+              <a:gd name="connsiteX17" fmla="*/ 0 w 5029200"/>
+              <a:gd name="connsiteY17" fmla="*/ 18288 h 18288"/>
+              <a:gd name="connsiteX18" fmla="*/ 0 w 5029200"/>
+              <a:gd name="connsiteY18" fmla="*/ 0 h 18288"/>
+            </a:gdLst>
+            <a:ahLst/>
+            <a:cxnLst>
+              <a:cxn ang="0">
+                <a:pos x="connsiteX0" y="connsiteY0"/>
+              </a:cxn>
+              <a:cxn ang="0">
+                <a:pos x="connsiteX1" y="connsiteY1"/>
+              </a:cxn>
+              <a:cxn ang="0">
+                <a:pos x="connsiteX2" y="connsiteY2"/>
+              </a:cxn>
+              <a:cxn ang="0">
+                <a:pos x="connsiteX3" y="connsiteY3"/>
+              </a:cxn>
+              <a:cxn ang="0">
+                <a:pos x="connsiteX4" y="connsiteY4"/>
+              </a:cxn>
+              <a:cxn ang="0">
+                <a:pos x="connsiteX5" y="connsiteY5"/>
+              </a:cxn>
+              <a:cxn ang="0">
+                <a:pos x="connsiteX6" y="connsiteY6"/>
+              </a:cxn>
+              <a:cxn ang="0">
+                <a:pos x="connsiteX7" y="connsiteY7"/>
+              </a:cxn>
+              <a:cxn ang="0">
+                <a:pos x="connsiteX8" y="connsiteY8"/>
+              </a:cxn>
+              <a:cxn ang="0">
+                <a:pos x="connsiteX9" y="connsiteY9"/>
+              </a:cxn>
+              <a:cxn ang="0">
+                <a:pos x="connsiteX10" y="connsiteY10"/>
+              </a:cxn>
+              <a:cxn ang="0">
+                <a:pos x="connsiteX11" y="connsiteY11"/>
+              </a:cxn>
+              <a:cxn ang="0">
+                <a:pos x="connsiteX12" y="connsiteY12"/>
+              </a:cxn>
+              <a:cxn ang="0">
+                <a:pos x="connsiteX13" y="connsiteY13"/>
+              </a:cxn>
+              <a:cxn ang="0">
+                <a:pos x="connsiteX14" y="connsiteY14"/>
+              </a:cxn>
+              <a:cxn ang="0">
+                <a:pos x="connsiteX15" y="connsiteY15"/>
+              </a:cxn>
+              <a:cxn ang="0">
+                <a:pos x="connsiteX16" y="connsiteY16"/>
+              </a:cxn>
+              <a:cxn ang="0">
+                <a:pos x="connsiteX17" y="connsiteY17"/>
+              </a:cxn>
+              <a:cxn ang="0">
+                <a:pos x="connsiteX18" y="connsiteY18"/>
+              </a:cxn>
+            </a:cxnLst>
+            <a:rect l="l" t="t" r="r" b="b"/>
+            <a:pathLst>
+              <a:path w="5029200" h="18288" fill="none" extrusionOk="0">
+                <a:moveTo>
+                  <a:pt x="0" y="0"/>
+                </a:moveTo>
+                <a:cubicBezTo>
+                  <a:pt x="142937" y="1696"/>
+                  <a:pt x="371859" y="12840"/>
+                  <a:pt x="528066" y="0"/>
+                </a:cubicBezTo>
+                <a:cubicBezTo>
+                  <a:pt x="684273" y="-12840"/>
+                  <a:pt x="928949" y="-5725"/>
+                  <a:pt x="1207008" y="0"/>
+                </a:cubicBezTo>
+                <a:cubicBezTo>
+                  <a:pt x="1485067" y="5725"/>
+                  <a:pt x="1562886" y="-21331"/>
+                  <a:pt x="1785366" y="0"/>
+                </a:cubicBezTo>
+                <a:cubicBezTo>
+                  <a:pt x="2007846" y="21331"/>
+                  <a:pt x="2056226" y="25221"/>
+                  <a:pt x="2313432" y="0"/>
+                </a:cubicBezTo>
+                <a:cubicBezTo>
+                  <a:pt x="2570638" y="-25221"/>
+                  <a:pt x="2732455" y="16294"/>
+                  <a:pt x="2992374" y="0"/>
+                </a:cubicBezTo>
+                <a:cubicBezTo>
+                  <a:pt x="3252293" y="-16294"/>
+                  <a:pt x="3319267" y="-29774"/>
+                  <a:pt x="3621024" y="0"/>
+                </a:cubicBezTo>
+                <a:cubicBezTo>
+                  <a:pt x="3922781" y="29774"/>
+                  <a:pt x="3998107" y="-1004"/>
+                  <a:pt x="4249674" y="0"/>
+                </a:cubicBezTo>
+                <a:cubicBezTo>
+                  <a:pt x="4501241" y="1004"/>
+                  <a:pt x="4792523" y="-4510"/>
+                  <a:pt x="5029200" y="0"/>
+                </a:cubicBezTo>
+                <a:cubicBezTo>
+                  <a:pt x="5029730" y="6954"/>
+                  <a:pt x="5029934" y="12839"/>
+                  <a:pt x="5029200" y="18288"/>
+                </a:cubicBezTo>
+                <a:cubicBezTo>
+                  <a:pt x="4805432" y="23154"/>
+                  <a:pt x="4715801" y="17034"/>
+                  <a:pt x="4501134" y="18288"/>
+                </a:cubicBezTo>
+                <a:cubicBezTo>
+                  <a:pt x="4286467" y="19542"/>
+                  <a:pt x="4193719" y="41701"/>
+                  <a:pt x="4023360" y="18288"/>
+                </a:cubicBezTo>
+                <a:cubicBezTo>
+                  <a:pt x="3853001" y="-5125"/>
+                  <a:pt x="3676466" y="16909"/>
+                  <a:pt x="3344418" y="18288"/>
+                </a:cubicBezTo>
+                <a:cubicBezTo>
+                  <a:pt x="3012370" y="19667"/>
+                  <a:pt x="2945824" y="14410"/>
+                  <a:pt x="2816352" y="18288"/>
+                </a:cubicBezTo>
+                <a:cubicBezTo>
+                  <a:pt x="2686880" y="22166"/>
+                  <a:pt x="2438351" y="13507"/>
+                  <a:pt x="2137410" y="18288"/>
+                </a:cubicBezTo>
+                <a:cubicBezTo>
+                  <a:pt x="1836469" y="23069"/>
+                  <a:pt x="1581391" y="46111"/>
+                  <a:pt x="1408176" y="18288"/>
+                </a:cubicBezTo>
+                <a:cubicBezTo>
+                  <a:pt x="1234961" y="-9535"/>
+                  <a:pt x="1040489" y="-7495"/>
+                  <a:pt x="829818" y="18288"/>
+                </a:cubicBezTo>
+                <a:cubicBezTo>
+                  <a:pt x="619147" y="44071"/>
+                  <a:pt x="238626" y="37568"/>
+                  <a:pt x="0" y="18288"/>
+                </a:cubicBezTo>
+                <a:cubicBezTo>
+                  <a:pt x="-570" y="9279"/>
+                  <a:pt x="132" y="5100"/>
+                  <a:pt x="0" y="0"/>
+                </a:cubicBezTo>
+                <a:close/>
+              </a:path>
+              <a:path w="5029200" h="18288" stroke="0" extrusionOk="0">
+                <a:moveTo>
+                  <a:pt x="0" y="0"/>
+                </a:moveTo>
+                <a:cubicBezTo>
+                  <a:pt x="165412" y="-21137"/>
+                  <a:pt x="322344" y="-21985"/>
+                  <a:pt x="578358" y="0"/>
+                </a:cubicBezTo>
+                <a:cubicBezTo>
+                  <a:pt x="834372" y="21985"/>
+                  <a:pt x="907099" y="-19195"/>
+                  <a:pt x="1056132" y="0"/>
+                </a:cubicBezTo>
+                <a:cubicBezTo>
+                  <a:pt x="1205165" y="19195"/>
+                  <a:pt x="1612834" y="-24928"/>
+                  <a:pt x="1785366" y="0"/>
+                </a:cubicBezTo>
+                <a:cubicBezTo>
+                  <a:pt x="1957898" y="24928"/>
+                  <a:pt x="2149044" y="19108"/>
+                  <a:pt x="2363724" y="0"/>
+                </a:cubicBezTo>
+                <a:cubicBezTo>
+                  <a:pt x="2578404" y="-19108"/>
+                  <a:pt x="2759981" y="-21788"/>
+                  <a:pt x="2942082" y="0"/>
+                </a:cubicBezTo>
+                <a:cubicBezTo>
+                  <a:pt x="3124183" y="21788"/>
+                  <a:pt x="3482217" y="8836"/>
+                  <a:pt x="3671316" y="0"/>
+                </a:cubicBezTo>
+                <a:cubicBezTo>
+                  <a:pt x="3860415" y="-8836"/>
+                  <a:pt x="4058665" y="-25048"/>
+                  <a:pt x="4199382" y="0"/>
+                </a:cubicBezTo>
+                <a:cubicBezTo>
+                  <a:pt x="4340099" y="25048"/>
+                  <a:pt x="4735096" y="-22088"/>
+                  <a:pt x="5029200" y="0"/>
+                </a:cubicBezTo>
+                <a:cubicBezTo>
+                  <a:pt x="5028517" y="5414"/>
+                  <a:pt x="5028480" y="12510"/>
+                  <a:pt x="5029200" y="18288"/>
+                </a:cubicBezTo>
+                <a:cubicBezTo>
+                  <a:pt x="4891577" y="31493"/>
+                  <a:pt x="4684146" y="-2509"/>
+                  <a:pt x="4501134" y="18288"/>
+                </a:cubicBezTo>
+                <a:cubicBezTo>
+                  <a:pt x="4318122" y="39085"/>
+                  <a:pt x="4030703" y="3672"/>
+                  <a:pt x="3872484" y="18288"/>
+                </a:cubicBezTo>
+                <a:cubicBezTo>
+                  <a:pt x="3714265" y="32905"/>
+                  <a:pt x="3546134" y="7501"/>
+                  <a:pt x="3294126" y="18288"/>
+                </a:cubicBezTo>
+                <a:cubicBezTo>
+                  <a:pt x="3042118" y="29075"/>
+                  <a:pt x="2912116" y="11153"/>
+                  <a:pt x="2564892" y="18288"/>
+                </a:cubicBezTo>
+                <a:cubicBezTo>
+                  <a:pt x="2217668" y="25423"/>
+                  <a:pt x="2095118" y="11659"/>
+                  <a:pt x="1835658" y="18288"/>
+                </a:cubicBezTo>
+                <a:cubicBezTo>
+                  <a:pt x="1576198" y="24917"/>
+                  <a:pt x="1500897" y="19889"/>
+                  <a:pt x="1307592" y="18288"/>
+                </a:cubicBezTo>
+                <a:cubicBezTo>
+                  <a:pt x="1114287" y="16687"/>
+                  <a:pt x="961527" y="47453"/>
+                  <a:pt x="678942" y="18288"/>
+                </a:cubicBezTo>
+                <a:cubicBezTo>
+                  <a:pt x="396357" y="-10877"/>
+                  <a:pt x="271066" y="23005"/>
+                  <a:pt x="0" y="18288"/>
+                </a:cubicBezTo>
+                <a:cubicBezTo>
+                  <a:pt x="-306" y="11061"/>
+                  <a:pt x="-655" y="7751"/>
+                  <a:pt x="0" y="0"/>
+                </a:cubicBezTo>
+                <a:close/>
+              </a:path>
+            </a:pathLst>
+          </a:custGeom>
+          <a:solidFill>
+            <a:srgbClr val="FFFFFF"/>
+          </a:solidFill>
+          <a:ln w="38100" cap="rnd">
+            <a:solidFill>
+              <a:srgbClr val="FFFFFF"/>
+            </a:solidFill>
+            <a:round/>
+            <a:extLst>
+              <a:ext uri="{C807C97D-BFC1-408E-A445-0C87EB9F89A2}">
+                <ask:lineSketchStyleProps xmlns:ask="http://schemas.microsoft.com/office/drawing/2018/sketchyshapes" sd="1219033472">
+                  <a:prstGeom prst="rect">
+                    <a:avLst/>
+                  </a:prstGeom>
+                  <ask:type>
+                    <ask:lineSketchFreehand/>
+                  </ask:type>
+                </ask:lineSketchStyleProps>
+              </a:ext>
+            </a:extLst>
+          </a:ln>
+        </p:spPr>
+        <p:style>
+          <a:lnRef idx="2">
+            <a:schemeClr val="accent1">
+              <a:shade val="50000"/>
+            </a:schemeClr>
+          </a:lnRef>
+          <a:fillRef idx="1">
+            <a:schemeClr val="accent1"/>
+          </a:fillRef>
+          <a:effectRef idx="0">
+            <a:schemeClr val="accent1"/>
+          </a:effectRef>
+          <a:fontRef idx="minor">
+            <a:schemeClr val="lt1"/>
+          </a:fontRef>
+        </p:style>
+        <p:txBody>
+          <a:bodyPr rtlCol="0" anchor="ctr"/>
+          <a:lstStyle/>
+          <a:p>
+            <a:pPr algn="ctr"/>
+            <a:endParaRPr lang="en-US"/>
+          </a:p>
+        </p:txBody>
+      </p:sp>
+      <p:sp>
+        <p:nvSpPr>
+          <p:cNvPr id="3" name="Content Placeholder 2"/>
+          <p:cNvSpPr>
+            <a:spLocks noGrp="1"/>
+          </p:cNvSpPr>
+          <p:nvPr>
+            <p:ph idx="1"/>
+          </p:nvPr>
+        </p:nvSpPr>
+        <p:spPr>
+          <a:xfrm>
+            <a:off x="5759354" y="2798064"/>
+            <a:ext cx="5461095" cy="3417611"/>
+          </a:xfrm>
+        </p:spPr>
+        <p:txBody>
+          <a:bodyPr anchor="t">
+            <a:normAutofit/>
+          </a:bodyPr>
+          <a:lstStyle/>
+          <a:p>
+            <a:r>
+              <a:rPr lang="en-IN" sz="2200">
+                <a:solidFill>
+                  <a:srgbClr val="FFFFFF"/>
+                </a:solidFill>
+              </a:rPr>
+              <a:t>Employee attrition increases recruitment costs and disrupts organizational workflows. This presentation explores machine learning models for attrition prediction, using techniques to address class imbalance, feature selection, and hyperparameter tuning.</a:t>
+            </a:r>
+          </a:p>
+        </p:txBody>
+      </p:sp>
+    </p:spTree>
+  </p:cSld>
+  <p:clrMapOvr>
+    <a:masterClrMapping/>
+  </p:clrMapOvr>
+</p:sld>
+</file>
+
+<file path=ppt/slides/slide3.xml><?xml version="1.0" encoding="utf-8"?>
+<p:sld xmlns:a="http://schemas.openxmlformats.org/drawingml/2006/main" xmlns:r="http://schemas.openxmlformats.org/officeDocument/2006/relationships" xmlns:p="http://schemas.openxmlformats.org/presentationml/2006/main">
+  <p:cSld>
+    <p:bg>
+      <p:bgPr>
+        <a:solidFill>
+          <a:schemeClr val="bg1"/>
+        </a:solidFill>
+        <a:effectLst/>
+      </p:bgPr>
+    </p:bg>
+    <p:spTree>
+      <p:nvGrpSpPr>
+        <p:cNvPr id="1" name=""/>
+        <p:cNvGrpSpPr/>
+        <p:nvPr/>
+      </p:nvGrpSpPr>
+      <p:grpSpPr>
+        <a:xfrm>
+          <a:off x="0" y="0"/>
+          <a:ext cx="0" cy="0"/>
+          <a:chOff x="0" y="0"/>
+          <a:chExt cx="0" cy="0"/>
+        </a:xfrm>
+      </p:grpSpPr>
+      <p:sp useBgFill="1">
+        <p:nvSpPr>
+          <p:cNvPr id="15" name="Rectangle 14">
+            <a:extLst>
+              <a:ext uri="{FF2B5EF4-FFF2-40B4-BE49-F238E27FC236}">
+                <a16:creationId xmlns:a16="http://schemas.microsoft.com/office/drawing/2014/main" id="{85F55C16-BC21-49EF-A4FF-C3155BB93BD3}"/>
+              </a:ext>
+              <a:ext uri="{C183D7F6-B498-43B3-948B-1728B52AA6E4}">
+                <adec:decorative xmlns:adec="http://schemas.microsoft.com/office/drawing/2017/decorative" val="1"/>
+              </a:ext>
+            </a:extLst>
+          </p:cNvPr>
+          <p:cNvSpPr>
+            <a:spLocks noGrp="1" noRot="1" noChangeAspect="1" noMove="1" noResize="1" noEditPoints="1" noAdjustHandles="1" noChangeArrowheads="1" noChangeShapeType="1" noTextEdit="1"/>
+          </p:cNvSpPr>
+          <p:nvPr>
+            <p:extLst>
+              <p:ext uri="{386F3935-93C4-4BCD-93E2-E3B085C9AB24}">
+                <p16:designElem xmlns:p16="http://schemas.microsoft.com/office/powerpoint/2015/main" val="1"/>
+              </p:ext>
+            </p:extLst>
+          </p:nvPr>
+        </p:nvSpPr>
+        <p:spPr>
+          <a:xfrm>
+            <a:off x="0" y="0"/>
             <a:ext cx="12188952" cy="6858000"/>
           </a:xfrm>
           <a:prstGeom prst="rect">
@@ -21676,21 +23025,768 @@
         </p:nvSpPr>
         <p:spPr>
           <a:xfrm>
-            <a:off x="838200" y="3513931"/>
-            <a:ext cx="3143250" cy="2601119"/>
+            <a:off x="6248400" y="365125"/>
+            <a:ext cx="5105398" cy="1952744"/>
           </a:xfrm>
         </p:spPr>
         <p:txBody>
-          <a:bodyPr anchor="t">
+          <a:bodyPr>
             <a:normAutofit/>
           </a:bodyPr>
           <a:lstStyle/>
           <a:p>
-            <a:pPr algn="ctr"/>
             <a:r>
-              <a:rPr lang="en-US" sz="4000"/>
+              <a:rPr lang="en-US"/>
               <a:t>Problem Statement </a:t>
             </a:r>
+          </a:p>
+        </p:txBody>
+      </p:sp>
+      <p:sp>
+        <p:nvSpPr>
+          <p:cNvPr id="17" name="Freeform: Shape 16">
+            <a:extLst>
+              <a:ext uri="{FF2B5EF4-FFF2-40B4-BE49-F238E27FC236}">
+                <a16:creationId xmlns:a16="http://schemas.microsoft.com/office/drawing/2014/main" id="{0C5F069E-AFE6-4825-8945-46F2918A5019}"/>
+              </a:ext>
+              <a:ext uri="{C183D7F6-B498-43B3-948B-1728B52AA6E4}">
+                <adec:decorative xmlns:adec="http://schemas.microsoft.com/office/drawing/2017/decorative" val="1"/>
+              </a:ext>
+            </a:extLst>
+          </p:cNvPr>
+          <p:cNvSpPr>
+            <a:spLocks noGrp="1" noRot="1" noChangeAspect="1" noMove="1" noResize="1" noEditPoints="1" noAdjustHandles="1" noChangeArrowheads="1" noChangeShapeType="1" noTextEdit="1"/>
+          </p:cNvSpPr>
+          <p:nvPr>
+            <p:extLst>
+              <p:ext uri="{386F3935-93C4-4BCD-93E2-E3B085C9AB24}">
+                <p16:designElem xmlns:p16="http://schemas.microsoft.com/office/powerpoint/2015/main" val="1"/>
+              </p:ext>
+            </p:extLst>
+          </p:nvPr>
+        </p:nvSpPr>
+        <p:spPr>
+          <a:xfrm>
+            <a:off x="3" y="0"/>
+            <a:ext cx="6116569" cy="6858000"/>
+          </a:xfrm>
+          <a:custGeom>
+            <a:avLst/>
+            <a:gdLst>
+              <a:gd name="connsiteX0" fmla="*/ 0 w 6116569"/>
+              <a:gd name="connsiteY0" fmla="*/ 0 h 6879321"/>
+              <a:gd name="connsiteX1" fmla="*/ 2935851 w 6116569"/>
+              <a:gd name="connsiteY1" fmla="*/ 0 h 6879321"/>
+              <a:gd name="connsiteX2" fmla="*/ 3238280 w 6116569"/>
+              <a:gd name="connsiteY2" fmla="*/ 31980 h 6879321"/>
+              <a:gd name="connsiteX3" fmla="*/ 3660541 w 6116569"/>
+              <a:gd name="connsiteY3" fmla="*/ 550772 h 6879321"/>
+              <a:gd name="connsiteX4" fmla="*/ 3808902 w 6116569"/>
+              <a:gd name="connsiteY4" fmla="*/ 589860 h 6879321"/>
+              <a:gd name="connsiteX5" fmla="*/ 4413762 w 6116569"/>
+              <a:gd name="connsiteY5" fmla="*/ 625393 h 6879321"/>
+              <a:gd name="connsiteX6" fmla="*/ 4567830 w 6116569"/>
+              <a:gd name="connsiteY6" fmla="*/ 721333 h 6879321"/>
+              <a:gd name="connsiteX7" fmla="*/ 4171247 w 6116569"/>
+              <a:gd name="connsiteY7" fmla="*/ 792401 h 6879321"/>
+              <a:gd name="connsiteX8" fmla="*/ 4376671 w 6116569"/>
+              <a:gd name="connsiteY8" fmla="*/ 842148 h 6879321"/>
+              <a:gd name="connsiteX9" fmla="*/ 4527887 w 6116569"/>
+              <a:gd name="connsiteY9" fmla="*/ 813722 h 6879321"/>
+              <a:gd name="connsiteX10" fmla="*/ 4633452 w 6116569"/>
+              <a:gd name="connsiteY10" fmla="*/ 799508 h 6879321"/>
+              <a:gd name="connsiteX11" fmla="*/ 4947293 w 6116569"/>
+              <a:gd name="connsiteY11" fmla="*/ 870576 h 6879321"/>
+              <a:gd name="connsiteX12" fmla="*/ 5263988 w 6116569"/>
+              <a:gd name="connsiteY12" fmla="*/ 820828 h 6879321"/>
+              <a:gd name="connsiteX13" fmla="*/ 5249723 w 6116569"/>
+              <a:gd name="connsiteY13" fmla="*/ 895449 h 6879321"/>
+              <a:gd name="connsiteX14" fmla="*/ 4744723 w 6116569"/>
+              <a:gd name="connsiteY14" fmla="*/ 1197485 h 6879321"/>
+              <a:gd name="connsiteX15" fmla="*/ 4767548 w 6116569"/>
+              <a:gd name="connsiteY15" fmla="*/ 1346727 h 6879321"/>
+              <a:gd name="connsiteX16" fmla="*/ 4539299 w 6116569"/>
+              <a:gd name="connsiteY16" fmla="*/ 1421348 h 6879321"/>
+              <a:gd name="connsiteX17" fmla="*/ 4607773 w 6116569"/>
+              <a:gd name="connsiteY17" fmla="*/ 1485309 h 6879321"/>
+              <a:gd name="connsiteX18" fmla="*/ 4579242 w 6116569"/>
+              <a:gd name="connsiteY18" fmla="*/ 1535055 h 6879321"/>
+              <a:gd name="connsiteX19" fmla="*/ 5278255 w 6116569"/>
+              <a:gd name="connsiteY19" fmla="*/ 1609676 h 6879321"/>
+              <a:gd name="connsiteX20" fmla="*/ 5771843 w 6116569"/>
+              <a:gd name="connsiteY20" fmla="*/ 1630997 h 6879321"/>
+              <a:gd name="connsiteX21" fmla="*/ 6105656 w 6116569"/>
+              <a:gd name="connsiteY21" fmla="*/ 1748257 h 6879321"/>
+              <a:gd name="connsiteX22" fmla="*/ 5691955 w 6116569"/>
+              <a:gd name="connsiteY22" fmla="*/ 2167555 h 6879321"/>
+              <a:gd name="connsiteX23" fmla="*/ 5475118 w 6116569"/>
+              <a:gd name="connsiteY23" fmla="*/ 2348776 h 6879321"/>
+              <a:gd name="connsiteX24" fmla="*/ 5826051 w 6116569"/>
+              <a:gd name="connsiteY24" fmla="*/ 2291922 h 6879321"/>
+              <a:gd name="connsiteX25" fmla="*/ 5552153 w 6116569"/>
+              <a:gd name="connsiteY25" fmla="*/ 2597513 h 6879321"/>
+              <a:gd name="connsiteX26" fmla="*/ 5603508 w 6116569"/>
+              <a:gd name="connsiteY26" fmla="*/ 2647260 h 6879321"/>
+              <a:gd name="connsiteX27" fmla="*/ 5700515 w 6116569"/>
+              <a:gd name="connsiteY27" fmla="*/ 2679240 h 6879321"/>
+              <a:gd name="connsiteX28" fmla="*/ 5246870 w 6116569"/>
+              <a:gd name="connsiteY28" fmla="*/ 2888889 h 6879321"/>
+              <a:gd name="connsiteX29" fmla="*/ 4836022 w 6116569"/>
+              <a:gd name="connsiteY29" fmla="*/ 3169605 h 6879321"/>
+              <a:gd name="connsiteX30" fmla="*/ 4736163 w 6116569"/>
+              <a:gd name="connsiteY30" fmla="*/ 3233565 h 6879321"/>
+              <a:gd name="connsiteX31" fmla="*/ 4853141 w 6116569"/>
+              <a:gd name="connsiteY31" fmla="*/ 3233565 h 6879321"/>
+              <a:gd name="connsiteX32" fmla="*/ 4944440 w 6116569"/>
+              <a:gd name="connsiteY32" fmla="*/ 3226459 h 6879321"/>
+              <a:gd name="connsiteX33" fmla="*/ 5109921 w 6116569"/>
+              <a:gd name="connsiteY33" fmla="*/ 3283313 h 6879321"/>
+              <a:gd name="connsiteX34" fmla="*/ 5694809 w 6116569"/>
+              <a:gd name="connsiteY34" fmla="*/ 3141178 h 6879321"/>
+              <a:gd name="connsiteX35" fmla="*/ 5566419 w 6116569"/>
+              <a:gd name="connsiteY35" fmla="*/ 3301079 h 6879321"/>
+              <a:gd name="connsiteX36" fmla="*/ 5415203 w 6116569"/>
+              <a:gd name="connsiteY36" fmla="*/ 3397020 h 6879321"/>
+              <a:gd name="connsiteX37" fmla="*/ 5612068 w 6116569"/>
+              <a:gd name="connsiteY37" fmla="*/ 3432554 h 6879321"/>
+              <a:gd name="connsiteX38" fmla="*/ 5206927 w 6116569"/>
+              <a:gd name="connsiteY38" fmla="*/ 3599562 h 6879321"/>
+              <a:gd name="connsiteX39" fmla="*/ 5301079 w 6116569"/>
+              <a:gd name="connsiteY39" fmla="*/ 3723930 h 6879321"/>
+              <a:gd name="connsiteX40" fmla="*/ 4507915 w 6116569"/>
+              <a:gd name="connsiteY40" fmla="*/ 4306683 h 6879321"/>
+              <a:gd name="connsiteX41" fmla="*/ 3982942 w 6116569"/>
+              <a:gd name="connsiteY41" fmla="*/ 4587399 h 6879321"/>
+              <a:gd name="connsiteX42" fmla="*/ 4185513 w 6116569"/>
+              <a:gd name="connsiteY42" fmla="*/ 4541205 h 6879321"/>
+              <a:gd name="connsiteX43" fmla="*/ 5212633 w 6116569"/>
+              <a:gd name="connsiteY43" fmla="*/ 4455924 h 6879321"/>
+              <a:gd name="connsiteX44" fmla="*/ 5312492 w 6116569"/>
+              <a:gd name="connsiteY44" fmla="*/ 4473691 h 6879321"/>
+              <a:gd name="connsiteX45" fmla="*/ 4596361 w 6116569"/>
+              <a:gd name="connsiteY45" fmla="*/ 4818368 h 6879321"/>
+              <a:gd name="connsiteX46" fmla="*/ 4873113 w 6116569"/>
+              <a:gd name="connsiteY46" fmla="*/ 4885882 h 6879321"/>
+              <a:gd name="connsiteX47" fmla="*/ 4935881 w 6116569"/>
+              <a:gd name="connsiteY47" fmla="*/ 4914309 h 6879321"/>
+              <a:gd name="connsiteX48" fmla="*/ 4873113 w 6116569"/>
+              <a:gd name="connsiteY48" fmla="*/ 5003143 h 6879321"/>
+              <a:gd name="connsiteX49" fmla="*/ 4721898 w 6116569"/>
+              <a:gd name="connsiteY49" fmla="*/ 5095530 h 6879321"/>
+              <a:gd name="connsiteX50" fmla="*/ 5132745 w 6116569"/>
+              <a:gd name="connsiteY50" fmla="*/ 4949842 h 6879321"/>
+              <a:gd name="connsiteX51" fmla="*/ 5101362 w 6116569"/>
+              <a:gd name="connsiteY51" fmla="*/ 5081317 h 6879321"/>
+              <a:gd name="connsiteX52" fmla="*/ 5138452 w 6116569"/>
+              <a:gd name="connsiteY52" fmla="*/ 5198578 h 6879321"/>
+              <a:gd name="connsiteX53" fmla="*/ 4904497 w 6116569"/>
+              <a:gd name="connsiteY53" fmla="*/ 5362033 h 6879321"/>
+              <a:gd name="connsiteX54" fmla="*/ 4579242 w 6116569"/>
+              <a:gd name="connsiteY54" fmla="*/ 5674729 h 6879321"/>
+              <a:gd name="connsiteX55" fmla="*/ 4253988 w 6116569"/>
+              <a:gd name="connsiteY55" fmla="*/ 5884379 h 6879321"/>
+              <a:gd name="connsiteX56" fmla="*/ 3985795 w 6116569"/>
+              <a:gd name="connsiteY56" fmla="*/ 6069153 h 6879321"/>
+              <a:gd name="connsiteX57" fmla="*/ 4231163 w 6116569"/>
+              <a:gd name="connsiteY57" fmla="*/ 6030066 h 6879321"/>
+              <a:gd name="connsiteX58" fmla="*/ 3814609 w 6116569"/>
+              <a:gd name="connsiteY58" fmla="*/ 6317889 h 6879321"/>
+              <a:gd name="connsiteX59" fmla="*/ 3751840 w 6116569"/>
+              <a:gd name="connsiteY59" fmla="*/ 6339209 h 6879321"/>
+              <a:gd name="connsiteX60" fmla="*/ 3089919 w 6116569"/>
+              <a:gd name="connsiteY60" fmla="*/ 6563071 h 6879321"/>
+              <a:gd name="connsiteX61" fmla="*/ 2961529 w 6116569"/>
+              <a:gd name="connsiteY61" fmla="*/ 6662566 h 6879321"/>
+              <a:gd name="connsiteX62" fmla="*/ 3107038 w 6116569"/>
+              <a:gd name="connsiteY62" fmla="*/ 6673226 h 6879321"/>
+              <a:gd name="connsiteX63" fmla="*/ 3594919 w 6116569"/>
+              <a:gd name="connsiteY63" fmla="*/ 6591499 h 6879321"/>
+              <a:gd name="connsiteX64" fmla="*/ 3261106 w 6116569"/>
+              <a:gd name="connsiteY64" fmla="*/ 6726527 h 6879321"/>
+              <a:gd name="connsiteX65" fmla="*/ 3620597 w 6116569"/>
+              <a:gd name="connsiteY65" fmla="*/ 6740740 h 6879321"/>
+              <a:gd name="connsiteX66" fmla="*/ 3703337 w 6116569"/>
+              <a:gd name="connsiteY66" fmla="*/ 6826020 h 6879321"/>
+              <a:gd name="connsiteX67" fmla="*/ 3689072 w 6116569"/>
+              <a:gd name="connsiteY67" fmla="*/ 6879321 h 6879321"/>
+              <a:gd name="connsiteX68" fmla="*/ 0 w 6116569"/>
+              <a:gd name="connsiteY68" fmla="*/ 6879321 h 6879321"/>
+            </a:gdLst>
+            <a:ahLst/>
+            <a:cxnLst>
+              <a:cxn ang="0">
+                <a:pos x="connsiteX0" y="connsiteY0"/>
+              </a:cxn>
+              <a:cxn ang="0">
+                <a:pos x="connsiteX1" y="connsiteY1"/>
+              </a:cxn>
+              <a:cxn ang="0">
+                <a:pos x="connsiteX2" y="connsiteY2"/>
+              </a:cxn>
+              <a:cxn ang="0">
+                <a:pos x="connsiteX3" y="connsiteY3"/>
+              </a:cxn>
+              <a:cxn ang="0">
+                <a:pos x="connsiteX4" y="connsiteY4"/>
+              </a:cxn>
+              <a:cxn ang="0">
+                <a:pos x="connsiteX5" y="connsiteY5"/>
+              </a:cxn>
+              <a:cxn ang="0">
+                <a:pos x="connsiteX6" y="connsiteY6"/>
+              </a:cxn>
+              <a:cxn ang="0">
+                <a:pos x="connsiteX7" y="connsiteY7"/>
+              </a:cxn>
+              <a:cxn ang="0">
+                <a:pos x="connsiteX8" y="connsiteY8"/>
+              </a:cxn>
+              <a:cxn ang="0">
+                <a:pos x="connsiteX9" y="connsiteY9"/>
+              </a:cxn>
+              <a:cxn ang="0">
+                <a:pos x="connsiteX10" y="connsiteY10"/>
+              </a:cxn>
+              <a:cxn ang="0">
+                <a:pos x="connsiteX11" y="connsiteY11"/>
+              </a:cxn>
+              <a:cxn ang="0">
+                <a:pos x="connsiteX12" y="connsiteY12"/>
+              </a:cxn>
+              <a:cxn ang="0">
+                <a:pos x="connsiteX13" y="connsiteY13"/>
+              </a:cxn>
+              <a:cxn ang="0">
+                <a:pos x="connsiteX14" y="connsiteY14"/>
+              </a:cxn>
+              <a:cxn ang="0">
+                <a:pos x="connsiteX15" y="connsiteY15"/>
+              </a:cxn>
+              <a:cxn ang="0">
+                <a:pos x="connsiteX16" y="connsiteY16"/>
+              </a:cxn>
+              <a:cxn ang="0">
+                <a:pos x="connsiteX17" y="connsiteY17"/>
+              </a:cxn>
+              <a:cxn ang="0">
+                <a:pos x="connsiteX18" y="connsiteY18"/>
+              </a:cxn>
+              <a:cxn ang="0">
+                <a:pos x="connsiteX19" y="connsiteY19"/>
+              </a:cxn>
+              <a:cxn ang="0">
+                <a:pos x="connsiteX20" y="connsiteY20"/>
+              </a:cxn>
+              <a:cxn ang="0">
+                <a:pos x="connsiteX21" y="connsiteY21"/>
+              </a:cxn>
+              <a:cxn ang="0">
+                <a:pos x="connsiteX22" y="connsiteY22"/>
+              </a:cxn>
+              <a:cxn ang="0">
+                <a:pos x="connsiteX23" y="connsiteY23"/>
+              </a:cxn>
+              <a:cxn ang="0">
+                <a:pos x="connsiteX24" y="connsiteY24"/>
+              </a:cxn>
+              <a:cxn ang="0">
+                <a:pos x="connsiteX25" y="connsiteY25"/>
+              </a:cxn>
+              <a:cxn ang="0">
+                <a:pos x="connsiteX26" y="connsiteY26"/>
+              </a:cxn>
+              <a:cxn ang="0">
+                <a:pos x="connsiteX27" y="connsiteY27"/>
+              </a:cxn>
+              <a:cxn ang="0">
+                <a:pos x="connsiteX28" y="connsiteY28"/>
+              </a:cxn>
+              <a:cxn ang="0">
+                <a:pos x="connsiteX29" y="connsiteY29"/>
+              </a:cxn>
+              <a:cxn ang="0">
+                <a:pos x="connsiteX30" y="connsiteY30"/>
+              </a:cxn>
+              <a:cxn ang="0">
+                <a:pos x="connsiteX31" y="connsiteY31"/>
+              </a:cxn>
+              <a:cxn ang="0">
+                <a:pos x="connsiteX32" y="connsiteY32"/>
+              </a:cxn>
+              <a:cxn ang="0">
+                <a:pos x="connsiteX33" y="connsiteY33"/>
+              </a:cxn>
+              <a:cxn ang="0">
+                <a:pos x="connsiteX34" y="connsiteY34"/>
+              </a:cxn>
+              <a:cxn ang="0">
+                <a:pos x="connsiteX35" y="connsiteY35"/>
+              </a:cxn>
+              <a:cxn ang="0">
+                <a:pos x="connsiteX36" y="connsiteY36"/>
+              </a:cxn>
+              <a:cxn ang="0">
+                <a:pos x="connsiteX37" y="connsiteY37"/>
+              </a:cxn>
+              <a:cxn ang="0">
+                <a:pos x="connsiteX38" y="connsiteY38"/>
+              </a:cxn>
+              <a:cxn ang="0">
+                <a:pos x="connsiteX39" y="connsiteY39"/>
+              </a:cxn>
+              <a:cxn ang="0">
+                <a:pos x="connsiteX40" y="connsiteY40"/>
+              </a:cxn>
+              <a:cxn ang="0">
+                <a:pos x="connsiteX41" y="connsiteY41"/>
+              </a:cxn>
+              <a:cxn ang="0">
+                <a:pos x="connsiteX42" y="connsiteY42"/>
+              </a:cxn>
+              <a:cxn ang="0">
+                <a:pos x="connsiteX43" y="connsiteY43"/>
+              </a:cxn>
+              <a:cxn ang="0">
+                <a:pos x="connsiteX44" y="connsiteY44"/>
+              </a:cxn>
+              <a:cxn ang="0">
+                <a:pos x="connsiteX45" y="connsiteY45"/>
+              </a:cxn>
+              <a:cxn ang="0">
+                <a:pos x="connsiteX46" y="connsiteY46"/>
+              </a:cxn>
+              <a:cxn ang="0">
+                <a:pos x="connsiteX47" y="connsiteY47"/>
+              </a:cxn>
+              <a:cxn ang="0">
+                <a:pos x="connsiteX48" y="connsiteY48"/>
+              </a:cxn>
+              <a:cxn ang="0">
+                <a:pos x="connsiteX49" y="connsiteY49"/>
+              </a:cxn>
+              <a:cxn ang="0">
+                <a:pos x="connsiteX50" y="connsiteY50"/>
+              </a:cxn>
+              <a:cxn ang="0">
+                <a:pos x="connsiteX51" y="connsiteY51"/>
+              </a:cxn>
+              <a:cxn ang="0">
+                <a:pos x="connsiteX52" y="connsiteY52"/>
+              </a:cxn>
+              <a:cxn ang="0">
+                <a:pos x="connsiteX53" y="connsiteY53"/>
+              </a:cxn>
+              <a:cxn ang="0">
+                <a:pos x="connsiteX54" y="connsiteY54"/>
+              </a:cxn>
+              <a:cxn ang="0">
+                <a:pos x="connsiteX55" y="connsiteY55"/>
+              </a:cxn>
+              <a:cxn ang="0">
+                <a:pos x="connsiteX56" y="connsiteY56"/>
+              </a:cxn>
+              <a:cxn ang="0">
+                <a:pos x="connsiteX57" y="connsiteY57"/>
+              </a:cxn>
+              <a:cxn ang="0">
+                <a:pos x="connsiteX58" y="connsiteY58"/>
+              </a:cxn>
+              <a:cxn ang="0">
+                <a:pos x="connsiteX59" y="connsiteY59"/>
+              </a:cxn>
+              <a:cxn ang="0">
+                <a:pos x="connsiteX60" y="connsiteY60"/>
+              </a:cxn>
+              <a:cxn ang="0">
+                <a:pos x="connsiteX61" y="connsiteY61"/>
+              </a:cxn>
+              <a:cxn ang="0">
+                <a:pos x="connsiteX62" y="connsiteY62"/>
+              </a:cxn>
+              <a:cxn ang="0">
+                <a:pos x="connsiteX63" y="connsiteY63"/>
+              </a:cxn>
+              <a:cxn ang="0">
+                <a:pos x="connsiteX64" y="connsiteY64"/>
+              </a:cxn>
+              <a:cxn ang="0">
+                <a:pos x="connsiteX65" y="connsiteY65"/>
+              </a:cxn>
+              <a:cxn ang="0">
+                <a:pos x="connsiteX66" y="connsiteY66"/>
+              </a:cxn>
+              <a:cxn ang="0">
+                <a:pos x="connsiteX67" y="connsiteY67"/>
+              </a:cxn>
+              <a:cxn ang="0">
+                <a:pos x="connsiteX68" y="connsiteY68"/>
+              </a:cxn>
+            </a:cxnLst>
+            <a:rect l="l" t="t" r="r" b="b"/>
+            <a:pathLst>
+              <a:path w="6116569" h="6879321">
+                <a:moveTo>
+                  <a:pt x="0" y="0"/>
+                </a:moveTo>
+                <a:lnTo>
+                  <a:pt x="2935851" y="0"/>
+                </a:lnTo>
+                <a:cubicBezTo>
+                  <a:pt x="3035710" y="10660"/>
+                  <a:pt x="3138421" y="17767"/>
+                  <a:pt x="3238280" y="31980"/>
+                </a:cubicBezTo>
+                <a:cubicBezTo>
+                  <a:pt x="3817462" y="106602"/>
+                  <a:pt x="3127009" y="277163"/>
+                  <a:pt x="3660541" y="550772"/>
+                </a:cubicBezTo>
+                <a:cubicBezTo>
+                  <a:pt x="3706191" y="575645"/>
+                  <a:pt x="3757546" y="579199"/>
+                  <a:pt x="3808902" y="589860"/>
+                </a:cubicBezTo>
+                <a:cubicBezTo>
+                  <a:pt x="4008620" y="625393"/>
+                  <a:pt x="4211192" y="618286"/>
+                  <a:pt x="4413762" y="625393"/>
+                </a:cubicBezTo>
+                <a:cubicBezTo>
+                  <a:pt x="4465118" y="628946"/>
+                  <a:pt x="4525033" y="625393"/>
+                  <a:pt x="4567830" y="721333"/>
+                </a:cubicBezTo>
+                <a:cubicBezTo>
+                  <a:pt x="4425175" y="724888"/>
+                  <a:pt x="4305344" y="731994"/>
+                  <a:pt x="4171247" y="792401"/>
+                </a:cubicBezTo>
+                <a:cubicBezTo>
+                  <a:pt x="4239722" y="859916"/>
+                  <a:pt x="4322462" y="795955"/>
+                  <a:pt x="4376671" y="842148"/>
+                </a:cubicBezTo>
+                <a:cubicBezTo>
+                  <a:pt x="4428027" y="888342"/>
+                  <a:pt x="4470824" y="891896"/>
+                  <a:pt x="4527887" y="813722"/>
+                </a:cubicBezTo>
+                <a:cubicBezTo>
+                  <a:pt x="4556417" y="774634"/>
+                  <a:pt x="4604920" y="778187"/>
+                  <a:pt x="4633452" y="799508"/>
+                </a:cubicBezTo>
+                <a:cubicBezTo>
+                  <a:pt x="4781813" y="913216"/>
+                  <a:pt x="4778960" y="909662"/>
+                  <a:pt x="4947293" y="870576"/>
+                </a:cubicBezTo>
+                <a:cubicBezTo>
+                  <a:pt x="5055712" y="845701"/>
+                  <a:pt x="5166983" y="806615"/>
+                  <a:pt x="5263988" y="820828"/>
+                </a:cubicBezTo>
+                <a:cubicBezTo>
+                  <a:pt x="5275401" y="867022"/>
+                  <a:pt x="5263988" y="888342"/>
+                  <a:pt x="5249723" y="895449"/>
+                </a:cubicBezTo>
+                <a:cubicBezTo>
+                  <a:pt x="5021475" y="1005604"/>
+                  <a:pt x="4975825" y="1122864"/>
+                  <a:pt x="4744723" y="1197485"/>
+                </a:cubicBezTo>
+                <a:cubicBezTo>
+                  <a:pt x="4724751" y="1268552"/>
+                  <a:pt x="4807491" y="1275660"/>
+                  <a:pt x="4767548" y="1346727"/>
+                </a:cubicBezTo>
+                <a:cubicBezTo>
+                  <a:pt x="4693367" y="1407134"/>
+                  <a:pt x="4610627" y="1346727"/>
+                  <a:pt x="4539299" y="1421348"/>
+                </a:cubicBezTo>
+                <a:cubicBezTo>
+                  <a:pt x="4550712" y="1471094"/>
+                  <a:pt x="4610627" y="1432008"/>
+                  <a:pt x="4607773" y="1485309"/>
+                </a:cubicBezTo>
+                <a:cubicBezTo>
+                  <a:pt x="4604920" y="1517288"/>
+                  <a:pt x="4593508" y="1527948"/>
+                  <a:pt x="4579242" y="1535055"/>
+                </a:cubicBezTo>
+                <a:cubicBezTo>
+                  <a:pt x="4776107" y="1538608"/>
+                  <a:pt x="5383820" y="1574142"/>
+                  <a:pt x="5278255" y="1609676"/>
+                </a:cubicBezTo>
+                <a:cubicBezTo>
+                  <a:pt x="5418057" y="1698511"/>
+                  <a:pt x="5623481" y="1609676"/>
+                  <a:pt x="5771843" y="1630997"/>
+                </a:cubicBezTo>
+                <a:cubicBezTo>
+                  <a:pt x="5925911" y="1652316"/>
+                  <a:pt x="6171278" y="1719830"/>
+                  <a:pt x="6105656" y="1748257"/>
+                </a:cubicBezTo>
+                <a:cubicBezTo>
+                  <a:pt x="6031475" y="1780238"/>
+                  <a:pt x="5766136" y="2146235"/>
+                  <a:pt x="5691955" y="2167555"/>
+                </a:cubicBezTo>
+                <a:cubicBezTo>
+                  <a:pt x="5606362" y="2188875"/>
+                  <a:pt x="5589243" y="2217302"/>
+                  <a:pt x="5475118" y="2348776"/>
+                </a:cubicBezTo>
+                <a:cubicBezTo>
+                  <a:pt x="5398085" y="2437610"/>
+                  <a:pt x="5709074" y="2238623"/>
+                  <a:pt x="5826051" y="2291922"/>
+                </a:cubicBezTo>
+                <a:cubicBezTo>
+                  <a:pt x="5868848" y="2309690"/>
+                  <a:pt x="5552153" y="2554872"/>
+                  <a:pt x="5552153" y="2597513"/>
+                </a:cubicBezTo>
+                <a:cubicBezTo>
+                  <a:pt x="5549300" y="2640153"/>
+                  <a:pt x="5577831" y="2647260"/>
+                  <a:pt x="5603508" y="2647260"/>
+                </a:cubicBezTo>
+                <a:cubicBezTo>
+                  <a:pt x="5660571" y="2647260"/>
+                  <a:pt x="5640599" y="2686346"/>
+                  <a:pt x="5700515" y="2679240"/>
+                </a:cubicBezTo>
+                <a:cubicBezTo>
+                  <a:pt x="5523622" y="2800055"/>
+                  <a:pt x="5418057" y="2778734"/>
+                  <a:pt x="5246870" y="2888889"/>
+                </a:cubicBezTo>
+                <a:cubicBezTo>
+                  <a:pt x="5164130" y="2942189"/>
+                  <a:pt x="4921615" y="3119857"/>
+                  <a:pt x="4836022" y="3169605"/>
+                </a:cubicBezTo>
+                <a:cubicBezTo>
+                  <a:pt x="4801785" y="3187371"/>
+                  <a:pt x="4758988" y="3173158"/>
+                  <a:pt x="4736163" y="3233565"/>
+                </a:cubicBezTo>
+                <a:cubicBezTo>
+                  <a:pt x="4770400" y="3279759"/>
+                  <a:pt x="4816050" y="3254885"/>
+                  <a:pt x="4853141" y="3233565"/>
+                </a:cubicBezTo>
+                <a:cubicBezTo>
+                  <a:pt x="4944440" y="3176711"/>
+                  <a:pt x="4935881" y="3190925"/>
+                  <a:pt x="4944440" y="3226459"/>
+                </a:cubicBezTo>
+                <a:cubicBezTo>
+                  <a:pt x="4972972" y="3350827"/>
+                  <a:pt x="5044300" y="3308186"/>
+                  <a:pt x="5109921" y="3283313"/>
+                </a:cubicBezTo>
+                <a:cubicBezTo>
+                  <a:pt x="5303932" y="3208692"/>
+                  <a:pt x="5500797" y="3215799"/>
+                  <a:pt x="5694809" y="3141178"/>
+                </a:cubicBezTo>
+                <a:cubicBezTo>
+                  <a:pt x="5714781" y="3134070"/>
+                  <a:pt x="5612068" y="3283313"/>
+                  <a:pt x="5566419" y="3301079"/>
+                </a:cubicBezTo>
+                <a:cubicBezTo>
+                  <a:pt x="5515063" y="3322399"/>
+                  <a:pt x="5452294" y="3311739"/>
+                  <a:pt x="5415203" y="3397020"/>
+                </a:cubicBezTo>
+                <a:cubicBezTo>
+                  <a:pt x="5477972" y="3414787"/>
+                  <a:pt x="5552153" y="3372147"/>
+                  <a:pt x="5612068" y="3432554"/>
+                </a:cubicBezTo>
+                <a:cubicBezTo>
+                  <a:pt x="5469413" y="3528494"/>
+                  <a:pt x="5329610" y="3535601"/>
+                  <a:pt x="5206927" y="3599562"/>
+                </a:cubicBezTo>
+                <a:cubicBezTo>
+                  <a:pt x="5192661" y="3706163"/>
+                  <a:pt x="5272548" y="3663523"/>
+                  <a:pt x="5301079" y="3723930"/>
+                </a:cubicBezTo>
+                <a:cubicBezTo>
+                  <a:pt x="5072830" y="3844745"/>
+                  <a:pt x="4564977" y="4232062"/>
+                  <a:pt x="4507915" y="4306683"/>
+                </a:cubicBezTo>
+                <a:cubicBezTo>
+                  <a:pt x="4390937" y="4463031"/>
+                  <a:pt x="3900202" y="4562525"/>
+                  <a:pt x="3982942" y="4587399"/>
+                </a:cubicBezTo>
+                <a:cubicBezTo>
+                  <a:pt x="4051417" y="4608719"/>
+                  <a:pt x="4119891" y="4587399"/>
+                  <a:pt x="4185513" y="4541205"/>
+                </a:cubicBezTo>
+                <a:cubicBezTo>
+                  <a:pt x="4291078" y="4466584"/>
+                  <a:pt x="5010062" y="4523438"/>
+                  <a:pt x="5212633" y="4455924"/>
+                </a:cubicBezTo>
+                <a:cubicBezTo>
+                  <a:pt x="5241164" y="4445264"/>
+                  <a:pt x="5283960" y="4409730"/>
+                  <a:pt x="5312492" y="4473691"/>
+                </a:cubicBezTo>
+                <a:cubicBezTo>
+                  <a:pt x="5098508" y="4704659"/>
+                  <a:pt x="4833169" y="4654913"/>
+                  <a:pt x="4596361" y="4818368"/>
+                </a:cubicBezTo>
+                <a:cubicBezTo>
+                  <a:pt x="4684807" y="4917861"/>
+                  <a:pt x="4776107" y="4907202"/>
+                  <a:pt x="4873113" y="4885882"/>
+                </a:cubicBezTo>
+                <a:cubicBezTo>
+                  <a:pt x="4895938" y="4878775"/>
+                  <a:pt x="4930175" y="4871668"/>
+                  <a:pt x="4935881" y="4914309"/>
+                </a:cubicBezTo>
+                <a:cubicBezTo>
+                  <a:pt x="4941587" y="4967609"/>
+                  <a:pt x="4898790" y="4978270"/>
+                  <a:pt x="4873113" y="5003143"/>
+                </a:cubicBezTo>
+                <a:cubicBezTo>
+                  <a:pt x="4833169" y="5038676"/>
+                  <a:pt x="4773254" y="4999590"/>
+                  <a:pt x="4721898" y="5095530"/>
+                </a:cubicBezTo>
+                <a:cubicBezTo>
+                  <a:pt x="4873113" y="5067104"/>
+                  <a:pt x="4998650" y="5020910"/>
+                  <a:pt x="5132745" y="4949842"/>
+                </a:cubicBezTo>
+                <a:cubicBezTo>
+                  <a:pt x="5121333" y="5006696"/>
+                  <a:pt x="5081390" y="5035123"/>
+                  <a:pt x="5101362" y="5081317"/>
+                </a:cubicBezTo>
+                <a:cubicBezTo>
+                  <a:pt x="5118480" y="5116850"/>
+                  <a:pt x="5164130" y="5131063"/>
+                  <a:pt x="5138452" y="5198578"/>
+                </a:cubicBezTo>
+                <a:cubicBezTo>
+                  <a:pt x="5067125" y="5273199"/>
+                  <a:pt x="4967265" y="5258986"/>
+                  <a:pt x="4904497" y="5362033"/>
+                </a:cubicBezTo>
+                <a:cubicBezTo>
+                  <a:pt x="4818903" y="5507721"/>
+                  <a:pt x="4684807" y="5564575"/>
+                  <a:pt x="4579242" y="5674729"/>
+                </a:cubicBezTo>
+                <a:cubicBezTo>
+                  <a:pt x="4545005" y="5713816"/>
+                  <a:pt x="4313903" y="5841738"/>
+                  <a:pt x="4253988" y="5884379"/>
+                </a:cubicBezTo>
+                <a:cubicBezTo>
+                  <a:pt x="4168395" y="5944786"/>
+                  <a:pt x="4071389" y="5966106"/>
+                  <a:pt x="3985795" y="6069153"/>
+                </a:cubicBezTo>
+                <a:cubicBezTo>
+                  <a:pt x="4065682" y="6086921"/>
+                  <a:pt x="4134157" y="5990979"/>
+                  <a:pt x="4231163" y="6030066"/>
+                </a:cubicBezTo>
+                <a:cubicBezTo>
+                  <a:pt x="4074242" y="6133114"/>
+                  <a:pt x="3931586" y="6182861"/>
+                  <a:pt x="3814609" y="6317889"/>
+                </a:cubicBezTo>
+                <a:cubicBezTo>
+                  <a:pt x="3800343" y="6335656"/>
+                  <a:pt x="3771812" y="6332102"/>
+                  <a:pt x="3751840" y="6339209"/>
+                </a:cubicBezTo>
+                <a:cubicBezTo>
+                  <a:pt x="3529298" y="6406723"/>
+                  <a:pt x="3309608" y="6467130"/>
+                  <a:pt x="3089919" y="6563071"/>
+                </a:cubicBezTo>
+                <a:cubicBezTo>
+                  <a:pt x="3041416" y="6584392"/>
+                  <a:pt x="2955823" y="6595052"/>
+                  <a:pt x="2961529" y="6662566"/>
+                </a:cubicBezTo>
+                <a:cubicBezTo>
+                  <a:pt x="2972941" y="6765613"/>
+                  <a:pt x="3055681" y="6687439"/>
+                  <a:pt x="3107038" y="6673226"/>
+                </a:cubicBezTo>
+                <a:cubicBezTo>
+                  <a:pt x="3269664" y="6634138"/>
+                  <a:pt x="3432292" y="6570178"/>
+                  <a:pt x="3594919" y="6591499"/>
+                </a:cubicBezTo>
+                <a:cubicBezTo>
+                  <a:pt x="3483648" y="6637693"/>
+                  <a:pt x="3372376" y="6680332"/>
+                  <a:pt x="3261106" y="6726527"/>
+                </a:cubicBezTo>
+                <a:cubicBezTo>
+                  <a:pt x="3386642" y="6705206"/>
+                  <a:pt x="3495061" y="6786934"/>
+                  <a:pt x="3620597" y="6740740"/>
+                </a:cubicBezTo>
+                <a:cubicBezTo>
+                  <a:pt x="3660541" y="6726527"/>
+                  <a:pt x="3700484" y="6765613"/>
+                  <a:pt x="3703337" y="6826020"/>
+                </a:cubicBezTo>
+                <a:cubicBezTo>
+                  <a:pt x="3706191" y="6847340"/>
+                  <a:pt x="3700484" y="6865108"/>
+                  <a:pt x="3689072" y="6879321"/>
+                </a:cubicBezTo>
+                <a:lnTo>
+                  <a:pt x="0" y="6879321"/>
+                </a:lnTo>
+                <a:close/>
+              </a:path>
+            </a:pathLst>
+          </a:custGeom>
+          <a:solidFill>
+            <a:schemeClr val="bg2">
+              <a:alpha val="50000"/>
+            </a:schemeClr>
+          </a:solidFill>
+          <a:ln w="32707" cap="flat">
+            <a:noFill/>
+            <a:prstDash val="solid"/>
+            <a:miter/>
+          </a:ln>
+        </p:spPr>
+        <p:txBody>
+          <a:bodyPr wrap="square" rtlCol="0" anchor="ctr">
+            <a:noAutofit/>
+          </a:bodyPr>
+          <a:lstStyle/>
+          <a:p>
+            <a:pPr algn="ctr"/>
+            <a:endParaRPr lang="en-US"/>
           </a:p>
         </p:txBody>
       </p:sp>
@@ -21725,8 +23821,8 @@
         </p:blipFill>
         <p:spPr>
           <a:xfrm>
-            <a:off x="1981200" y="2429670"/>
-            <a:ext cx="914400" cy="914400"/>
+            <a:off x="601134" y="1918107"/>
+            <a:ext cx="3195204" cy="3195204"/>
           </a:xfrm>
           <a:prstGeom prst="rect">
             <a:avLst/>
@@ -21751,12 +23847,12 @@
         </p:nvSpPr>
         <p:spPr>
           <a:xfrm>
-            <a:off x="4200652" y="730249"/>
-            <a:ext cx="7153147" cy="5384801"/>
+            <a:off x="6248400" y="2497257"/>
+            <a:ext cx="5105398" cy="3679705"/>
           </a:xfrm>
         </p:spPr>
         <p:txBody>
-          <a:bodyPr anchor="ctr">
+          <a:bodyPr>
             <a:normAutofit/>
           </a:bodyPr>
           <a:lstStyle/>
@@ -21765,13 +23861,13 @@
               <a:buNone/>
             </a:pPr>
             <a:r>
-              <a:rPr lang="en-US" sz="1800" dirty="0">
+              <a:rPr lang="en-US" sz="1600">
                 <a:latin typeface="+mn-lt"/>
               </a:rPr>
               <a:t>The goal is to predict employee attrition, which is a critical issue for fast-growing organizations. Attrition, caused by resignation leads to economic and operational challenges, including recruitment and training costs</a:t>
             </a:r>
             <a:r>
-              <a:rPr lang="en-US" sz="1800" dirty="0"/>
+              <a:rPr lang="en-US" sz="1600"/>
               <a:t>. Using a predictive model, HR teams can take proactive steps to minimize turnover and improve workforce stability.</a:t>
             </a:r>
           </a:p>
@@ -21780,32 +23876,32 @@
               <a:buNone/>
             </a:pPr>
             <a:r>
-              <a:rPr lang="en-US" sz="1800" b="1" dirty="0"/>
+              <a:rPr lang="en-US" sz="1600" b="1"/>
               <a:t>Key Idea : </a:t>
             </a:r>
           </a:p>
           <a:p>
             <a:r>
-              <a:rPr lang="en-US" sz="1800" dirty="0">
+              <a:rPr lang="en-US" sz="1600">
                 <a:latin typeface="+mn-lt"/>
               </a:rPr>
               <a:t>Manual methods </a:t>
             </a:r>
             <a:r>
-              <a:rPr lang="en-US" sz="1800" dirty="0"/>
+              <a:rPr lang="en-US" sz="1600"/>
               <a:t>to predict attrition are time-consuming and lack accuracy .</a:t>
             </a:r>
-            <a:endParaRPr lang="en-US" sz="1800" dirty="0">
+            <a:endParaRPr lang="en-US" sz="1600">
               <a:latin typeface="+mn-lt"/>
             </a:endParaRPr>
           </a:p>
           <a:p>
             <a:r>
-              <a:rPr lang="en-US" sz="1800" dirty="0"/>
+              <a:rPr lang="en-US" sz="1600"/>
               <a:t>Use machine learning models to analyze employee data and predict attrition.</a:t>
             </a:r>
             <a:r>
-              <a:rPr lang="en-US" sz="1800" dirty="0">
+              <a:rPr lang="en-US" sz="1600">
                 <a:latin typeface="+mn-lt"/>
               </a:rPr>
               <a:t> </a:t>
@@ -21813,7 +23909,7 @@
           </a:p>
           <a:p>
             <a:r>
-              <a:rPr lang="en-US" sz="1800" dirty="0">
+              <a:rPr lang="en-US" sz="1600">
                 <a:latin typeface="+mn-lt"/>
               </a:rPr>
               <a:t>Identifying employees likely to leave can help organizations take proactive measures.</a:t>
@@ -21834,7 +23930,7 @@
 </p:sld>
 </file>
 
-<file path=ppt/slides/slide3.xml><?xml version="1.0" encoding="utf-8"?>
+<file path=ppt/slides/slide4.xml><?xml version="1.0" encoding="utf-8"?>
 <p:sld xmlns:a="http://schemas.openxmlformats.org/drawingml/2006/main" xmlns:r="http://schemas.openxmlformats.org/officeDocument/2006/relationships" xmlns:p="http://schemas.openxmlformats.org/presentationml/2006/main">
   <p:cSld>
     <p:bg>
@@ -22255,7 +24351,7 @@
           </p:nvPr>
         </p:nvPicPr>
         <p:blipFill>
-          <a:blip r:embed="rId2"/>
+          <a:blip r:embed="rId3"/>
           <a:stretch>
             <a:fillRect/>
           </a:stretch>
@@ -22285,7 +24381,7 @@
           <p:nvPr/>
         </p:nvPicPr>
         <p:blipFill>
-          <a:blip r:embed="rId3"/>
+          <a:blip r:embed="rId4"/>
           <a:stretch>
             <a:fillRect/>
           </a:stretch>
@@ -22313,7 +24409,7 @@
 </p:sld>
 </file>
 
-<file path=ppt/slides/slide4.xml><?xml version="1.0" encoding="utf-8"?>
+<file path=ppt/slides/slide5.xml><?xml version="1.0" encoding="utf-8"?>
 <p:sld xmlns:a="http://schemas.openxmlformats.org/drawingml/2006/main" xmlns:r="http://schemas.openxmlformats.org/officeDocument/2006/relationships" xmlns:p="http://schemas.openxmlformats.org/presentationml/2006/main">
   <p:cSld>
     <p:bg>
@@ -22794,7 +24890,7 @@
 </p:sld>
 </file>
 
-<file path=ppt/slides/slide5.xml><?xml version="1.0" encoding="utf-8"?>
+<file path=ppt/slides/slide6.xml><?xml version="1.0" encoding="utf-8"?>
 <p:sld xmlns:a="http://schemas.openxmlformats.org/drawingml/2006/main" xmlns:r="http://schemas.openxmlformats.org/officeDocument/2006/relationships" xmlns:p="http://schemas.openxmlformats.org/presentationml/2006/main">
   <p:cSld>
     <p:bg>
@@ -23250,7 +25346,7 @@
 </p:sld>
 </file>
 
-<file path=ppt/slides/slide6.xml><?xml version="1.0" encoding="utf-8"?>
+<file path=ppt/slides/slide7.xml><?xml version="1.0" encoding="utf-8"?>
 <p:sld xmlns:a="http://schemas.openxmlformats.org/drawingml/2006/main" xmlns:r="http://schemas.openxmlformats.org/officeDocument/2006/relationships" xmlns:p="http://schemas.openxmlformats.org/presentationml/2006/main">
   <p:cSld>
     <p:bg>
@@ -23611,7 +25707,7 @@
 </p:sld>
 </file>
 
-<file path=ppt/slides/slide7.xml><?xml version="1.0" encoding="utf-8"?>
+<file path=ppt/slides/slide8.xml><?xml version="1.0" encoding="utf-8"?>
 <p:sld xmlns:a="http://schemas.openxmlformats.org/drawingml/2006/main" xmlns:r="http://schemas.openxmlformats.org/officeDocument/2006/relationships" xmlns:p="http://schemas.openxmlformats.org/presentationml/2006/main">
   <p:cSld>
     <p:bg>
@@ -24148,7 +26244,7 @@
 </p:sld>
 </file>
 
-<file path=ppt/slides/slide8.xml><?xml version="1.0" encoding="utf-8"?>
+<file path=ppt/slides/slide9.xml><?xml version="1.0" encoding="utf-8"?>
 <p:sld xmlns:a="http://schemas.openxmlformats.org/drawingml/2006/main" xmlns:r="http://schemas.openxmlformats.org/officeDocument/2006/relationships" xmlns:p="http://schemas.openxmlformats.org/presentationml/2006/main">
   <p:cSld>
     <p:bg>
@@ -24626,410 +26722,6 @@
     <p:extLst>
       <p:ext uri="{BB962C8B-B14F-4D97-AF65-F5344CB8AC3E}">
         <p14:creationId xmlns:p14="http://schemas.microsoft.com/office/powerpoint/2010/main" val="320234465"/>
-      </p:ext>
-    </p:extLst>
-  </p:cSld>
-  <p:clrMapOvr>
-    <a:masterClrMapping/>
-  </p:clrMapOvr>
-</p:sld>
-</file>
-
-<file path=ppt/slides/slide9.xml><?xml version="1.0" encoding="utf-8"?>
-<p:sld xmlns:a="http://schemas.openxmlformats.org/drawingml/2006/main" xmlns:r="http://schemas.openxmlformats.org/officeDocument/2006/relationships" xmlns:p="http://schemas.openxmlformats.org/presentationml/2006/main">
-  <p:cSld>
-    <p:bg>
-      <p:bgPr>
-        <a:solidFill>
-          <a:schemeClr val="bg1"/>
-        </a:solidFill>
-        <a:effectLst/>
-      </p:bgPr>
-    </p:bg>
-    <p:spTree>
-      <p:nvGrpSpPr>
-        <p:cNvPr id="1" name=""/>
-        <p:cNvGrpSpPr/>
-        <p:nvPr/>
-      </p:nvGrpSpPr>
-      <p:grpSpPr>
-        <a:xfrm>
-          <a:off x="0" y="0"/>
-          <a:ext cx="0" cy="0"/>
-          <a:chOff x="0" y="0"/>
-          <a:chExt cx="0" cy="0"/>
-        </a:xfrm>
-      </p:grpSpPr>
-      <p:pic>
-        <p:nvPicPr>
-          <p:cNvPr id="4" name="Picture 3" descr="A blue squares with white text&#10;&#10;Description automatically generated">
-            <a:extLst>
-              <a:ext uri="{FF2B5EF4-FFF2-40B4-BE49-F238E27FC236}">
-                <a16:creationId xmlns:a16="http://schemas.microsoft.com/office/drawing/2014/main" id="{E8CCB4C3-A1E3-C498-4505-DC6818B92938}"/>
-              </a:ext>
-            </a:extLst>
-          </p:cNvPr>
-          <p:cNvPicPr>
-            <a:picLocks noChangeAspect="1"/>
-          </p:cNvPicPr>
-          <p:nvPr/>
-        </p:nvPicPr>
-        <p:blipFill>
-          <a:blip r:embed="rId2"/>
-          <a:stretch>
-            <a:fillRect/>
-          </a:stretch>
-        </p:blipFill>
-        <p:spPr>
-          <a:xfrm>
-            <a:off x="4322200" y="1773903"/>
-            <a:ext cx="3517119" cy="3270920"/>
-          </a:xfrm>
-          <a:prstGeom prst="rect">
-            <a:avLst/>
-          </a:prstGeom>
-        </p:spPr>
-      </p:pic>
-      <p:cxnSp>
-        <p:nvCxnSpPr>
-          <p:cNvPr id="11" name="Straight Connector 10">
-            <a:extLst>
-              <a:ext uri="{FF2B5EF4-FFF2-40B4-BE49-F238E27FC236}">
-                <a16:creationId xmlns:a16="http://schemas.microsoft.com/office/drawing/2014/main" id="{DCD67800-37AC-4E14-89B0-F79DCB3FB86D}"/>
-              </a:ext>
-              <a:ext uri="{C183D7F6-B498-43B3-948B-1728B52AA6E4}">
-                <adec:decorative xmlns:adec="http://schemas.microsoft.com/office/drawing/2017/decorative" val="1"/>
-              </a:ext>
-            </a:extLst>
-          </p:cNvPr>
-          <p:cNvCxnSpPr>
-            <a:cxnSpLocks noGrp="1" noRot="1" noChangeAspect="1" noMove="1" noResize="1" noEditPoints="1" noAdjustHandles="1" noChangeArrowheads="1" noChangeShapeType="1"/>
-          </p:cNvCxnSpPr>
-          <p:nvPr>
-            <p:extLst>
-              <p:ext uri="{386F3935-93C4-4BCD-93E2-E3B085C9AB24}">
-                <p16:designElem xmlns:p16="http://schemas.microsoft.com/office/powerpoint/2015/main" val="1"/>
-              </p:ext>
-            </p:extLst>
-          </p:nvPr>
-        </p:nvCxnSpPr>
-        <p:spPr>
-          <a:xfrm>
-            <a:off x="4165600" y="1573887"/>
-            <a:ext cx="0" cy="3710227"/>
-          </a:xfrm>
-          <a:prstGeom prst="line">
-            <a:avLst/>
-          </a:prstGeom>
-          <a:ln w="19050">
-            <a:solidFill>
-              <a:srgbClr val="7F7F7F"/>
-            </a:solidFill>
-          </a:ln>
-        </p:spPr>
-        <p:style>
-          <a:lnRef idx="1">
-            <a:schemeClr val="accent1"/>
-          </a:lnRef>
-          <a:fillRef idx="0">
-            <a:schemeClr val="accent1"/>
-          </a:fillRef>
-          <a:effectRef idx="0">
-            <a:schemeClr val="accent1"/>
-          </a:effectRef>
-          <a:fontRef idx="minor">
-            <a:schemeClr val="tx1"/>
-          </a:fontRef>
-        </p:style>
-      </p:cxnSp>
-      <p:pic>
-        <p:nvPicPr>
-          <p:cNvPr id="5" name="Content Placeholder 9" descr="A blue squares with white text&#10;&#10;Description automatically generated">
-            <a:extLst>
-              <a:ext uri="{FF2B5EF4-FFF2-40B4-BE49-F238E27FC236}">
-                <a16:creationId xmlns:a16="http://schemas.microsoft.com/office/drawing/2014/main" id="{51257B1A-7131-4C21-57DB-A94CCD2D56AC}"/>
-              </a:ext>
-            </a:extLst>
-          </p:cNvPr>
-          <p:cNvPicPr>
-            <a:picLocks noChangeAspect="1"/>
-          </p:cNvPicPr>
-          <p:nvPr/>
-        </p:nvPicPr>
-        <p:blipFill>
-          <a:blip r:embed="rId3"/>
-          <a:stretch>
-            <a:fillRect/>
-          </a:stretch>
-        </p:blipFill>
-        <p:spPr>
-          <a:xfrm>
-            <a:off x="7869801" y="1790467"/>
-            <a:ext cx="3537345" cy="3254356"/>
-          </a:xfrm>
-          <a:prstGeom prst="rect">
-            <a:avLst/>
-          </a:prstGeom>
-        </p:spPr>
-      </p:pic>
-      <p:cxnSp>
-        <p:nvCxnSpPr>
-          <p:cNvPr id="13" name="Straight Connector 12">
-            <a:extLst>
-              <a:ext uri="{FF2B5EF4-FFF2-40B4-BE49-F238E27FC236}">
-                <a16:creationId xmlns:a16="http://schemas.microsoft.com/office/drawing/2014/main" id="{20F1788F-A5AE-4188-8274-F7F2E3833ECD}"/>
-              </a:ext>
-              <a:ext uri="{C183D7F6-B498-43B3-948B-1728B52AA6E4}">
-                <adec:decorative xmlns:adec="http://schemas.microsoft.com/office/drawing/2017/decorative" val="1"/>
-              </a:ext>
-            </a:extLst>
-          </p:cNvPr>
-          <p:cNvCxnSpPr>
-            <a:cxnSpLocks noGrp="1" noRot="1" noChangeAspect="1" noMove="1" noResize="1" noEditPoints="1" noAdjustHandles="1" noChangeArrowheads="1" noChangeShapeType="1"/>
-          </p:cNvCxnSpPr>
-          <p:nvPr>
-            <p:extLst>
-              <p:ext uri="{386F3935-93C4-4BCD-93E2-E3B085C9AB24}">
-                <p16:designElem xmlns:p16="http://schemas.microsoft.com/office/powerpoint/2015/main" val="1"/>
-              </p:ext>
-            </p:extLst>
-          </p:nvPr>
-        </p:nvCxnSpPr>
-        <p:spPr>
-          <a:xfrm>
-            <a:off x="7995920" y="1573887"/>
-            <a:ext cx="0" cy="3710227"/>
-          </a:xfrm>
-          <a:prstGeom prst="line">
-            <a:avLst/>
-          </a:prstGeom>
-          <a:ln w="19050">
-            <a:solidFill>
-              <a:srgbClr val="7F7F7F"/>
-            </a:solidFill>
-          </a:ln>
-        </p:spPr>
-        <p:style>
-          <a:lnRef idx="1">
-            <a:schemeClr val="accent1"/>
-          </a:lnRef>
-          <a:fillRef idx="0">
-            <a:schemeClr val="accent1"/>
-          </a:fillRef>
-          <a:effectRef idx="0">
-            <a:schemeClr val="accent1"/>
-          </a:effectRef>
-          <a:fontRef idx="minor">
-            <a:schemeClr val="tx1"/>
-          </a:fontRef>
-        </p:style>
-      </p:cxnSp>
-      <p:pic>
-        <p:nvPicPr>
-          <p:cNvPr id="6" name="Content Placeholder 15" descr="A blue and white graph&#10;&#10;Description automatically generated">
-            <a:extLst>
-              <a:ext uri="{FF2B5EF4-FFF2-40B4-BE49-F238E27FC236}">
-                <a16:creationId xmlns:a16="http://schemas.microsoft.com/office/drawing/2014/main" id="{7A9D9373-1E99-1F6B-1EE4-10E10364F865}"/>
-              </a:ext>
-            </a:extLst>
-          </p:cNvPr>
-          <p:cNvPicPr>
-            <a:picLocks noChangeAspect="1"/>
-          </p:cNvPicPr>
-          <p:nvPr/>
-        </p:nvPicPr>
-        <p:blipFill>
-          <a:blip r:embed="rId4"/>
-          <a:stretch>
-            <a:fillRect/>
-          </a:stretch>
-        </p:blipFill>
-        <p:spPr>
-          <a:xfrm>
-            <a:off x="461400" y="1773903"/>
-            <a:ext cx="3517120" cy="3244543"/>
-          </a:xfrm>
-          <a:prstGeom prst="rect">
-            <a:avLst/>
-          </a:prstGeom>
-          <a:solidFill>
-            <a:srgbClr val="FFFFFF">
-              <a:shade val="85000"/>
-            </a:srgbClr>
-          </a:solidFill>
-          <a:scene3d>
-            <a:camera prst="orthographicFront"/>
-            <a:lightRig rig="twoPt" dir="t">
-              <a:rot lat="0" lon="0" rev="7200000"/>
-            </a:lightRig>
-          </a:scene3d>
-          <a:sp3d>
-            <a:bevelT w="25400" h="19050"/>
-            <a:contourClr>
-              <a:srgbClr val="FFFFFF"/>
-            </a:contourClr>
-          </a:sp3d>
-        </p:spPr>
-      </p:pic>
-      <p:sp>
-        <p:nvSpPr>
-          <p:cNvPr id="7" name="&quot;Not Allowed&quot; Symbol 6">
-            <a:extLst>
-              <a:ext uri="{FF2B5EF4-FFF2-40B4-BE49-F238E27FC236}">
-                <a16:creationId xmlns:a16="http://schemas.microsoft.com/office/drawing/2014/main" id="{E1D54D72-ED59-C6A9-1DB3-EE69161881A4}"/>
-              </a:ext>
-            </a:extLst>
-          </p:cNvPr>
-          <p:cNvSpPr/>
-          <p:nvPr/>
-        </p:nvSpPr>
-        <p:spPr>
-          <a:xfrm>
-            <a:off x="1371600" y="4280170"/>
-            <a:ext cx="214009" cy="204281"/>
-          </a:xfrm>
-          <a:prstGeom prst="noSmoking">
-            <a:avLst/>
-          </a:prstGeom>
-          <a:solidFill>
-            <a:schemeClr val="accent2"/>
-          </a:solidFill>
-        </p:spPr>
-        <p:style>
-          <a:lnRef idx="2">
-            <a:schemeClr val="accent1">
-              <a:shade val="15000"/>
-            </a:schemeClr>
-          </a:lnRef>
-          <a:fillRef idx="1">
-            <a:schemeClr val="accent1"/>
-          </a:fillRef>
-          <a:effectRef idx="0">
-            <a:schemeClr val="accent1"/>
-          </a:effectRef>
-          <a:fontRef idx="minor">
-            <a:schemeClr val="lt1"/>
-          </a:fontRef>
-        </p:style>
-        <p:txBody>
-          <a:bodyPr rtlCol="0" anchor="ctr"/>
-          <a:lstStyle/>
-          <a:p>
-            <a:pPr algn="ctr"/>
-            <a:endParaRPr lang="en-US">
-              <a:solidFill>
-                <a:schemeClr val="tx1"/>
-              </a:solidFill>
-            </a:endParaRPr>
-          </a:p>
-        </p:txBody>
-      </p:sp>
-      <p:sp>
-        <p:nvSpPr>
-          <p:cNvPr id="8" name="&quot;Not Allowed&quot; Symbol 7">
-            <a:extLst>
-              <a:ext uri="{FF2B5EF4-FFF2-40B4-BE49-F238E27FC236}">
-                <a16:creationId xmlns:a16="http://schemas.microsoft.com/office/drawing/2014/main" id="{C154E393-62AE-0634-D826-132AEA4DB35B}"/>
-              </a:ext>
-            </a:extLst>
-          </p:cNvPr>
-          <p:cNvSpPr/>
-          <p:nvPr/>
-        </p:nvSpPr>
-        <p:spPr>
-          <a:xfrm>
-            <a:off x="5078998" y="4280170"/>
-            <a:ext cx="214009" cy="204281"/>
-          </a:xfrm>
-          <a:prstGeom prst="noSmoking">
-            <a:avLst/>
-          </a:prstGeom>
-          <a:solidFill>
-            <a:schemeClr val="accent2"/>
-          </a:solidFill>
-        </p:spPr>
-        <p:style>
-          <a:lnRef idx="2">
-            <a:schemeClr val="accent1">
-              <a:shade val="15000"/>
-            </a:schemeClr>
-          </a:lnRef>
-          <a:fillRef idx="1">
-            <a:schemeClr val="accent1"/>
-          </a:fillRef>
-          <a:effectRef idx="0">
-            <a:schemeClr val="accent1"/>
-          </a:effectRef>
-          <a:fontRef idx="minor">
-            <a:schemeClr val="lt1"/>
-          </a:fontRef>
-        </p:style>
-        <p:txBody>
-          <a:bodyPr rtlCol="0" anchor="ctr"/>
-          <a:lstStyle/>
-          <a:p>
-            <a:pPr algn="ctr"/>
-            <a:endParaRPr lang="en-US">
-              <a:solidFill>
-                <a:schemeClr val="tx1"/>
-              </a:solidFill>
-            </a:endParaRPr>
-          </a:p>
-        </p:txBody>
-      </p:sp>
-      <p:sp>
-        <p:nvSpPr>
-          <p:cNvPr id="9" name="Smiley Face 8">
-            <a:extLst>
-              <a:ext uri="{FF2B5EF4-FFF2-40B4-BE49-F238E27FC236}">
-                <a16:creationId xmlns:a16="http://schemas.microsoft.com/office/drawing/2014/main" id="{EBB507D8-7FDC-7945-4CF3-370117E96D55}"/>
-              </a:ext>
-            </a:extLst>
-          </p:cNvPr>
-          <p:cNvSpPr/>
-          <p:nvPr/>
-        </p:nvSpPr>
-        <p:spPr>
-          <a:xfrm>
-            <a:off x="8791470" y="4280170"/>
-            <a:ext cx="214003" cy="204281"/>
-          </a:xfrm>
-          <a:prstGeom prst="smileyFace">
-            <a:avLst/>
-          </a:prstGeom>
-          <a:solidFill>
-            <a:schemeClr val="accent2"/>
-          </a:solidFill>
-        </p:spPr>
-        <p:style>
-          <a:lnRef idx="2">
-            <a:schemeClr val="accent1">
-              <a:shade val="15000"/>
-            </a:schemeClr>
-          </a:lnRef>
-          <a:fillRef idx="1">
-            <a:schemeClr val="accent1"/>
-          </a:fillRef>
-          <a:effectRef idx="0">
-            <a:schemeClr val="accent1"/>
-          </a:effectRef>
-          <a:fontRef idx="minor">
-            <a:schemeClr val="lt1"/>
-          </a:fontRef>
-        </p:style>
-        <p:txBody>
-          <a:bodyPr rtlCol="0" anchor="ctr"/>
-          <a:lstStyle/>
-          <a:p>
-            <a:pPr algn="ctr"/>
-            <a:endParaRPr lang="en-US"/>
-          </a:p>
-        </p:txBody>
-      </p:sp>
-    </p:spTree>
-    <p:extLst>
-      <p:ext uri="{BB962C8B-B14F-4D97-AF65-F5344CB8AC3E}">
-        <p14:creationId xmlns:p14="http://schemas.microsoft.com/office/powerpoint/2010/main" val="3805467070"/>
       </p:ext>
     </p:extLst>
   </p:cSld>

</xml_diff>

<commit_message>
add logistic and dummy
</commit_message>
<xml_diff>
--- a/Project_Presentation_Employee_Attrition_Prediction.pptx
+++ b/Project_Presentation_Employee_Attrition_Prediction.pptx
@@ -4274,10 +4274,10 @@
     <dgm:cxn modelId="{2506FF35-0B73-4924-B3A6-CDA6CCE4D254}" type="presOf" srcId="{7D29E4BA-724A-4F0F-AAAC-896F91B289D5}" destId="{8F35218B-0B29-4537-A959-F065B533DCA0}" srcOrd="0" destOrd="0" presId="urn:microsoft.com/office/officeart/2005/8/layout/default"/>
     <dgm:cxn modelId="{DB22C239-922F-472F-B8EF-519C934D9D76}" srcId="{ED784AFE-1B07-45C6-BE33-1AEB9AC9BAAC}" destId="{BB1F6F43-E23D-4EA9-AC40-2EC9712A8DB0}" srcOrd="1" destOrd="0" parTransId="{D97ACDAA-3921-409E-84A8-BEAE666BA87D}" sibTransId="{87317E56-7708-421D-A8AA-D0A8FB135E10}"/>
     <dgm:cxn modelId="{327A003A-95FF-4036-879E-395A761AE4AE}" type="presOf" srcId="{A48216D7-7077-4AD6-9795-06A1DEBB9070}" destId="{2F70ABAD-FD34-4D55-B5C9-FDB43501D535}" srcOrd="0" destOrd="0" presId="urn:microsoft.com/office/officeart/2005/8/layout/default"/>
+    <dgm:cxn modelId="{56FB655D-01C2-4A56-9E24-E34DBD47A63F}" srcId="{ED784AFE-1B07-45C6-BE33-1AEB9AC9BAAC}" destId="{4292E375-61D9-4158-9C09-DF8F34317D5D}" srcOrd="0" destOrd="0" parTransId="{EF2C9413-C3D8-4BAA-8B47-8B63D4B1AABB}" sibTransId="{7C2E2CE5-EC43-4804-9BB2-DB62C8021990}"/>
     <dgm:cxn modelId="{EAE6F147-9D6A-4D7B-A86B-150AAD957A6A}" srcId="{7D29E4BA-724A-4F0F-AAAC-896F91B289D5}" destId="{4E005EB3-5501-40C1-AF1B-54CE7CD9360F}" srcOrd="0" destOrd="0" parTransId="{6D40B7BD-16CA-414B-AF09-504801BA60EF}" sibTransId="{E7EE611D-3CF4-481C-BC7C-5BE7048D352B}"/>
+    <dgm:cxn modelId="{47013673-3601-4AD8-9B2E-44F7DCB11541}" srcId="{BED7FE2B-2E73-4F95-AD2C-1BE75880880B}" destId="{CC050EFE-8108-43FE-9F48-9E70F52489C1}" srcOrd="5" destOrd="0" parTransId="{EA30F8A1-BD9A-4A76-B111-44A1361C01EE}" sibTransId="{93B753EF-65FD-42AF-8845-FD099EDAA830}"/>
     <dgm:cxn modelId="{CE694954-9E6A-418D-9B79-5F79324B5D44}" type="presOf" srcId="{B180E4AB-9ED3-4A31-8DF4-1A84E957DC34}" destId="{4841FE55-6EF3-474D-A028-5B9AFFAF4649}" srcOrd="0" destOrd="0" presId="urn:microsoft.com/office/officeart/2005/8/layout/default"/>
-    <dgm:cxn modelId="{56FB655D-01C2-4A56-9E24-E34DBD47A63F}" srcId="{ED784AFE-1B07-45C6-BE33-1AEB9AC9BAAC}" destId="{4292E375-61D9-4158-9C09-DF8F34317D5D}" srcOrd="0" destOrd="0" parTransId="{EF2C9413-C3D8-4BAA-8B47-8B63D4B1AABB}" sibTransId="{7C2E2CE5-EC43-4804-9BB2-DB62C8021990}"/>
-    <dgm:cxn modelId="{47013673-3601-4AD8-9B2E-44F7DCB11541}" srcId="{BED7FE2B-2E73-4F95-AD2C-1BE75880880B}" destId="{CC050EFE-8108-43FE-9F48-9E70F52489C1}" srcOrd="5" destOrd="0" parTransId="{EA30F8A1-BD9A-4A76-B111-44A1361C01EE}" sibTransId="{93B753EF-65FD-42AF-8845-FD099EDAA830}"/>
     <dgm:cxn modelId="{9B0FA176-374C-4017-9629-4C63A679BF5F}" type="presOf" srcId="{5D257861-C90E-41A1-8ADC-2F2D32BC6AC3}" destId="{4841FE55-6EF3-474D-A028-5B9AFFAF4649}" srcOrd="0" destOrd="1" presId="urn:microsoft.com/office/officeart/2005/8/layout/default"/>
     <dgm:cxn modelId="{34EB947B-4D41-42BA-8B62-03BC2F67A1E2}" type="presOf" srcId="{CF233DCB-DD28-4106-B364-7A95CAD6200C}" destId="{D4F68EC4-739F-407B-AE53-0ACC131A628B}" srcOrd="0" destOrd="2" presId="urn:microsoft.com/office/officeart/2005/8/layout/default"/>
     <dgm:cxn modelId="{D4A9857D-8319-428D-9776-D23067CB4F28}" srcId="{BED7FE2B-2E73-4F95-AD2C-1BE75880880B}" destId="{B180E4AB-9ED3-4A31-8DF4-1A84E957DC34}" srcOrd="0" destOrd="0" parTransId="{0AB4E1F8-BA5D-47ED-9E09-55F151C86E00}" sibTransId="{1FA59D29-EC3F-4EB6-848D-B86E0825326F}"/>
@@ -14488,7 +14488,7 @@
           <a:p>
             <a:fld id="{55EBF7F1-AB8B-45B9-85D6-EEAB5CA0B4C8}" type="datetimeFigureOut">
               <a:rPr lang="en-US" smtClean="0"/>
-              <a:t>12/5/24</a:t>
+              <a:t>12/5/2024</a:t>
             </a:fld>
             <a:endParaRPr lang="en-US"/>
           </a:p>
@@ -15070,7 +15070,7 @@
           <a:p>
             <a:fld id="{84B92407-704D-4C58-9180-B5C5B3785A42}" type="datetimeFigureOut">
               <a:rPr lang="en-US" smtClean="0"/>
-              <a:t>12/5/24</a:t>
+              <a:t>12/5/2024</a:t>
             </a:fld>
             <a:endParaRPr lang="en-US"/>
           </a:p>
@@ -15268,7 +15268,7 @@
           <a:p>
             <a:fld id="{84B92407-704D-4C58-9180-B5C5B3785A42}" type="datetimeFigureOut">
               <a:rPr lang="en-US" smtClean="0"/>
-              <a:t>12/5/24</a:t>
+              <a:t>12/5/2024</a:t>
             </a:fld>
             <a:endParaRPr lang="en-US"/>
           </a:p>
@@ -15476,7 +15476,7 @@
           <a:p>
             <a:fld id="{84B92407-704D-4C58-9180-B5C5B3785A42}" type="datetimeFigureOut">
               <a:rPr lang="en-US" smtClean="0"/>
-              <a:t>12/5/24</a:t>
+              <a:t>12/5/2024</a:t>
             </a:fld>
             <a:endParaRPr lang="en-US"/>
           </a:p>
@@ -15674,7 +15674,7 @@
           <a:p>
             <a:fld id="{84B92407-704D-4C58-9180-B5C5B3785A42}" type="datetimeFigureOut">
               <a:rPr lang="en-US" smtClean="0"/>
-              <a:t>12/5/24</a:t>
+              <a:t>12/5/2024</a:t>
             </a:fld>
             <a:endParaRPr lang="en-US"/>
           </a:p>
@@ -15949,7 +15949,7 @@
           <a:p>
             <a:fld id="{84B92407-704D-4C58-9180-B5C5B3785A42}" type="datetimeFigureOut">
               <a:rPr lang="en-US" smtClean="0"/>
-              <a:t>12/5/24</a:t>
+              <a:t>12/5/2024</a:t>
             </a:fld>
             <a:endParaRPr lang="en-US"/>
           </a:p>
@@ -16214,7 +16214,7 @@
           <a:p>
             <a:fld id="{84B92407-704D-4C58-9180-B5C5B3785A42}" type="datetimeFigureOut">
               <a:rPr lang="en-US" smtClean="0"/>
-              <a:t>12/5/24</a:t>
+              <a:t>12/5/2024</a:t>
             </a:fld>
             <a:endParaRPr lang="en-US"/>
           </a:p>
@@ -16626,7 +16626,7 @@
           <a:p>
             <a:fld id="{84B92407-704D-4C58-9180-B5C5B3785A42}" type="datetimeFigureOut">
               <a:rPr lang="en-US" smtClean="0"/>
-              <a:t>12/5/24</a:t>
+              <a:t>12/5/2024</a:t>
             </a:fld>
             <a:endParaRPr lang="en-US"/>
           </a:p>
@@ -16767,7 +16767,7 @@
           <a:p>
             <a:fld id="{84B92407-704D-4C58-9180-B5C5B3785A42}" type="datetimeFigureOut">
               <a:rPr lang="en-US" smtClean="0"/>
-              <a:t>12/5/24</a:t>
+              <a:t>12/5/2024</a:t>
             </a:fld>
             <a:endParaRPr lang="en-US"/>
           </a:p>
@@ -16880,7 +16880,7 @@
           <a:p>
             <a:fld id="{84B92407-704D-4C58-9180-B5C5B3785A42}" type="datetimeFigureOut">
               <a:rPr lang="en-US" smtClean="0"/>
-              <a:t>12/5/24</a:t>
+              <a:t>12/5/2024</a:t>
             </a:fld>
             <a:endParaRPr lang="en-US"/>
           </a:p>
@@ -17191,7 +17191,7 @@
           <a:p>
             <a:fld id="{84B92407-704D-4C58-9180-B5C5B3785A42}" type="datetimeFigureOut">
               <a:rPr lang="en-US" smtClean="0"/>
-              <a:t>12/5/24</a:t>
+              <a:t>12/5/2024</a:t>
             </a:fld>
             <a:endParaRPr lang="en-US"/>
           </a:p>
@@ -17479,7 +17479,7 @@
           <a:p>
             <a:fld id="{84B92407-704D-4C58-9180-B5C5B3785A42}" type="datetimeFigureOut">
               <a:rPr lang="en-US" smtClean="0"/>
-              <a:t>12/5/24</a:t>
+              <a:t>12/5/2024</a:t>
             </a:fld>
             <a:endParaRPr lang="en-US"/>
           </a:p>
@@ -17720,7 +17720,7 @@
           <a:p>
             <a:fld id="{84B92407-704D-4C58-9180-B5C5B3785A42}" type="datetimeFigureOut">
               <a:rPr lang="en-US" smtClean="0"/>
-              <a:t>12/5/24</a:t>
+              <a:t>12/5/2024</a:t>
             </a:fld>
             <a:endParaRPr lang="en-US"/>
           </a:p>
@@ -26276,10 +26276,10 @@
       </p:grpSpPr>
       <p:sp useBgFill="1">
         <p:nvSpPr>
-          <p:cNvPr id="10" name="Rectangle 9">
+          <p:cNvPr id="27" name="Rectangle 26">
             <a:extLst>
               <a:ext uri="{FF2B5EF4-FFF2-40B4-BE49-F238E27FC236}">
-                <a16:creationId xmlns:a16="http://schemas.microsoft.com/office/drawing/2014/main" id="{665DBBEF-238B-476B-96AB-8AAC3224ECEA}"/>
+                <a16:creationId xmlns:a16="http://schemas.microsoft.com/office/drawing/2014/main" id="{F13C74B1-5B17-4795-BED0-7140497B445A}"/>
               </a:ext>
               <a:ext uri="{C183D7F6-B498-43B3-948B-1728B52AA6E4}">
                 <adec:decorative xmlns:adec="http://schemas.microsoft.com/office/drawing/2017/decorative" val="1"/>
@@ -26300,7 +26300,7 @@
         <p:spPr>
           <a:xfrm>
             <a:off x="0" y="0"/>
-            <a:ext cx="12192000" cy="6858000"/>
+            <a:ext cx="12188952" cy="6858000"/>
           </a:xfrm>
           <a:prstGeom prst="rect">
             <a:avLst/>
@@ -26352,8 +26352,8 @@
         </p:nvSpPr>
         <p:spPr>
           <a:xfrm>
-            <a:off x="638882" y="639193"/>
-            <a:ext cx="3571810" cy="3573516"/>
+            <a:off x="640080" y="325369"/>
+            <a:ext cx="4368602" cy="1956841"/>
           </a:xfrm>
         </p:spPr>
         <p:txBody>
@@ -26363,10 +26363,7 @@
           <a:lstStyle/>
           <a:p>
             <a:r>
-              <a:rPr lang="en-US" sz="5100" b="1" kern="1200">
-                <a:solidFill>
-                  <a:schemeClr val="tx1"/>
-                </a:solidFill>
+              <a:rPr lang="en-US" sz="5400" b="1" kern="1200">
                 <a:latin typeface="+mj-lt"/>
                 <a:ea typeface="+mj-ea"/>
                 <a:cs typeface="+mj-cs"/>
@@ -26374,10 +26371,7 @@
               <a:t>Correlation</a:t>
             </a:r>
             <a:r>
-              <a:rPr lang="en-US" sz="5100" kern="1200">
-                <a:solidFill>
-                  <a:schemeClr val="tx1"/>
-                </a:solidFill>
+              <a:rPr lang="en-US" sz="5400" kern="1200">
                 <a:latin typeface="+mj-lt"/>
                 <a:ea typeface="+mj-ea"/>
                 <a:cs typeface="+mj-cs"/>
@@ -26389,10 +26383,10 @@
       </p:sp>
       <p:sp>
         <p:nvSpPr>
-          <p:cNvPr id="12" name="sketch line">
+          <p:cNvPr id="28" name="sketchy line">
             <a:extLst>
               <a:ext uri="{FF2B5EF4-FFF2-40B4-BE49-F238E27FC236}">
-                <a16:creationId xmlns:a16="http://schemas.microsoft.com/office/drawing/2014/main" id="{3FCFB1DE-0B7E-48CC-BA90-B2AB0889F9D6}"/>
+                <a16:creationId xmlns:a16="http://schemas.microsoft.com/office/drawing/2014/main" id="{D4974D33-8DC5-464E-8C6D-BE58F0669C17}"/>
               </a:ext>
               <a:ext uri="{C183D7F6-B498-43B3-948B-1728B52AA6E4}">
                 <adec:decorative xmlns:adec="http://schemas.microsoft.com/office/drawing/2017/decorative" val="1"/>
@@ -26412,36 +26406,38 @@
         </p:nvSpPr>
         <p:spPr>
           <a:xfrm>
-            <a:off x="643278" y="4409267"/>
-            <a:ext cx="3255095" cy="18288"/>
+            <a:off x="640080" y="2586994"/>
+            <a:ext cx="3474720" cy="18288"/>
           </a:xfrm>
           <a:custGeom>
             <a:avLst/>
             <a:gdLst>
-              <a:gd name="connsiteX0" fmla="*/ 0 w 3255095"/>
+              <a:gd name="connsiteX0" fmla="*/ 0 w 3474720"/>
               <a:gd name="connsiteY0" fmla="*/ 0 h 18288"/>
-              <a:gd name="connsiteX1" fmla="*/ 618468 w 3255095"/>
+              <a:gd name="connsiteX1" fmla="*/ 694944 w 3474720"/>
               <a:gd name="connsiteY1" fmla="*/ 0 h 18288"/>
-              <a:gd name="connsiteX2" fmla="*/ 1269487 w 3255095"/>
+              <a:gd name="connsiteX2" fmla="*/ 1355141 w 3474720"/>
               <a:gd name="connsiteY2" fmla="*/ 0 h 18288"/>
-              <a:gd name="connsiteX3" fmla="*/ 1953057 w 3255095"/>
+              <a:gd name="connsiteX3" fmla="*/ 2015338 w 3474720"/>
               <a:gd name="connsiteY3" fmla="*/ 0 h 18288"/>
-              <a:gd name="connsiteX4" fmla="*/ 2636627 w 3255095"/>
+              <a:gd name="connsiteX4" fmla="*/ 2779776 w 3474720"/>
               <a:gd name="connsiteY4" fmla="*/ 0 h 18288"/>
-              <a:gd name="connsiteX5" fmla="*/ 3255095 w 3255095"/>
+              <a:gd name="connsiteX5" fmla="*/ 3474720 w 3474720"/>
               <a:gd name="connsiteY5" fmla="*/ 0 h 18288"/>
-              <a:gd name="connsiteX6" fmla="*/ 3255095 w 3255095"/>
+              <a:gd name="connsiteX6" fmla="*/ 3474720 w 3474720"/>
               <a:gd name="connsiteY6" fmla="*/ 18288 h 18288"/>
-              <a:gd name="connsiteX7" fmla="*/ 2538974 w 3255095"/>
+              <a:gd name="connsiteX7" fmla="*/ 2779776 w 3474720"/>
               <a:gd name="connsiteY7" fmla="*/ 18288 h 18288"/>
-              <a:gd name="connsiteX8" fmla="*/ 1822853 w 3255095"/>
+              <a:gd name="connsiteX8" fmla="*/ 2189074 w 3474720"/>
               <a:gd name="connsiteY8" fmla="*/ 18288 h 18288"/>
-              <a:gd name="connsiteX9" fmla="*/ 1171834 w 3255095"/>
+              <a:gd name="connsiteX9" fmla="*/ 1528877 w 3474720"/>
               <a:gd name="connsiteY9" fmla="*/ 18288 h 18288"/>
-              <a:gd name="connsiteX10" fmla="*/ 0 w 3255095"/>
+              <a:gd name="connsiteX10" fmla="*/ 868680 w 3474720"/>
               <a:gd name="connsiteY10" fmla="*/ 18288 h 18288"/>
-              <a:gd name="connsiteX11" fmla="*/ 0 w 3255095"/>
-              <a:gd name="connsiteY11" fmla="*/ 0 h 18288"/>
+              <a:gd name="connsiteX11" fmla="*/ 0 w 3474720"/>
+              <a:gd name="connsiteY11" fmla="*/ 18288 h 18288"/>
+              <a:gd name="connsiteX12" fmla="*/ 0 w 3474720"/>
+              <a:gd name="connsiteY12" fmla="*/ 0 h 18288"/>
             </a:gdLst>
             <a:ahLst/>
             <a:cxnLst>
@@ -26481,132 +26477,140 @@
               <a:cxn ang="0">
                 <a:pos x="connsiteX11" y="connsiteY11"/>
               </a:cxn>
+              <a:cxn ang="0">
+                <a:pos x="connsiteX12" y="connsiteY12"/>
+              </a:cxn>
             </a:cxnLst>
             <a:rect l="l" t="t" r="r" b="b"/>
             <a:pathLst>
-              <a:path w="3255095" h="18288" fill="none" extrusionOk="0">
+              <a:path w="3474720" h="18288" fill="none" extrusionOk="0">
                 <a:moveTo>
                   <a:pt x="0" y="0"/>
                 </a:moveTo>
                 <a:cubicBezTo>
-                  <a:pt x="240201" y="-22123"/>
-                  <a:pt x="462021" y="-19623"/>
-                  <a:pt x="618468" y="0"/>
-                </a:cubicBezTo>
-                <a:cubicBezTo>
-                  <a:pt x="774915" y="19623"/>
-                  <a:pt x="974734" y="2035"/>
-                  <a:pt x="1269487" y="0"/>
-                </a:cubicBezTo>
-                <a:cubicBezTo>
-                  <a:pt x="1564240" y="-2035"/>
-                  <a:pt x="1733579" y="10639"/>
-                  <a:pt x="1953057" y="0"/>
-                </a:cubicBezTo>
-                <a:cubicBezTo>
-                  <a:pt x="2172535" y="-10639"/>
-                  <a:pt x="2453962" y="14018"/>
-                  <a:pt x="2636627" y="0"/>
-                </a:cubicBezTo>
-                <a:cubicBezTo>
-                  <a:pt x="2819292" y="-14018"/>
-                  <a:pt x="3121375" y="5399"/>
-                  <a:pt x="3255095" y="0"/>
-                </a:cubicBezTo>
-                <a:cubicBezTo>
-                  <a:pt x="3254386" y="8157"/>
-                  <a:pt x="3254682" y="12125"/>
-                  <a:pt x="3255095" y="18288"/>
-                </a:cubicBezTo>
-                <a:cubicBezTo>
-                  <a:pt x="3088545" y="23203"/>
-                  <a:pt x="2687475" y="7419"/>
-                  <a:pt x="2538974" y="18288"/>
-                </a:cubicBezTo>
-                <a:cubicBezTo>
-                  <a:pt x="2390473" y="29157"/>
-                  <a:pt x="2137381" y="-8959"/>
-                  <a:pt x="1822853" y="18288"/>
-                </a:cubicBezTo>
-                <a:cubicBezTo>
-                  <a:pt x="1508325" y="45535"/>
-                  <a:pt x="1466437" y="20385"/>
-                  <a:pt x="1171834" y="18288"/>
-                </a:cubicBezTo>
-                <a:cubicBezTo>
-                  <a:pt x="877231" y="16191"/>
-                  <a:pt x="561097" y="37643"/>
+                  <a:pt x="224454" y="-14544"/>
+                  <a:pt x="495407" y="26540"/>
+                  <a:pt x="694944" y="0"/>
+                </a:cubicBezTo>
+                <a:cubicBezTo>
+                  <a:pt x="894481" y="-26540"/>
+                  <a:pt x="1130063" y="24713"/>
+                  <a:pt x="1355141" y="0"/>
+                </a:cubicBezTo>
+                <a:cubicBezTo>
+                  <a:pt x="1580219" y="-24713"/>
+                  <a:pt x="1820099" y="26695"/>
+                  <a:pt x="2015338" y="0"/>
+                </a:cubicBezTo>
+                <a:cubicBezTo>
+                  <a:pt x="2210577" y="-26695"/>
+                  <a:pt x="2402045" y="165"/>
+                  <a:pt x="2779776" y="0"/>
+                </a:cubicBezTo>
+                <a:cubicBezTo>
+                  <a:pt x="3157507" y="-165"/>
+                  <a:pt x="3286859" y="-15571"/>
+                  <a:pt x="3474720" y="0"/>
+                </a:cubicBezTo>
+                <a:cubicBezTo>
+                  <a:pt x="3474286" y="7551"/>
+                  <a:pt x="3474253" y="9822"/>
+                  <a:pt x="3474720" y="18288"/>
+                </a:cubicBezTo>
+                <a:cubicBezTo>
+                  <a:pt x="3233904" y="29845"/>
+                  <a:pt x="2945134" y="-5256"/>
+                  <a:pt x="2779776" y="18288"/>
+                </a:cubicBezTo>
+                <a:cubicBezTo>
+                  <a:pt x="2614418" y="41832"/>
+                  <a:pt x="2339768" y="22709"/>
+                  <a:pt x="2189074" y="18288"/>
+                </a:cubicBezTo>
+                <a:cubicBezTo>
+                  <a:pt x="2038380" y="13867"/>
+                  <a:pt x="1817434" y="-4947"/>
+                  <a:pt x="1528877" y="18288"/>
+                </a:cubicBezTo>
+                <a:cubicBezTo>
+                  <a:pt x="1240320" y="41523"/>
+                  <a:pt x="1042447" y="37198"/>
+                  <a:pt x="868680" y="18288"/>
+                </a:cubicBezTo>
+                <a:cubicBezTo>
+                  <a:pt x="694913" y="-622"/>
+                  <a:pt x="233232" y="44909"/>
                   <a:pt x="0" y="18288"/>
                 </a:cubicBezTo>
                 <a:cubicBezTo>
-                  <a:pt x="-46" y="12483"/>
-                  <a:pt x="-203" y="6491"/>
+                  <a:pt x="60" y="11696"/>
+                  <a:pt x="66" y="3758"/>
                   <a:pt x="0" y="0"/>
                 </a:cubicBezTo>
                 <a:close/>
               </a:path>
-              <a:path w="3255095" h="18288" stroke="0" extrusionOk="0">
+              <a:path w="3474720" h="18288" stroke="0" extrusionOk="0">
                 <a:moveTo>
                   <a:pt x="0" y="0"/>
                 </a:moveTo>
                 <a:cubicBezTo>
-                  <a:pt x="291965" y="19429"/>
-                  <a:pt x="363155" y="8568"/>
-                  <a:pt x="618468" y="0"/>
-                </a:cubicBezTo>
-                <a:cubicBezTo>
-                  <a:pt x="873781" y="-8568"/>
-                  <a:pt x="904459" y="-19505"/>
-                  <a:pt x="1171834" y="0"/>
-                </a:cubicBezTo>
-                <a:cubicBezTo>
-                  <a:pt x="1439209" y="19505"/>
-                  <a:pt x="1744369" y="9790"/>
-                  <a:pt x="1887955" y="0"/>
-                </a:cubicBezTo>
-                <a:cubicBezTo>
-                  <a:pt x="2031541" y="-9790"/>
-                  <a:pt x="2346378" y="21240"/>
-                  <a:pt x="2506423" y="0"/>
-                </a:cubicBezTo>
-                <a:cubicBezTo>
-                  <a:pt x="2666468" y="-21240"/>
-                  <a:pt x="2990257" y="30414"/>
-                  <a:pt x="3255095" y="0"/>
-                </a:cubicBezTo>
-                <a:cubicBezTo>
-                  <a:pt x="3254831" y="4493"/>
-                  <a:pt x="3255479" y="9472"/>
-                  <a:pt x="3255095" y="18288"/>
-                </a:cubicBezTo>
-                <a:cubicBezTo>
-                  <a:pt x="3120743" y="16690"/>
-                  <a:pt x="2759628" y="42462"/>
-                  <a:pt x="2604076" y="18288"/>
-                </a:cubicBezTo>
-                <a:cubicBezTo>
-                  <a:pt x="2448524" y="-5886"/>
-                  <a:pt x="2184336" y="19599"/>
-                  <a:pt x="1887955" y="18288"/>
-                </a:cubicBezTo>
-                <a:cubicBezTo>
-                  <a:pt x="1591574" y="16977"/>
-                  <a:pt x="1548845" y="6870"/>
-                  <a:pt x="1334589" y="18288"/>
-                </a:cubicBezTo>
-                <a:cubicBezTo>
-                  <a:pt x="1120333" y="29706"/>
-                  <a:pt x="996014" y="9662"/>
-                  <a:pt x="683570" y="18288"/>
-                </a:cubicBezTo>
-                <a:cubicBezTo>
-                  <a:pt x="371126" y="26914"/>
-                  <a:pt x="198687" y="16167"/>
+                  <a:pt x="202328" y="-14716"/>
+                  <a:pt x="332722" y="-11499"/>
+                  <a:pt x="625450" y="0"/>
+                </a:cubicBezTo>
+                <a:cubicBezTo>
+                  <a:pt x="918178" y="11499"/>
+                  <a:pt x="1096688" y="5123"/>
+                  <a:pt x="1389888" y="0"/>
+                </a:cubicBezTo>
+                <a:cubicBezTo>
+                  <a:pt x="1683088" y="-5123"/>
+                  <a:pt x="1835981" y="-14038"/>
+                  <a:pt x="1980590" y="0"/>
+                </a:cubicBezTo>
+                <a:cubicBezTo>
+                  <a:pt x="2125199" y="14038"/>
+                  <a:pt x="2396099" y="-7203"/>
+                  <a:pt x="2571293" y="0"/>
+                </a:cubicBezTo>
+                <a:cubicBezTo>
+                  <a:pt x="2746487" y="7203"/>
+                  <a:pt x="3041609" y="-12036"/>
+                  <a:pt x="3474720" y="0"/>
+                </a:cubicBezTo>
+                <a:cubicBezTo>
+                  <a:pt x="3474638" y="4406"/>
+                  <a:pt x="3474631" y="9982"/>
+                  <a:pt x="3474720" y="18288"/>
+                </a:cubicBezTo>
+                <a:cubicBezTo>
+                  <a:pt x="3324873" y="21876"/>
+                  <a:pt x="3136771" y="12587"/>
+                  <a:pt x="2814523" y="18288"/>
+                </a:cubicBezTo>
+                <a:cubicBezTo>
+                  <a:pt x="2492275" y="23989"/>
+                  <a:pt x="2294402" y="47111"/>
+                  <a:pt x="2154326" y="18288"/>
+                </a:cubicBezTo>
+                <a:cubicBezTo>
+                  <a:pt x="2014250" y="-10535"/>
+                  <a:pt x="1820317" y="33903"/>
+                  <a:pt x="1494130" y="18288"/>
+                </a:cubicBezTo>
+                <a:cubicBezTo>
+                  <a:pt x="1167943" y="2673"/>
+                  <a:pt x="948432" y="14868"/>
+                  <a:pt x="729691" y="18288"/>
+                </a:cubicBezTo>
+                <a:cubicBezTo>
+                  <a:pt x="510950" y="21708"/>
+                  <a:pt x="264032" y="24354"/>
                   <a:pt x="0" y="18288"/>
                 </a:cubicBezTo>
                 <a:cubicBezTo>
-                  <a:pt x="843" y="9577"/>
-                  <a:pt x="371" y="6900"/>
+                  <a:pt x="189" y="14288"/>
+                  <a:pt x="-703" y="3747"/>
                   <a:pt x="0" y="0"/>
                 </a:cubicBezTo>
                 <a:close/>
@@ -26616,14 +26620,14 @@
           <a:solidFill>
             <a:schemeClr val="accent2"/>
           </a:solidFill>
-          <a:ln w="38100" cap="rnd">
+          <a:ln w="44450" cap="rnd">
             <a:solidFill>
               <a:schemeClr val="accent2"/>
             </a:solidFill>
             <a:round/>
             <a:extLst>
               <a:ext uri="{C807C97D-BFC1-408E-A445-0C87EB9F89A2}">
-                <ask:lineSketchStyleProps xmlns:ask="http://schemas.microsoft.com/office/drawing/2018/sketchyshapes" sd="1219033472">
+                <ask:lineSketchStyleProps xmlns:ask="http://schemas.microsoft.com/office/drawing/2018/sketchyshapes" sd="2863741219">
                   <a:prstGeom prst="rect">
                     <a:avLst/>
                   </a:prstGeom>
@@ -26662,10 +26666,10 @@
       </p:sp>
       <p:pic>
         <p:nvPicPr>
-          <p:cNvPr id="5" name="Content Placeholder 4" descr="A colorful squares with black text&#10;&#10;Description automatically generated with medium confidence">
+          <p:cNvPr id="13" name="Content Placeholder 12" descr="Research outline">
             <a:extLst>
               <a:ext uri="{FF2B5EF4-FFF2-40B4-BE49-F238E27FC236}">
-                <a16:creationId xmlns:a16="http://schemas.microsoft.com/office/drawing/2014/main" id="{1E2A12EB-9970-45B1-9DBC-B6955FE55D75}"/>
+                <a16:creationId xmlns:a16="http://schemas.microsoft.com/office/drawing/2014/main" id="{2282AD88-59BE-26E6-920B-69BFE2F5C0F1}"/>
               </a:ext>
             </a:extLst>
           </p:cNvPr>
@@ -26677,15 +26681,48 @@
           </p:nvPr>
         </p:nvPicPr>
         <p:blipFill>
-          <a:blip r:embed="rId2"/>
+          <a:blip r:embed="rId2">
+            <a:extLst>
+              <a:ext uri="{96DAC541-7B7A-43D3-8B79-37D633B846F1}">
+                <asvg:svgBlip xmlns:asvg="http://schemas.microsoft.com/office/drawing/2016/SVG/main" r:embed="rId3"/>
+              </a:ext>
+            </a:extLst>
+          </a:blip>
           <a:stretch>
             <a:fillRect/>
           </a:stretch>
         </p:blipFill>
         <p:spPr>
           <a:xfrm>
-            <a:off x="4654296" y="926242"/>
-            <a:ext cx="7214616" cy="4978084"/>
+            <a:off x="1909981" y="3655705"/>
+            <a:ext cx="914400" cy="914400"/>
+          </a:xfrm>
+        </p:spPr>
+      </p:pic>
+      <p:pic>
+        <p:nvPicPr>
+          <p:cNvPr id="9" name="Picture 8">
+            <a:extLst>
+              <a:ext uri="{FF2B5EF4-FFF2-40B4-BE49-F238E27FC236}">
+                <a16:creationId xmlns:a16="http://schemas.microsoft.com/office/drawing/2014/main" id="{7AD64BF4-F2C4-A7D6-5BC3-D078C4924FC3}"/>
+              </a:ext>
+            </a:extLst>
+          </p:cNvPr>
+          <p:cNvPicPr>
+            <a:picLocks noChangeAspect="1"/>
+          </p:cNvPicPr>
+          <p:nvPr/>
+        </p:nvPicPr>
+        <p:blipFill>
+          <a:blip r:embed="rId4"/>
+          <a:stretch>
+            <a:fillRect/>
+          </a:stretch>
+        </p:blipFill>
+        <p:spPr>
+          <a:xfrm>
+            <a:off x="4370451" y="1403012"/>
+            <a:ext cx="7562850" cy="5238750"/>
           </a:xfrm>
           <a:prstGeom prst="rect">
             <a:avLst/>

</xml_diff>

<commit_message>
ppt color format update
</commit_message>
<xml_diff>
--- a/Project_Presentation_Employee_Attrition_Prediction.pptx
+++ b/Project_Presentation_Employee_Attrition_Prediction.pptx
@@ -19732,10 +19732,10 @@
       </p:grpSpPr>
       <p:sp useBgFill="1">
         <p:nvSpPr>
-          <p:cNvPr id="46" name="Rectangle 45">
+          <p:cNvPr id="61" name="Rectangle 60">
             <a:extLst>
               <a:ext uri="{FF2B5EF4-FFF2-40B4-BE49-F238E27FC236}">
-                <a16:creationId xmlns:a16="http://schemas.microsoft.com/office/drawing/2014/main" id="{327D73B4-9F5C-4A64-A179-51B9500CB8B5}"/>
+                <a16:creationId xmlns:a16="http://schemas.microsoft.com/office/drawing/2014/main" id="{7B831B6F-405A-4B47-B9BB-5CA88F285844}"/>
               </a:ext>
               <a:ext uri="{C183D7F6-B498-43B3-948B-1728B52AA6E4}">
                 <adec:decorative xmlns:adec="http://schemas.microsoft.com/office/drawing/2017/decorative" val="1"/>
@@ -19786,7 +19786,7 @@
           <a:lstStyle/>
           <a:p>
             <a:pPr algn="ctr"/>
-            <a:endParaRPr lang="en-US" dirty="0"/>
+            <a:endParaRPr lang="en-US"/>
           </a:p>
         </p:txBody>
       </p:sp>
@@ -19808,8 +19808,8 @@
         </p:nvSpPr>
         <p:spPr>
           <a:xfrm>
-            <a:off x="6657715" y="467271"/>
-            <a:ext cx="4195674" cy="2052522"/>
+            <a:off x="6739128" y="638089"/>
+            <a:ext cx="4818888" cy="1476801"/>
           </a:xfrm>
         </p:spPr>
         <p:txBody>
@@ -19819,7 +19819,7 @@
           <a:lstStyle/>
           <a:p>
             <a:r>
-              <a:rPr lang="en-US" sz="3100" b="1" i="0" u="none" strike="noStrike" kern="1200">
+              <a:rPr lang="en-US" sz="2200" b="1" i="0" u="none" strike="noStrike" kern="1200">
                 <a:solidFill>
                   <a:schemeClr val="tx1"/>
                 </a:solidFill>
@@ -19831,7 +19831,7 @@
               <a:t>Deployment Summary for Employee Attrition Web Application</a:t>
             </a:r>
             <a:br>
-              <a:rPr lang="en-US" sz="3100" b="1" i="0" u="none" strike="noStrike" kern="1200">
+              <a:rPr lang="en-US" sz="2200" b="1" i="0" u="none" strike="noStrike" kern="1200">
                 <a:solidFill>
                   <a:schemeClr val="tx1"/>
                 </a:solidFill>
@@ -19841,7 +19841,7 @@
                 <a:cs typeface="+mj-cs"/>
               </a:rPr>
             </a:br>
-            <a:endParaRPr lang="en-US" sz="3100" kern="1200">
+            <a:endParaRPr lang="en-US" sz="2200" kern="1200">
               <a:solidFill>
                 <a:schemeClr val="tx1"/>
               </a:solidFill>
@@ -19852,472 +19852,6 @@
           </a:p>
         </p:txBody>
       </p:sp>
-      <p:sp>
-        <p:nvSpPr>
-          <p:cNvPr id="48" name="Oval 47">
-            <a:extLst>
-              <a:ext uri="{FF2B5EF4-FFF2-40B4-BE49-F238E27FC236}">
-                <a16:creationId xmlns:a16="http://schemas.microsoft.com/office/drawing/2014/main" id="{C1F06963-6374-4B48-844F-071A9BAAAE02}"/>
-              </a:ext>
-              <a:ext uri="{C183D7F6-B498-43B3-948B-1728B52AA6E4}">
-                <adec:decorative xmlns:adec="http://schemas.microsoft.com/office/drawing/2017/decorative" val="1"/>
-              </a:ext>
-            </a:extLst>
-          </p:cNvPr>
-          <p:cNvSpPr>
-            <a:spLocks noGrp="1" noRot="1" noChangeAspect="1" noMove="1" noResize="1" noEditPoints="1" noAdjustHandles="1" noChangeArrowheads="1" noChangeShapeType="1" noTextEdit="1"/>
-          </p:cNvSpPr>
-          <p:nvPr>
-            <p:extLst>
-              <p:ext uri="{386F3935-93C4-4BCD-93E2-E3B085C9AB24}">
-                <p16:designElem xmlns:p16="http://schemas.microsoft.com/office/powerpoint/2015/main" val="1"/>
-              </p:ext>
-            </p:extLst>
-          </p:nvPr>
-        </p:nvSpPr>
-        <p:spPr>
-          <a:xfrm>
-            <a:off x="322965" y="554152"/>
-            <a:ext cx="5742189" cy="5742189"/>
-          </a:xfrm>
-          <a:prstGeom prst="ellipse">
-            <a:avLst/>
-          </a:prstGeom>
-          <a:gradFill flip="none" rotWithShape="1">
-            <a:gsLst>
-              <a:gs pos="0">
-                <a:schemeClr val="accent1"/>
-              </a:gs>
-              <a:gs pos="100000">
-                <a:schemeClr val="accent2"/>
-              </a:gs>
-            </a:gsLst>
-            <a:lin ang="2700000" scaled="1"/>
-            <a:tileRect/>
-          </a:gradFill>
-          <a:ln>
-            <a:noFill/>
-          </a:ln>
-        </p:spPr>
-        <p:style>
-          <a:lnRef idx="2">
-            <a:schemeClr val="accent1">
-              <a:shade val="50000"/>
-            </a:schemeClr>
-          </a:lnRef>
-          <a:fillRef idx="1">
-            <a:schemeClr val="accent1"/>
-          </a:fillRef>
-          <a:effectRef idx="0">
-            <a:schemeClr val="accent1"/>
-          </a:effectRef>
-          <a:fontRef idx="minor">
-            <a:schemeClr val="lt1"/>
-          </a:fontRef>
-        </p:style>
-        <p:txBody>
-          <a:bodyPr rtlCol="0" anchor="ctr"/>
-          <a:lstStyle/>
-          <a:p>
-            <a:pPr algn="ctr"/>
-            <a:endParaRPr lang="en-US"/>
-          </a:p>
-        </p:txBody>
-      </p:sp>
-      <p:grpSp>
-        <p:nvGrpSpPr>
-          <p:cNvPr id="50" name="Group 49">
-            <a:extLst>
-              <a:ext uri="{FF2B5EF4-FFF2-40B4-BE49-F238E27FC236}">
-                <a16:creationId xmlns:a16="http://schemas.microsoft.com/office/drawing/2014/main" id="{5614C7C0-FA1D-4105-8345-1DF76F9870A8}"/>
-              </a:ext>
-              <a:ext uri="{C183D7F6-B498-43B3-948B-1728B52AA6E4}">
-                <adec:decorative xmlns:adec="http://schemas.microsoft.com/office/drawing/2017/decorative" val="1"/>
-              </a:ext>
-            </a:extLst>
-          </p:cNvPr>
-          <p:cNvGrpSpPr>
-            <a:grpSpLocks noGrp="1" noUngrp="1" noRot="1" noChangeAspect="1" noMove="1" noResize="1"/>
-          </p:cNvGrpSpPr>
-          <p:nvPr>
-            <p:extLst>
-              <p:ext uri="{386F3935-93C4-4BCD-93E2-E3B085C9AB24}">
-                <p16:designElem xmlns:p16="http://schemas.microsoft.com/office/powerpoint/2015/main" val="1"/>
-              </p:ext>
-            </p:extLst>
-          </p:nvPr>
-        </p:nvGrpSpPr>
-        <p:grpSpPr>
-          <a:xfrm>
-            <a:off x="422753" y="703679"/>
-            <a:ext cx="753718" cy="1016562"/>
-            <a:chOff x="422753" y="703679"/>
-            <a:chExt cx="753718" cy="1016562"/>
-          </a:xfrm>
-        </p:grpSpPr>
-        <p:sp>
-          <p:nvSpPr>
-            <p:cNvPr id="51" name="Graphic 11">
-              <a:extLst>
-                <a:ext uri="{FF2B5EF4-FFF2-40B4-BE49-F238E27FC236}">
-                  <a16:creationId xmlns:a16="http://schemas.microsoft.com/office/drawing/2014/main" id="{6CB927A4-E432-4310-9CD5-E89FF5063179}"/>
-                </a:ext>
-                <a:ext uri="{C183D7F6-B498-43B3-948B-1728B52AA6E4}">
-                  <adec:decorative xmlns:adec="http://schemas.microsoft.com/office/drawing/2017/decorative" val="1"/>
-                </a:ext>
-              </a:extLst>
-            </p:cNvPr>
-            <p:cNvSpPr/>
-            <p:nvPr>
-              <p:extLst>
-                <p:ext uri="{386F3935-93C4-4BCD-93E2-E3B085C9AB24}">
-                  <p16:designElem xmlns:p16="http://schemas.microsoft.com/office/powerpoint/2015/main" val="1"/>
-                </p:ext>
-              </p:extLst>
-            </p:nvPr>
-          </p:nvSpPr>
-          <p:spPr>
-            <a:xfrm>
-              <a:off x="1004956" y="703679"/>
-              <a:ext cx="171515" cy="171515"/>
-            </a:xfrm>
-            <a:custGeom>
-              <a:avLst/>
-              <a:gdLst>
-                <a:gd name="connsiteX0" fmla="*/ 159874 w 171515"/>
-                <a:gd name="connsiteY0" fmla="*/ 74116 h 171515"/>
-                <a:gd name="connsiteX1" fmla="*/ 97399 w 171515"/>
-                <a:gd name="connsiteY1" fmla="*/ 74116 h 171515"/>
-                <a:gd name="connsiteX2" fmla="*/ 97399 w 171515"/>
-                <a:gd name="connsiteY2" fmla="*/ 11641 h 171515"/>
-                <a:gd name="connsiteX3" fmla="*/ 85758 w 171515"/>
-                <a:gd name="connsiteY3" fmla="*/ 0 h 171515"/>
-                <a:gd name="connsiteX4" fmla="*/ 74116 w 171515"/>
-                <a:gd name="connsiteY4" fmla="*/ 11641 h 171515"/>
-                <a:gd name="connsiteX5" fmla="*/ 74116 w 171515"/>
-                <a:gd name="connsiteY5" fmla="*/ 74116 h 171515"/>
-                <a:gd name="connsiteX6" fmla="*/ 11641 w 171515"/>
-                <a:gd name="connsiteY6" fmla="*/ 74116 h 171515"/>
-                <a:gd name="connsiteX7" fmla="*/ 0 w 171515"/>
-                <a:gd name="connsiteY7" fmla="*/ 85758 h 171515"/>
-                <a:gd name="connsiteX8" fmla="*/ 11641 w 171515"/>
-                <a:gd name="connsiteY8" fmla="*/ 97399 h 171515"/>
-                <a:gd name="connsiteX9" fmla="*/ 74116 w 171515"/>
-                <a:gd name="connsiteY9" fmla="*/ 97399 h 171515"/>
-                <a:gd name="connsiteX10" fmla="*/ 74116 w 171515"/>
-                <a:gd name="connsiteY10" fmla="*/ 159874 h 171515"/>
-                <a:gd name="connsiteX11" fmla="*/ 85758 w 171515"/>
-                <a:gd name="connsiteY11" fmla="*/ 171515 h 171515"/>
-                <a:gd name="connsiteX12" fmla="*/ 97399 w 171515"/>
-                <a:gd name="connsiteY12" fmla="*/ 159874 h 171515"/>
-                <a:gd name="connsiteX13" fmla="*/ 97399 w 171515"/>
-                <a:gd name="connsiteY13" fmla="*/ 97399 h 171515"/>
-                <a:gd name="connsiteX14" fmla="*/ 159874 w 171515"/>
-                <a:gd name="connsiteY14" fmla="*/ 97399 h 171515"/>
-                <a:gd name="connsiteX15" fmla="*/ 171515 w 171515"/>
-                <a:gd name="connsiteY15" fmla="*/ 85758 h 171515"/>
-                <a:gd name="connsiteX16" fmla="*/ 159874 w 171515"/>
-                <a:gd name="connsiteY16" fmla="*/ 74116 h 171515"/>
-              </a:gdLst>
-              <a:ahLst/>
-              <a:cxnLst>
-                <a:cxn ang="0">
-                  <a:pos x="connsiteX0" y="connsiteY0"/>
-                </a:cxn>
-                <a:cxn ang="0">
-                  <a:pos x="connsiteX1" y="connsiteY1"/>
-                </a:cxn>
-                <a:cxn ang="0">
-                  <a:pos x="connsiteX2" y="connsiteY2"/>
-                </a:cxn>
-                <a:cxn ang="0">
-                  <a:pos x="connsiteX3" y="connsiteY3"/>
-                </a:cxn>
-                <a:cxn ang="0">
-                  <a:pos x="connsiteX4" y="connsiteY4"/>
-                </a:cxn>
-                <a:cxn ang="0">
-                  <a:pos x="connsiteX5" y="connsiteY5"/>
-                </a:cxn>
-                <a:cxn ang="0">
-                  <a:pos x="connsiteX6" y="connsiteY6"/>
-                </a:cxn>
-                <a:cxn ang="0">
-                  <a:pos x="connsiteX7" y="connsiteY7"/>
-                </a:cxn>
-                <a:cxn ang="0">
-                  <a:pos x="connsiteX8" y="connsiteY8"/>
-                </a:cxn>
-                <a:cxn ang="0">
-                  <a:pos x="connsiteX9" y="connsiteY9"/>
-                </a:cxn>
-                <a:cxn ang="0">
-                  <a:pos x="connsiteX10" y="connsiteY10"/>
-                </a:cxn>
-                <a:cxn ang="0">
-                  <a:pos x="connsiteX11" y="connsiteY11"/>
-                </a:cxn>
-                <a:cxn ang="0">
-                  <a:pos x="connsiteX12" y="connsiteY12"/>
-                </a:cxn>
-                <a:cxn ang="0">
-                  <a:pos x="connsiteX13" y="connsiteY13"/>
-                </a:cxn>
-                <a:cxn ang="0">
-                  <a:pos x="connsiteX14" y="connsiteY14"/>
-                </a:cxn>
-                <a:cxn ang="0">
-                  <a:pos x="connsiteX15" y="connsiteY15"/>
-                </a:cxn>
-                <a:cxn ang="0">
-                  <a:pos x="connsiteX16" y="connsiteY16"/>
-                </a:cxn>
-              </a:cxnLst>
-              <a:rect l="l" t="t" r="r" b="b"/>
-              <a:pathLst>
-                <a:path w="171515" h="171515">
-                  <a:moveTo>
-                    <a:pt x="159874" y="74116"/>
-                  </a:moveTo>
-                  <a:lnTo>
-                    <a:pt x="97399" y="74116"/>
-                  </a:lnTo>
-                  <a:lnTo>
-                    <a:pt x="97399" y="11641"/>
-                  </a:lnTo>
-                  <a:cubicBezTo>
-                    <a:pt x="97399" y="5212"/>
-                    <a:pt x="92187" y="0"/>
-                    <a:pt x="85758" y="0"/>
-                  </a:cubicBezTo>
-                  <a:cubicBezTo>
-                    <a:pt x="79328" y="0"/>
-                    <a:pt x="74116" y="5212"/>
-                    <a:pt x="74116" y="11641"/>
-                  </a:cubicBezTo>
-                  <a:lnTo>
-                    <a:pt x="74116" y="74116"/>
-                  </a:lnTo>
-                  <a:lnTo>
-                    <a:pt x="11641" y="74116"/>
-                  </a:lnTo>
-                  <a:cubicBezTo>
-                    <a:pt x="5212" y="74116"/>
-                    <a:pt x="0" y="79328"/>
-                    <a:pt x="0" y="85758"/>
-                  </a:cubicBezTo>
-                  <a:cubicBezTo>
-                    <a:pt x="0" y="92187"/>
-                    <a:pt x="5212" y="97399"/>
-                    <a:pt x="11641" y="97399"/>
-                  </a:cubicBezTo>
-                  <a:lnTo>
-                    <a:pt x="74116" y="97399"/>
-                  </a:lnTo>
-                  <a:lnTo>
-                    <a:pt x="74116" y="159874"/>
-                  </a:lnTo>
-                  <a:cubicBezTo>
-                    <a:pt x="74116" y="166303"/>
-                    <a:pt x="79328" y="171515"/>
-                    <a:pt x="85758" y="171515"/>
-                  </a:cubicBezTo>
-                  <a:cubicBezTo>
-                    <a:pt x="92187" y="171515"/>
-                    <a:pt x="97399" y="166303"/>
-                    <a:pt x="97399" y="159874"/>
-                  </a:cubicBezTo>
-                  <a:lnTo>
-                    <a:pt x="97399" y="97399"/>
-                  </a:lnTo>
-                  <a:lnTo>
-                    <a:pt x="159874" y="97399"/>
-                  </a:lnTo>
-                  <a:cubicBezTo>
-                    <a:pt x="166303" y="97399"/>
-                    <a:pt x="171515" y="92187"/>
-                    <a:pt x="171515" y="85758"/>
-                  </a:cubicBezTo>
-                  <a:cubicBezTo>
-                    <a:pt x="171515" y="79328"/>
-                    <a:pt x="166303" y="74116"/>
-                    <a:pt x="159874" y="74116"/>
-                  </a:cubicBezTo>
-                  <a:close/>
-                </a:path>
-              </a:pathLst>
-            </a:custGeom>
-            <a:solidFill>
-              <a:schemeClr val="accent1"/>
-            </a:solidFill>
-            <a:ln w="776" cap="flat">
-              <a:noFill/>
-              <a:prstDash val="solid"/>
-              <a:miter/>
-            </a:ln>
-          </p:spPr>
-          <p:txBody>
-            <a:bodyPr rtlCol="0" anchor="ctr"/>
-            <a:lstStyle/>
-            <a:p>
-              <a:endParaRPr lang="en-US"/>
-            </a:p>
-          </p:txBody>
-        </p:sp>
-        <p:sp>
-          <p:nvSpPr>
-            <p:cNvPr id="52" name="Graphic 12">
-              <a:extLst>
-                <a:ext uri="{FF2B5EF4-FFF2-40B4-BE49-F238E27FC236}">
-                  <a16:creationId xmlns:a16="http://schemas.microsoft.com/office/drawing/2014/main" id="{1453BF6C-B012-48B7-B4E8-6D7AC7C27D02}"/>
-                </a:ext>
-                <a:ext uri="{C183D7F6-B498-43B3-948B-1728B52AA6E4}">
-                  <adec:decorative xmlns:adec="http://schemas.microsoft.com/office/drawing/2017/decorative" val="1"/>
-                </a:ext>
-              </a:extLst>
-            </p:cNvPr>
-            <p:cNvSpPr/>
-            <p:nvPr>
-              <p:extLst>
-                <p:ext uri="{386F3935-93C4-4BCD-93E2-E3B085C9AB24}">
-                  <p16:designElem xmlns:p16="http://schemas.microsoft.com/office/powerpoint/2015/main" val="1"/>
-                </p:ext>
-              </p:extLst>
-            </p:nvPr>
-          </p:nvSpPr>
-          <p:spPr>
-            <a:xfrm>
-              <a:off x="422753" y="1562696"/>
-              <a:ext cx="157545" cy="157545"/>
-            </a:xfrm>
-            <a:custGeom>
-              <a:avLst/>
-              <a:gdLst>
-                <a:gd name="connsiteX0" fmla="*/ 78773 w 157545"/>
-                <a:gd name="connsiteY0" fmla="*/ 23283 h 157545"/>
-                <a:gd name="connsiteX1" fmla="*/ 134262 w 157545"/>
-                <a:gd name="connsiteY1" fmla="*/ 78773 h 157545"/>
-                <a:gd name="connsiteX2" fmla="*/ 78773 w 157545"/>
-                <a:gd name="connsiteY2" fmla="*/ 134262 h 157545"/>
-                <a:gd name="connsiteX3" fmla="*/ 23283 w 157545"/>
-                <a:gd name="connsiteY3" fmla="*/ 78773 h 157545"/>
-                <a:gd name="connsiteX4" fmla="*/ 78773 w 157545"/>
-                <a:gd name="connsiteY4" fmla="*/ 23283 h 157545"/>
-                <a:gd name="connsiteX5" fmla="*/ 78773 w 157545"/>
-                <a:gd name="connsiteY5" fmla="*/ 0 h 157545"/>
-                <a:gd name="connsiteX6" fmla="*/ 0 w 157545"/>
-                <a:gd name="connsiteY6" fmla="*/ 78773 h 157545"/>
-                <a:gd name="connsiteX7" fmla="*/ 78773 w 157545"/>
-                <a:gd name="connsiteY7" fmla="*/ 157545 h 157545"/>
-                <a:gd name="connsiteX8" fmla="*/ 157545 w 157545"/>
-                <a:gd name="connsiteY8" fmla="*/ 78773 h 157545"/>
-                <a:gd name="connsiteX9" fmla="*/ 78773 w 157545"/>
-                <a:gd name="connsiteY9" fmla="*/ 0 h 157545"/>
-              </a:gdLst>
-              <a:ahLst/>
-              <a:cxnLst>
-                <a:cxn ang="0">
-                  <a:pos x="connsiteX0" y="connsiteY0"/>
-                </a:cxn>
-                <a:cxn ang="0">
-                  <a:pos x="connsiteX1" y="connsiteY1"/>
-                </a:cxn>
-                <a:cxn ang="0">
-                  <a:pos x="connsiteX2" y="connsiteY2"/>
-                </a:cxn>
-                <a:cxn ang="0">
-                  <a:pos x="connsiteX3" y="connsiteY3"/>
-                </a:cxn>
-                <a:cxn ang="0">
-                  <a:pos x="connsiteX4" y="connsiteY4"/>
-                </a:cxn>
-                <a:cxn ang="0">
-                  <a:pos x="connsiteX5" y="connsiteY5"/>
-                </a:cxn>
-                <a:cxn ang="0">
-                  <a:pos x="connsiteX6" y="connsiteY6"/>
-                </a:cxn>
-                <a:cxn ang="0">
-                  <a:pos x="connsiteX7" y="connsiteY7"/>
-                </a:cxn>
-                <a:cxn ang="0">
-                  <a:pos x="connsiteX8" y="connsiteY8"/>
-                </a:cxn>
-                <a:cxn ang="0">
-                  <a:pos x="connsiteX9" y="connsiteY9"/>
-                </a:cxn>
-              </a:cxnLst>
-              <a:rect l="l" t="t" r="r" b="b"/>
-              <a:pathLst>
-                <a:path w="157545" h="157545">
-                  <a:moveTo>
-                    <a:pt x="78773" y="23283"/>
-                  </a:moveTo>
-                  <a:cubicBezTo>
-                    <a:pt x="109419" y="23283"/>
-                    <a:pt x="134262" y="48126"/>
-                    <a:pt x="134262" y="78773"/>
-                  </a:cubicBezTo>
-                  <a:cubicBezTo>
-                    <a:pt x="134262" y="109419"/>
-                    <a:pt x="109419" y="134262"/>
-                    <a:pt x="78773" y="134262"/>
-                  </a:cubicBezTo>
-                  <a:cubicBezTo>
-                    <a:pt x="48126" y="134262"/>
-                    <a:pt x="23283" y="109419"/>
-                    <a:pt x="23283" y="78773"/>
-                  </a:cubicBezTo>
-                  <a:cubicBezTo>
-                    <a:pt x="23312" y="48139"/>
-                    <a:pt x="48139" y="23312"/>
-                    <a:pt x="78773" y="23283"/>
-                  </a:cubicBezTo>
-                  <a:moveTo>
-                    <a:pt x="78773" y="0"/>
-                  </a:moveTo>
-                  <a:cubicBezTo>
-                    <a:pt x="35268" y="0"/>
-                    <a:pt x="0" y="35268"/>
-                    <a:pt x="0" y="78773"/>
-                  </a:cubicBezTo>
-                  <a:cubicBezTo>
-                    <a:pt x="0" y="122277"/>
-                    <a:pt x="35268" y="157545"/>
-                    <a:pt x="78773" y="157545"/>
-                  </a:cubicBezTo>
-                  <a:cubicBezTo>
-                    <a:pt x="122277" y="157545"/>
-                    <a:pt x="157545" y="122277"/>
-                    <a:pt x="157545" y="78773"/>
-                  </a:cubicBezTo>
-                  <a:cubicBezTo>
-                    <a:pt x="157545" y="35268"/>
-                    <a:pt x="122277" y="0"/>
-                    <a:pt x="78773" y="0"/>
-                  </a:cubicBezTo>
-                  <a:close/>
-                </a:path>
-              </a:pathLst>
-            </a:custGeom>
-            <a:solidFill>
-              <a:schemeClr val="accent1"/>
-            </a:solidFill>
-            <a:ln w="751" cap="flat">
-              <a:noFill/>
-              <a:prstDash val="solid"/>
-              <a:miter/>
-            </a:ln>
-          </p:spPr>
-          <p:txBody>
-            <a:bodyPr rtlCol="0" anchor="ctr"/>
-            <a:lstStyle/>
-            <a:p>
-              <a:endParaRPr lang="en-US"/>
-            </a:p>
-          </p:txBody>
-        </p:sp>
-      </p:grpSp>
       <p:pic>
         <p:nvPicPr>
           <p:cNvPr id="24" name="Graphic 23" descr="Server">
@@ -20349,14 +19883,287 @@
         </p:blipFill>
         <p:spPr>
           <a:xfrm>
-            <a:off x="1217770" y="1448957"/>
-            <a:ext cx="3952579" cy="3952579"/>
+            <a:off x="630936" y="699516"/>
+            <a:ext cx="5458968" cy="5458968"/>
           </a:xfrm>
           <a:prstGeom prst="rect">
             <a:avLst/>
           </a:prstGeom>
         </p:spPr>
       </p:pic>
+      <p:sp>
+        <p:nvSpPr>
+          <p:cNvPr id="63" name="sketch line">
+            <a:extLst>
+              <a:ext uri="{FF2B5EF4-FFF2-40B4-BE49-F238E27FC236}">
+                <a16:creationId xmlns:a16="http://schemas.microsoft.com/office/drawing/2014/main" id="{953EE71A-6488-4203-A7C4-77102FD0DCCA}"/>
+              </a:ext>
+              <a:ext uri="{C183D7F6-B498-43B3-948B-1728B52AA6E4}">
+                <adec:decorative xmlns:adec="http://schemas.microsoft.com/office/drawing/2017/decorative" val="1"/>
+              </a:ext>
+            </a:extLst>
+          </p:cNvPr>
+          <p:cNvSpPr>
+            <a:spLocks noGrp="1" noRot="1" noChangeAspect="1" noMove="1" noResize="1" noEditPoints="1" noAdjustHandles="1" noChangeArrowheads="1" noChangeShapeType="1" noTextEdit="1"/>
+          </p:cNvSpPr>
+          <p:nvPr>
+            <p:extLst>
+              <p:ext uri="{386F3935-93C4-4BCD-93E2-E3B085C9AB24}">
+                <p16:designElem xmlns:p16="http://schemas.microsoft.com/office/powerpoint/2015/main" val="1"/>
+              </p:ext>
+            </p:extLst>
+          </p:nvPr>
+        </p:nvSpPr>
+        <p:spPr>
+          <a:xfrm>
+            <a:off x="6739128" y="2372868"/>
+            <a:ext cx="3255095" cy="18288"/>
+          </a:xfrm>
+          <a:custGeom>
+            <a:avLst/>
+            <a:gdLst>
+              <a:gd name="connsiteX0" fmla="*/ 0 w 3255095"/>
+              <a:gd name="connsiteY0" fmla="*/ 0 h 18288"/>
+              <a:gd name="connsiteX1" fmla="*/ 618468 w 3255095"/>
+              <a:gd name="connsiteY1" fmla="*/ 0 h 18288"/>
+              <a:gd name="connsiteX2" fmla="*/ 1269487 w 3255095"/>
+              <a:gd name="connsiteY2" fmla="*/ 0 h 18288"/>
+              <a:gd name="connsiteX3" fmla="*/ 1953057 w 3255095"/>
+              <a:gd name="connsiteY3" fmla="*/ 0 h 18288"/>
+              <a:gd name="connsiteX4" fmla="*/ 2636627 w 3255095"/>
+              <a:gd name="connsiteY4" fmla="*/ 0 h 18288"/>
+              <a:gd name="connsiteX5" fmla="*/ 3255095 w 3255095"/>
+              <a:gd name="connsiteY5" fmla="*/ 0 h 18288"/>
+              <a:gd name="connsiteX6" fmla="*/ 3255095 w 3255095"/>
+              <a:gd name="connsiteY6" fmla="*/ 18288 h 18288"/>
+              <a:gd name="connsiteX7" fmla="*/ 2538974 w 3255095"/>
+              <a:gd name="connsiteY7" fmla="*/ 18288 h 18288"/>
+              <a:gd name="connsiteX8" fmla="*/ 1822853 w 3255095"/>
+              <a:gd name="connsiteY8" fmla="*/ 18288 h 18288"/>
+              <a:gd name="connsiteX9" fmla="*/ 1171834 w 3255095"/>
+              <a:gd name="connsiteY9" fmla="*/ 18288 h 18288"/>
+              <a:gd name="connsiteX10" fmla="*/ 0 w 3255095"/>
+              <a:gd name="connsiteY10" fmla="*/ 18288 h 18288"/>
+              <a:gd name="connsiteX11" fmla="*/ 0 w 3255095"/>
+              <a:gd name="connsiteY11" fmla="*/ 0 h 18288"/>
+            </a:gdLst>
+            <a:ahLst/>
+            <a:cxnLst>
+              <a:cxn ang="0">
+                <a:pos x="connsiteX0" y="connsiteY0"/>
+              </a:cxn>
+              <a:cxn ang="0">
+                <a:pos x="connsiteX1" y="connsiteY1"/>
+              </a:cxn>
+              <a:cxn ang="0">
+                <a:pos x="connsiteX2" y="connsiteY2"/>
+              </a:cxn>
+              <a:cxn ang="0">
+                <a:pos x="connsiteX3" y="connsiteY3"/>
+              </a:cxn>
+              <a:cxn ang="0">
+                <a:pos x="connsiteX4" y="connsiteY4"/>
+              </a:cxn>
+              <a:cxn ang="0">
+                <a:pos x="connsiteX5" y="connsiteY5"/>
+              </a:cxn>
+              <a:cxn ang="0">
+                <a:pos x="connsiteX6" y="connsiteY6"/>
+              </a:cxn>
+              <a:cxn ang="0">
+                <a:pos x="connsiteX7" y="connsiteY7"/>
+              </a:cxn>
+              <a:cxn ang="0">
+                <a:pos x="connsiteX8" y="connsiteY8"/>
+              </a:cxn>
+              <a:cxn ang="0">
+                <a:pos x="connsiteX9" y="connsiteY9"/>
+              </a:cxn>
+              <a:cxn ang="0">
+                <a:pos x="connsiteX10" y="connsiteY10"/>
+              </a:cxn>
+              <a:cxn ang="0">
+                <a:pos x="connsiteX11" y="connsiteY11"/>
+              </a:cxn>
+            </a:cxnLst>
+            <a:rect l="l" t="t" r="r" b="b"/>
+            <a:pathLst>
+              <a:path w="3255095" h="18288" fill="none" extrusionOk="0">
+                <a:moveTo>
+                  <a:pt x="0" y="0"/>
+                </a:moveTo>
+                <a:cubicBezTo>
+                  <a:pt x="240201" y="-22123"/>
+                  <a:pt x="462021" y="-19623"/>
+                  <a:pt x="618468" y="0"/>
+                </a:cubicBezTo>
+                <a:cubicBezTo>
+                  <a:pt x="774915" y="19623"/>
+                  <a:pt x="974734" y="2035"/>
+                  <a:pt x="1269487" y="0"/>
+                </a:cubicBezTo>
+                <a:cubicBezTo>
+                  <a:pt x="1564240" y="-2035"/>
+                  <a:pt x="1733579" y="10639"/>
+                  <a:pt x="1953057" y="0"/>
+                </a:cubicBezTo>
+                <a:cubicBezTo>
+                  <a:pt x="2172535" y="-10639"/>
+                  <a:pt x="2453962" y="14018"/>
+                  <a:pt x="2636627" y="0"/>
+                </a:cubicBezTo>
+                <a:cubicBezTo>
+                  <a:pt x="2819292" y="-14018"/>
+                  <a:pt x="3121375" y="5399"/>
+                  <a:pt x="3255095" y="0"/>
+                </a:cubicBezTo>
+                <a:cubicBezTo>
+                  <a:pt x="3254386" y="8157"/>
+                  <a:pt x="3254682" y="12125"/>
+                  <a:pt x="3255095" y="18288"/>
+                </a:cubicBezTo>
+                <a:cubicBezTo>
+                  <a:pt x="3088545" y="23203"/>
+                  <a:pt x="2687475" y="7419"/>
+                  <a:pt x="2538974" y="18288"/>
+                </a:cubicBezTo>
+                <a:cubicBezTo>
+                  <a:pt x="2390473" y="29157"/>
+                  <a:pt x="2137381" y="-8959"/>
+                  <a:pt x="1822853" y="18288"/>
+                </a:cubicBezTo>
+                <a:cubicBezTo>
+                  <a:pt x="1508325" y="45535"/>
+                  <a:pt x="1466437" y="20385"/>
+                  <a:pt x="1171834" y="18288"/>
+                </a:cubicBezTo>
+                <a:cubicBezTo>
+                  <a:pt x="877231" y="16191"/>
+                  <a:pt x="561097" y="37643"/>
+                  <a:pt x="0" y="18288"/>
+                </a:cubicBezTo>
+                <a:cubicBezTo>
+                  <a:pt x="-46" y="12483"/>
+                  <a:pt x="-203" y="6491"/>
+                  <a:pt x="0" y="0"/>
+                </a:cubicBezTo>
+                <a:close/>
+              </a:path>
+              <a:path w="3255095" h="18288" stroke="0" extrusionOk="0">
+                <a:moveTo>
+                  <a:pt x="0" y="0"/>
+                </a:moveTo>
+                <a:cubicBezTo>
+                  <a:pt x="291965" y="19429"/>
+                  <a:pt x="363155" y="8568"/>
+                  <a:pt x="618468" y="0"/>
+                </a:cubicBezTo>
+                <a:cubicBezTo>
+                  <a:pt x="873781" y="-8568"/>
+                  <a:pt x="904459" y="-19505"/>
+                  <a:pt x="1171834" y="0"/>
+                </a:cubicBezTo>
+                <a:cubicBezTo>
+                  <a:pt x="1439209" y="19505"/>
+                  <a:pt x="1744369" y="9790"/>
+                  <a:pt x="1887955" y="0"/>
+                </a:cubicBezTo>
+                <a:cubicBezTo>
+                  <a:pt x="2031541" y="-9790"/>
+                  <a:pt x="2346378" y="21240"/>
+                  <a:pt x="2506423" y="0"/>
+                </a:cubicBezTo>
+                <a:cubicBezTo>
+                  <a:pt x="2666468" y="-21240"/>
+                  <a:pt x="2990257" y="30414"/>
+                  <a:pt x="3255095" y="0"/>
+                </a:cubicBezTo>
+                <a:cubicBezTo>
+                  <a:pt x="3254831" y="4493"/>
+                  <a:pt x="3255479" y="9472"/>
+                  <a:pt x="3255095" y="18288"/>
+                </a:cubicBezTo>
+                <a:cubicBezTo>
+                  <a:pt x="3120743" y="16690"/>
+                  <a:pt x="2759628" y="42462"/>
+                  <a:pt x="2604076" y="18288"/>
+                </a:cubicBezTo>
+                <a:cubicBezTo>
+                  <a:pt x="2448524" y="-5886"/>
+                  <a:pt x="2184336" y="19599"/>
+                  <a:pt x="1887955" y="18288"/>
+                </a:cubicBezTo>
+                <a:cubicBezTo>
+                  <a:pt x="1591574" y="16977"/>
+                  <a:pt x="1548845" y="6870"/>
+                  <a:pt x="1334589" y="18288"/>
+                </a:cubicBezTo>
+                <a:cubicBezTo>
+                  <a:pt x="1120333" y="29706"/>
+                  <a:pt x="996014" y="9662"/>
+                  <a:pt x="683570" y="18288"/>
+                </a:cubicBezTo>
+                <a:cubicBezTo>
+                  <a:pt x="371126" y="26914"/>
+                  <a:pt x="198687" y="16167"/>
+                  <a:pt x="0" y="18288"/>
+                </a:cubicBezTo>
+                <a:cubicBezTo>
+                  <a:pt x="843" y="9577"/>
+                  <a:pt x="371" y="6900"/>
+                  <a:pt x="0" y="0"/>
+                </a:cubicBezTo>
+                <a:close/>
+              </a:path>
+            </a:pathLst>
+          </a:custGeom>
+          <a:solidFill>
+            <a:schemeClr val="accent2"/>
+          </a:solidFill>
+          <a:ln w="38100" cap="rnd">
+            <a:solidFill>
+              <a:schemeClr val="accent2"/>
+            </a:solidFill>
+            <a:round/>
+            <a:extLst>
+              <a:ext uri="{C807C97D-BFC1-408E-A445-0C87EB9F89A2}">
+                <ask:lineSketchStyleProps xmlns:ask="http://schemas.microsoft.com/office/drawing/2018/sketchyshapes" sd="1219033472">
+                  <a:prstGeom prst="rect">
+                    <a:avLst/>
+                  </a:prstGeom>
+                  <ask:type>
+                    <ask:lineSketchFreehand/>
+                  </ask:type>
+                </ask:lineSketchStyleProps>
+              </a:ext>
+            </a:extLst>
+          </a:ln>
+        </p:spPr>
+        <p:style>
+          <a:lnRef idx="2">
+            <a:schemeClr val="accent1">
+              <a:shade val="50000"/>
+            </a:schemeClr>
+          </a:lnRef>
+          <a:fillRef idx="1">
+            <a:schemeClr val="accent1"/>
+          </a:fillRef>
+          <a:effectRef idx="0">
+            <a:schemeClr val="accent1"/>
+          </a:effectRef>
+          <a:fontRef idx="minor">
+            <a:schemeClr val="lt1"/>
+          </a:fontRef>
+        </p:style>
+        <p:txBody>
+          <a:bodyPr rtlCol="0" anchor="ctr"/>
+          <a:lstStyle/>
+          <a:p>
+            <a:pPr algn="ctr"/>
+            <a:endParaRPr lang="en-US"/>
+          </a:p>
+        </p:txBody>
+      </p:sp>
       <p:sp>
         <p:nvSpPr>
           <p:cNvPr id="6" name="TextBox 5">
@@ -20371,8 +20178,8 @@
         </p:nvSpPr>
         <p:spPr>
           <a:xfrm>
-            <a:off x="6695359" y="2990818"/>
-            <a:ext cx="4158031" cy="2913872"/>
+            <a:off x="6739128" y="2664886"/>
+            <a:ext cx="4818888" cy="3550789"/>
           </a:xfrm>
           <a:prstGeom prst="rect">
             <a:avLst/>
@@ -20395,12 +20202,7 @@
               <a:buChar char="•"/>
             </a:pPr>
             <a:r>
-              <a:rPr lang="en-US" sz="1400" b="1" i="0" u="none" strike="noStrike" dirty="0">
-                <a:solidFill>
-                  <a:schemeClr val="tx1">
-                    <a:alpha val="80000"/>
-                  </a:schemeClr>
-                </a:solidFill>
+              <a:rPr lang="en-US" sz="1900" b="1" i="0" u="none" strike="noStrike">
                 <a:effectLst/>
               </a:rPr>
               <a:t>Current State:</a:t>
@@ -20418,12 +20220,7 @@
               <a:buChar char="•"/>
             </a:pPr>
             <a:r>
-              <a:rPr lang="en-US" sz="1400" b="0" i="0" u="none" strike="noStrike" dirty="0">
-                <a:solidFill>
-                  <a:schemeClr val="tx1">
-                    <a:alpha val="80000"/>
-                  </a:schemeClr>
-                </a:solidFill>
+              <a:rPr lang="en-US" sz="1900" b="0" i="0" u="none" strike="noStrike">
                 <a:effectLst/>
               </a:rPr>
               <a:t>Local deployment for Front-End (FE) and Back-End (BE) services.</a:t>
@@ -20441,12 +20238,7 @@
               <a:buChar char="•"/>
             </a:pPr>
             <a:r>
-              <a:rPr lang="en-US" sz="1400" b="0" i="0" u="none" strike="noStrike" dirty="0">
-                <a:solidFill>
-                  <a:schemeClr val="tx1">
-                    <a:alpha val="80000"/>
-                  </a:schemeClr>
-                </a:solidFill>
+              <a:rPr lang="en-US" sz="1900" b="0" i="0" u="none" strike="noStrike">
                 <a:effectLst/>
               </a:rPr>
               <a:t>Accessible via tunneling tools for testing and development.</a:t>
@@ -20464,12 +20256,7 @@
               <a:buChar char="•"/>
             </a:pPr>
             <a:r>
-              <a:rPr lang="en-US" sz="1400" b="1" i="0" u="none" strike="noStrike" dirty="0">
-                <a:solidFill>
-                  <a:schemeClr val="tx1">
-                    <a:alpha val="80000"/>
-                  </a:schemeClr>
-                </a:solidFill>
+              <a:rPr lang="en-US" sz="1900" b="1" i="0" u="none" strike="noStrike">
                 <a:effectLst/>
               </a:rPr>
               <a:t>Future Plan:</a:t>
@@ -20487,23 +20274,13 @@
               <a:buChar char="•"/>
             </a:pPr>
             <a:r>
-              <a:rPr lang="en-US" sz="1400" b="1" i="0" u="none" strike="noStrike" dirty="0">
-                <a:solidFill>
-                  <a:schemeClr val="tx1">
-                    <a:alpha val="80000"/>
-                  </a:schemeClr>
-                </a:solidFill>
+              <a:rPr lang="en-US" sz="1900" b="1" i="0" u="none" strike="noStrike">
                 <a:effectLst/>
               </a:rPr>
               <a:t>Cloud Deployment</a:t>
             </a:r>
             <a:r>
-              <a:rPr lang="en-US" sz="1400" b="0" i="0" u="none" strike="noStrike" dirty="0">
-                <a:solidFill>
-                  <a:schemeClr val="tx1">
-                    <a:alpha val="80000"/>
-                  </a:schemeClr>
-                </a:solidFill>
+              <a:rPr lang="en-US" sz="1900" b="0" i="0" u="none" strike="noStrike">
                 <a:effectLst/>
               </a:rPr>
               <a:t>:</a:t>
@@ -20521,12 +20298,7 @@
               <a:buChar char="•"/>
             </a:pPr>
             <a:r>
-              <a:rPr lang="en-US" sz="1400" b="0" i="0" u="none" strike="noStrike" dirty="0">
-                <a:solidFill>
-                  <a:schemeClr val="tx1">
-                    <a:alpha val="80000"/>
-                  </a:schemeClr>
-                </a:solidFill>
+              <a:rPr lang="en-US" sz="1900" b="0" i="0" u="none" strike="noStrike">
                 <a:effectLst/>
               </a:rPr>
               <a:t>Target platforms: AWS, Azure, or Google Cloud.</a:t>
@@ -20544,12 +20316,7 @@
               <a:buChar char="•"/>
             </a:pPr>
             <a:r>
-              <a:rPr lang="en-US" sz="1400" b="0" i="0" u="none" strike="noStrike" dirty="0">
-                <a:solidFill>
-                  <a:schemeClr val="tx1">
-                    <a:alpha val="80000"/>
-                  </a:schemeClr>
-                </a:solidFill>
+              <a:rPr lang="en-US" sz="1900" b="0" i="0" u="none" strike="noStrike">
                 <a:effectLst/>
               </a:rPr>
               <a:t>Goals: High availability, scalability, and secure access.</a:t>
@@ -20557,175 +20324,6 @@
           </a:p>
         </p:txBody>
       </p:sp>
-      <p:sp>
-        <p:nvSpPr>
-          <p:cNvPr id="54" name="Graphic 10">
-            <a:extLst>
-              <a:ext uri="{FF2B5EF4-FFF2-40B4-BE49-F238E27FC236}">
-                <a16:creationId xmlns:a16="http://schemas.microsoft.com/office/drawing/2014/main" id="{E3020543-B24B-4EC4-8FFC-8DD88EEA91A8}"/>
-              </a:ext>
-              <a:ext uri="{C183D7F6-B498-43B3-948B-1728B52AA6E4}">
-                <adec:decorative xmlns:adec="http://schemas.microsoft.com/office/drawing/2017/decorative" val="1"/>
-              </a:ext>
-            </a:extLst>
-          </p:cNvPr>
-          <p:cNvSpPr>
-            <a:spLocks noGrp="1" noRot="1" noChangeAspect="1" noMove="1" noResize="1" noEditPoints="1" noAdjustHandles="1" noChangeArrowheads="1" noChangeShapeType="1" noTextEdit="1"/>
-          </p:cNvSpPr>
-          <p:nvPr>
-            <p:extLst>
-              <p:ext uri="{386F3935-93C4-4BCD-93E2-E3B085C9AB24}">
-                <p16:designElem xmlns:p16="http://schemas.microsoft.com/office/powerpoint/2015/main" val="1"/>
-              </p:ext>
-            </p:extLst>
-          </p:nvPr>
-        </p:nvSpPr>
-        <p:spPr>
-          <a:xfrm>
-            <a:off x="5454149" y="5775082"/>
-            <a:ext cx="112426" cy="112426"/>
-          </a:xfrm>
-          <a:custGeom>
-            <a:avLst/>
-            <a:gdLst>
-              <a:gd name="connsiteX0" fmla="*/ 112426 w 112426"/>
-              <a:gd name="connsiteY0" fmla="*/ 56213 h 112426"/>
-              <a:gd name="connsiteX1" fmla="*/ 56213 w 112426"/>
-              <a:gd name="connsiteY1" fmla="*/ 112426 h 112426"/>
-              <a:gd name="connsiteX2" fmla="*/ 0 w 112426"/>
-              <a:gd name="connsiteY2" fmla="*/ 56213 h 112426"/>
-              <a:gd name="connsiteX3" fmla="*/ 56213 w 112426"/>
-              <a:gd name="connsiteY3" fmla="*/ 0 h 112426"/>
-              <a:gd name="connsiteX4" fmla="*/ 112426 w 112426"/>
-              <a:gd name="connsiteY4" fmla="*/ 56213 h 112426"/>
-            </a:gdLst>
-            <a:ahLst/>
-            <a:cxnLst>
-              <a:cxn ang="0">
-                <a:pos x="connsiteX0" y="connsiteY0"/>
-              </a:cxn>
-              <a:cxn ang="0">
-                <a:pos x="connsiteX1" y="connsiteY1"/>
-              </a:cxn>
-              <a:cxn ang="0">
-                <a:pos x="connsiteX2" y="connsiteY2"/>
-              </a:cxn>
-              <a:cxn ang="0">
-                <a:pos x="connsiteX3" y="connsiteY3"/>
-              </a:cxn>
-              <a:cxn ang="0">
-                <a:pos x="connsiteX4" y="connsiteY4"/>
-              </a:cxn>
-            </a:cxnLst>
-            <a:rect l="l" t="t" r="r" b="b"/>
-            <a:pathLst>
-              <a:path w="112426" h="112426">
-                <a:moveTo>
-                  <a:pt x="112426" y="56213"/>
-                </a:moveTo>
-                <a:cubicBezTo>
-                  <a:pt x="112426" y="87259"/>
-                  <a:pt x="87259" y="112426"/>
-                  <a:pt x="56213" y="112426"/>
-                </a:cubicBezTo>
-                <a:cubicBezTo>
-                  <a:pt x="25167" y="112426"/>
-                  <a:pt x="0" y="87259"/>
-                  <a:pt x="0" y="56213"/>
-                </a:cubicBezTo>
-                <a:cubicBezTo>
-                  <a:pt x="0" y="25167"/>
-                  <a:pt x="25167" y="0"/>
-                  <a:pt x="56213" y="0"/>
-                </a:cubicBezTo>
-                <a:cubicBezTo>
-                  <a:pt x="87259" y="0"/>
-                  <a:pt x="112426" y="25167"/>
-                  <a:pt x="112426" y="56213"/>
-                </a:cubicBezTo>
-                <a:close/>
-              </a:path>
-            </a:pathLst>
-          </a:custGeom>
-          <a:solidFill>
-            <a:schemeClr val="accent1"/>
-          </a:solidFill>
-          <a:ln w="516" cap="flat">
-            <a:noFill/>
-            <a:prstDash val="solid"/>
-            <a:miter/>
-          </a:ln>
-        </p:spPr>
-        <p:txBody>
-          <a:bodyPr rtlCol="0" anchor="ctr"/>
-          <a:lstStyle/>
-          <a:p>
-            <a:endParaRPr lang="en-US"/>
-          </a:p>
-        </p:txBody>
-      </p:sp>
-      <p:cxnSp>
-        <p:nvCxnSpPr>
-          <p:cNvPr id="56" name="Straight Connector 55">
-            <a:extLst>
-              <a:ext uri="{FF2B5EF4-FFF2-40B4-BE49-F238E27FC236}">
-                <a16:creationId xmlns:a16="http://schemas.microsoft.com/office/drawing/2014/main" id="{C49DA8F6-BCC1-4447-B54C-57856834B94B}"/>
-              </a:ext>
-              <a:ext uri="{C183D7F6-B498-43B3-948B-1728B52AA6E4}">
-                <adec:decorative xmlns:adec="http://schemas.microsoft.com/office/drawing/2017/decorative" val="1"/>
-              </a:ext>
-            </a:extLst>
-          </p:cNvPr>
-          <p:cNvCxnSpPr>
-            <a:cxnSpLocks noGrp="1" noRot="1" noChangeAspect="1" noMove="1" noResize="1" noEditPoints="1" noAdjustHandles="1" noChangeArrowheads="1" noChangeShapeType="1"/>
-          </p:cNvCxnSpPr>
-          <p:nvPr>
-            <p:extLst>
-              <p:ext uri="{386F3935-93C4-4BCD-93E2-E3B085C9AB24}">
-                <p16:designElem xmlns:p16="http://schemas.microsoft.com/office/powerpoint/2015/main" val="1"/>
-              </p:ext>
-            </p:extLst>
-          </p:nvPr>
-        </p:nvCxnSpPr>
-        <p:spPr>
-          <a:xfrm>
-            <a:off x="11586162" y="3610394"/>
-            <a:ext cx="0" cy="3238728"/>
-          </a:xfrm>
-          <a:prstGeom prst="line">
-            <a:avLst/>
-          </a:prstGeom>
-          <a:ln w="25400" cap="sq">
-            <a:gradFill flip="none" rotWithShape="1">
-              <a:gsLst>
-                <a:gs pos="0">
-                  <a:schemeClr val="accent1"/>
-                </a:gs>
-                <a:gs pos="100000">
-                  <a:schemeClr val="accent2"/>
-                </a:gs>
-              </a:gsLst>
-              <a:lin ang="16200000" scaled="1"/>
-              <a:tileRect/>
-            </a:gradFill>
-            <a:bevel/>
-          </a:ln>
-        </p:spPr>
-        <p:style>
-          <a:lnRef idx="1">
-            <a:schemeClr val="accent1"/>
-          </a:lnRef>
-          <a:fillRef idx="0">
-            <a:schemeClr val="accent1"/>
-          </a:fillRef>
-          <a:effectRef idx="0">
-            <a:schemeClr val="accent1"/>
-          </a:effectRef>
-          <a:fontRef idx="minor">
-            <a:schemeClr val="tx1"/>
-          </a:fontRef>
-        </p:style>
-      </p:cxnSp>
     </p:spTree>
     <p:extLst>
       <p:ext uri="{BB962C8B-B14F-4D97-AF65-F5344CB8AC3E}">
@@ -20764,12 +20362,12 @@
           <a:chExt cx="0" cy="0"/>
         </a:xfrm>
       </p:grpSpPr>
-      <p:sp>
+      <p:sp useBgFill="1">
         <p:nvSpPr>
-          <p:cNvPr id="10" name="Rectangle 9">
+          <p:cNvPr id="27" name="Rectangle 26">
             <a:extLst>
               <a:ext uri="{FF2B5EF4-FFF2-40B4-BE49-F238E27FC236}">
-                <a16:creationId xmlns:a16="http://schemas.microsoft.com/office/drawing/2014/main" id="{F3060C83-F051-4F0E-ABAD-AA0DFC48B218}"/>
+                <a16:creationId xmlns:a16="http://schemas.microsoft.com/office/drawing/2014/main" id="{2D2B266D-3625-4584-A5C3-7D3F672CFF30}"/>
               </a:ext>
               <a:ext uri="{C183D7F6-B498-43B3-948B-1728B52AA6E4}">
                 <adec:decorative xmlns:adec="http://schemas.microsoft.com/office/drawing/2017/decorative" val="1"/>
@@ -20790,14 +20388,11 @@
         <p:spPr>
           <a:xfrm>
             <a:off x="0" y="0"/>
-            <a:ext cx="12192000" cy="6858000"/>
+            <a:ext cx="12188952" cy="6858000"/>
           </a:xfrm>
           <a:prstGeom prst="rect">
             <a:avLst/>
           </a:prstGeom>
-          <a:solidFill>
-            <a:schemeClr val="bg1"/>
-          </a:solidFill>
           <a:ln>
             <a:noFill/>
           </a:ln>
@@ -20823,16 +20418,16 @@
           <a:lstStyle/>
           <a:p>
             <a:pPr algn="ctr"/>
-            <a:endParaRPr lang="en-US" dirty="0"/>
+            <a:endParaRPr lang="en-US"/>
           </a:p>
         </p:txBody>
       </p:sp>
       <p:sp>
         <p:nvSpPr>
-          <p:cNvPr id="12" name="Freeform: Shape 11">
+          <p:cNvPr id="29" name="Rectangle 28">
             <a:extLst>
               <a:ext uri="{FF2B5EF4-FFF2-40B4-BE49-F238E27FC236}">
-                <a16:creationId xmlns:a16="http://schemas.microsoft.com/office/drawing/2014/main" id="{83C98ABE-055B-441F-B07E-44F97F083C39}"/>
+                <a16:creationId xmlns:a16="http://schemas.microsoft.com/office/drawing/2014/main" id="{C463B99A-73EE-4FBB-B7C4-F9F9BCC25C65}"/>
               </a:ext>
               <a:ext uri="{C183D7F6-B498-43B3-948B-1728B52AA6E4}">
                 <adec:decorative xmlns:adec="http://schemas.microsoft.com/office/drawing/2017/decorative" val="1"/>
@@ -20851,133 +20446,15 @@
           </p:nvPr>
         </p:nvSpPr>
         <p:spPr>
-          <a:xfrm rot="18900000" flipH="1">
-            <a:off x="-376156" y="-253670"/>
-            <a:ext cx="1827638" cy="1376989"/>
-          </a:xfrm>
-          <a:custGeom>
-            <a:avLst/>
-            <a:gdLst>
-              <a:gd name="connsiteX0" fmla="*/ 0 w 1827638"/>
-              <a:gd name="connsiteY0" fmla="*/ 987379 h 1376989"/>
-              <a:gd name="connsiteX1" fmla="*/ 987379 w 1827638"/>
-              <a:gd name="connsiteY1" fmla="*/ 0 h 1376989"/>
-              <a:gd name="connsiteX2" fmla="*/ 1827638 w 1827638"/>
-              <a:gd name="connsiteY2" fmla="*/ 840260 h 1376989"/>
-              <a:gd name="connsiteX3" fmla="*/ 1827638 w 1827638"/>
-              <a:gd name="connsiteY3" fmla="*/ 1376989 h 1376989"/>
-              <a:gd name="connsiteX4" fmla="*/ 0 w 1827638"/>
-              <a:gd name="connsiteY4" fmla="*/ 1376989 h 1376989"/>
-            </a:gdLst>
-            <a:ahLst/>
-            <a:cxnLst>
-              <a:cxn ang="0">
-                <a:pos x="connsiteX0" y="connsiteY0"/>
-              </a:cxn>
-              <a:cxn ang="0">
-                <a:pos x="connsiteX1" y="connsiteY1"/>
-              </a:cxn>
-              <a:cxn ang="0">
-                <a:pos x="connsiteX2" y="connsiteY2"/>
-              </a:cxn>
-              <a:cxn ang="0">
-                <a:pos x="connsiteX3" y="connsiteY3"/>
-              </a:cxn>
-              <a:cxn ang="0">
-                <a:pos x="connsiteX4" y="connsiteY4"/>
-              </a:cxn>
-            </a:cxnLst>
-            <a:rect l="l" t="t" r="r" b="b"/>
-            <a:pathLst>
-              <a:path w="1827638" h="1376989">
-                <a:moveTo>
-                  <a:pt x="0" y="987379"/>
-                </a:moveTo>
-                <a:lnTo>
-                  <a:pt x="987379" y="0"/>
-                </a:lnTo>
-                <a:lnTo>
-                  <a:pt x="1827638" y="840260"/>
-                </a:lnTo>
-                <a:lnTo>
-                  <a:pt x="1827638" y="1376989"/>
-                </a:lnTo>
-                <a:lnTo>
-                  <a:pt x="0" y="1376989"/>
-                </a:lnTo>
-                <a:close/>
-              </a:path>
-            </a:pathLst>
-          </a:custGeom>
-          <a:solidFill>
-            <a:schemeClr val="accent1">
-              <a:alpha val="30000"/>
-            </a:schemeClr>
-          </a:solidFill>
-          <a:ln>
-            <a:noFill/>
-          </a:ln>
-        </p:spPr>
-        <p:style>
-          <a:lnRef idx="2">
-            <a:schemeClr val="accent1">
-              <a:shade val="50000"/>
-            </a:schemeClr>
-          </a:lnRef>
-          <a:fillRef idx="1">
-            <a:schemeClr val="accent1"/>
-          </a:fillRef>
-          <a:effectRef idx="0">
-            <a:schemeClr val="accent1"/>
-          </a:effectRef>
-          <a:fontRef idx="minor">
-            <a:schemeClr val="lt1"/>
-          </a:fontRef>
-        </p:style>
-        <p:txBody>
-          <a:bodyPr rtlCol="0" anchor="ctr"/>
-          <a:lstStyle/>
-          <a:p>
-            <a:pPr algn="ctr"/>
-            <a:endParaRPr lang="en-US" dirty="0"/>
-          </a:p>
-        </p:txBody>
-      </p:sp>
-      <p:sp>
-        <p:nvSpPr>
-          <p:cNvPr id="14" name="Rectangle 13">
-            <a:extLst>
-              <a:ext uri="{FF2B5EF4-FFF2-40B4-BE49-F238E27FC236}">
-                <a16:creationId xmlns:a16="http://schemas.microsoft.com/office/drawing/2014/main" id="{29FDB030-9B49-4CED-8CCD-4D99382388AC}"/>
-              </a:ext>
-              <a:ext uri="{C183D7F6-B498-43B3-948B-1728B52AA6E4}">
-                <adec:decorative xmlns:adec="http://schemas.microsoft.com/office/drawing/2017/decorative" val="1"/>
-              </a:ext>
-            </a:extLst>
-          </p:cNvPr>
-          <p:cNvSpPr>
-            <a:spLocks noGrp="1" noRot="1" noChangeAspect="1" noMove="1" noResize="1" noEditPoints="1" noAdjustHandles="1" noChangeArrowheads="1" noChangeShapeType="1" noTextEdit="1"/>
-          </p:cNvSpPr>
-          <p:nvPr>
-            <p:extLst>
-              <p:ext uri="{386F3935-93C4-4BCD-93E2-E3B085C9AB24}">
-                <p16:designElem xmlns:p16="http://schemas.microsoft.com/office/powerpoint/2015/main" val="1"/>
-              </p:ext>
-            </p:extLst>
-          </p:nvPr>
-        </p:nvSpPr>
-        <p:spPr>
-          <a:xfrm rot="18900000" flipH="1">
-            <a:off x="891641" y="422146"/>
-            <a:ext cx="645368" cy="645368"/>
+          <a:xfrm>
+            <a:off x="0" y="0"/>
+            <a:ext cx="12188952" cy="6858000"/>
           </a:xfrm>
           <a:prstGeom prst="rect">
             <a:avLst/>
           </a:prstGeom>
           <a:solidFill>
-            <a:schemeClr val="accent1">
-              <a:alpha val="30000"/>
-            </a:schemeClr>
+            <a:schemeClr val="accent2"/>
           </a:solidFill>
           <a:ln>
             <a:noFill/>
@@ -21010,10 +20487,10 @@
       </p:sp>
       <p:sp>
         <p:nvSpPr>
-          <p:cNvPr id="16" name="Rectangle 15">
+          <p:cNvPr id="31" name="Freeform: Shape 30">
             <a:extLst>
               <a:ext uri="{FF2B5EF4-FFF2-40B4-BE49-F238E27FC236}">
-                <a16:creationId xmlns:a16="http://schemas.microsoft.com/office/drawing/2014/main" id="{3783CA14-24A1-485C-8B30-D6A5D87987AD}"/>
+                <a16:creationId xmlns:a16="http://schemas.microsoft.com/office/drawing/2014/main" id="{A5D2A5D1-BA0D-47D3-B051-DA7743C46E28}"/>
               </a:ext>
               <a:ext uri="{C183D7F6-B498-43B3-948B-1728B52AA6E4}">
                 <adec:decorative xmlns:adec="http://schemas.microsoft.com/office/drawing/2017/decorative" val="1"/>
@@ -21032,86 +20509,131 @@
           </p:nvPr>
         </p:nvSpPr>
         <p:spPr>
-          <a:xfrm rot="18900000" flipH="1">
-            <a:off x="10043482" y="655140"/>
-            <a:ext cx="687472" cy="687472"/>
-          </a:xfrm>
-          <a:prstGeom prst="rect">
-            <a:avLst/>
-          </a:prstGeom>
-          <a:solidFill>
-            <a:schemeClr val="accent4">
-              <a:alpha val="30000"/>
-            </a:schemeClr>
-          </a:solidFill>
-          <a:ln>
-            <a:noFill/>
-          </a:ln>
-        </p:spPr>
-        <p:style>
-          <a:lnRef idx="2">
-            <a:schemeClr val="accent1">
-              <a:shade val="50000"/>
-            </a:schemeClr>
-          </a:lnRef>
-          <a:fillRef idx="1">
-            <a:schemeClr val="accent1"/>
-          </a:fillRef>
-          <a:effectRef idx="0">
-            <a:schemeClr val="accent1"/>
-          </a:effectRef>
-          <a:fontRef idx="minor">
-            <a:schemeClr val="lt1"/>
-          </a:fontRef>
-        </p:style>
-        <p:txBody>
-          <a:bodyPr rtlCol="0" anchor="ctr"/>
-          <a:lstStyle/>
-          <a:p>
-            <a:pPr algn="ctr"/>
-            <a:endParaRPr lang="en-US"/>
-          </a:p>
-        </p:txBody>
-      </p:sp>
-      <p:sp>
-        <p:nvSpPr>
-          <p:cNvPr id="18" name="Freeform: Shape 17">
-            <a:extLst>
-              <a:ext uri="{FF2B5EF4-FFF2-40B4-BE49-F238E27FC236}">
-                <a16:creationId xmlns:a16="http://schemas.microsoft.com/office/drawing/2014/main" id="{9A97C86A-04D6-40F7-AE84-31AB43E6A846}"/>
-              </a:ext>
-              <a:ext uri="{C183D7F6-B498-43B3-948B-1728B52AA6E4}">
-                <adec:decorative xmlns:adec="http://schemas.microsoft.com/office/drawing/2017/decorative" val="1"/>
-              </a:ext>
-            </a:extLst>
-          </p:cNvPr>
-          <p:cNvSpPr>
-            <a:spLocks noGrp="1" noRot="1" noChangeAspect="1" noMove="1" noResize="1" noEditPoints="1" noAdjustHandles="1" noChangeArrowheads="1" noChangeShapeType="1" noTextEdit="1"/>
-          </p:cNvSpPr>
-          <p:nvPr>
-            <p:extLst>
-              <p:ext uri="{386F3935-93C4-4BCD-93E2-E3B085C9AB24}">
-                <p16:designElem xmlns:p16="http://schemas.microsoft.com/office/powerpoint/2015/main" val="1"/>
-              </p:ext>
-            </p:extLst>
-          </p:nvPr>
-        </p:nvSpPr>
-        <p:spPr>
-          <a:xfrm rot="10800000" flipH="1">
-            <a:off x="9356643" y="0"/>
-            <a:ext cx="2835357" cy="1480837"/>
+          <a:xfrm>
+            <a:off x="0" y="0"/>
+            <a:ext cx="12192000" cy="6219825"/>
           </a:xfrm>
           <a:custGeom>
             <a:avLst/>
             <a:gdLst>
-              <a:gd name="connsiteX0" fmla="*/ 2835357 w 2835357"/>
-              <a:gd name="connsiteY0" fmla="*/ 1480837 h 1480837"/>
-              <a:gd name="connsiteX1" fmla="*/ 0 w 2835357"/>
-              <a:gd name="connsiteY1" fmla="*/ 1480837 h 1480837"/>
-              <a:gd name="connsiteX2" fmla="*/ 1552727 w 2835357"/>
-              <a:gd name="connsiteY2" fmla="*/ 0 h 1480837"/>
-              <a:gd name="connsiteX3" fmla="*/ 2835357 w 2835357"/>
-              <a:gd name="connsiteY3" fmla="*/ 1223245 h 1480837"/>
+              <a:gd name="connsiteX0" fmla="*/ 6789701 w 12192000"/>
+              <a:gd name="connsiteY0" fmla="*/ 6151588 h 6219825"/>
+              <a:gd name="connsiteX1" fmla="*/ 6788702 w 12192000"/>
+              <a:gd name="connsiteY1" fmla="*/ 6151666 h 6219825"/>
+              <a:gd name="connsiteX2" fmla="*/ 6788476 w 12192000"/>
+              <a:gd name="connsiteY2" fmla="*/ 6152200 h 6219825"/>
+              <a:gd name="connsiteX3" fmla="*/ 9834 w 12192000"/>
+              <a:gd name="connsiteY3" fmla="*/ 0 h 6219825"/>
+              <a:gd name="connsiteX4" fmla="*/ 12357 w 12192000"/>
+              <a:gd name="connsiteY4" fmla="*/ 1 h 6219825"/>
+              <a:gd name="connsiteX5" fmla="*/ 12192000 w 12192000"/>
+              <a:gd name="connsiteY5" fmla="*/ 1 h 6219825"/>
+              <a:gd name="connsiteX6" fmla="*/ 12192000 w 12192000"/>
+              <a:gd name="connsiteY6" fmla="*/ 5105401 h 6219825"/>
+              <a:gd name="connsiteX7" fmla="*/ 12191716 w 12192000"/>
+              <a:gd name="connsiteY7" fmla="*/ 5105401 h 6219825"/>
+              <a:gd name="connsiteX8" fmla="*/ 12192000 w 12192000"/>
+              <a:gd name="connsiteY8" fmla="*/ 5256977 h 6219825"/>
+              <a:gd name="connsiteX9" fmla="*/ 12061096 w 12192000"/>
+              <a:gd name="connsiteY9" fmla="*/ 5296034 h 6219825"/>
+              <a:gd name="connsiteX10" fmla="*/ 11676800 w 12192000"/>
+              <a:gd name="connsiteY10" fmla="*/ 5399652 h 6219825"/>
+              <a:gd name="connsiteX11" fmla="*/ 10425355 w 12192000"/>
+              <a:gd name="connsiteY11" fmla="*/ 5683310 h 6219825"/>
+              <a:gd name="connsiteX12" fmla="*/ 9424022 w 12192000"/>
+              <a:gd name="connsiteY12" fmla="*/ 5858546 h 6219825"/>
+              <a:gd name="connsiteX13" fmla="*/ 8458419 w 12192000"/>
+              <a:gd name="connsiteY13" fmla="*/ 5992303 h 6219825"/>
+              <a:gd name="connsiteX14" fmla="*/ 7715970 w 12192000"/>
+              <a:gd name="connsiteY14" fmla="*/ 6072283 h 6219825"/>
+              <a:gd name="connsiteX15" fmla="*/ 6951716 w 12192000"/>
+              <a:gd name="connsiteY15" fmla="*/ 6138091 h 6219825"/>
+              <a:gd name="connsiteX16" fmla="*/ 6936303 w 12192000"/>
+              <a:gd name="connsiteY16" fmla="*/ 6140163 h 6219825"/>
+              <a:gd name="connsiteX17" fmla="*/ 6790448 w 12192000"/>
+              <a:gd name="connsiteY17" fmla="*/ 6151529 h 6219825"/>
+              <a:gd name="connsiteX18" fmla="*/ 6799941 w 12192000"/>
+              <a:gd name="connsiteY18" fmla="*/ 6153349 h 6219825"/>
+              <a:gd name="connsiteX19" fmla="*/ 6835432 w 12192000"/>
+              <a:gd name="connsiteY19" fmla="*/ 6151642 h 6219825"/>
+              <a:gd name="connsiteX20" fmla="*/ 6884003 w 12192000"/>
+              <a:gd name="connsiteY20" fmla="*/ 6148662 h 6219825"/>
+              <a:gd name="connsiteX21" fmla="*/ 7578771 w 12192000"/>
+              <a:gd name="connsiteY21" fmla="*/ 6116122 h 6219825"/>
+              <a:gd name="connsiteX22" fmla="*/ 8623845 w 12192000"/>
+              <a:gd name="connsiteY22" fmla="*/ 6029188 h 6219825"/>
+              <a:gd name="connsiteX23" fmla="*/ 9479970 w 12192000"/>
+              <a:gd name="connsiteY23" fmla="*/ 5925239 h 6219825"/>
+              <a:gd name="connsiteX24" fmla="*/ 10629308 w 12192000"/>
+              <a:gd name="connsiteY24" fmla="*/ 5731000 h 6219825"/>
+              <a:gd name="connsiteX25" fmla="*/ 11998498 w 12192000"/>
+              <a:gd name="connsiteY25" fmla="*/ 5404869 h 6219825"/>
+              <a:gd name="connsiteX26" fmla="*/ 12192000 w 12192000"/>
+              <a:gd name="connsiteY26" fmla="*/ 5347846 h 6219825"/>
+              <a:gd name="connsiteX27" fmla="*/ 12192000 w 12192000"/>
+              <a:gd name="connsiteY27" fmla="*/ 5402606 h 6219825"/>
+              <a:gd name="connsiteX28" fmla="*/ 11829257 w 12192000"/>
+              <a:gd name="connsiteY28" fmla="*/ 5507950 h 6219825"/>
+              <a:gd name="connsiteX29" fmla="*/ 10939183 w 12192000"/>
+              <a:gd name="connsiteY29" fmla="*/ 5722555 h 6219825"/>
+              <a:gd name="connsiteX30" fmla="*/ 9985530 w 12192000"/>
+              <a:gd name="connsiteY30" fmla="*/ 5902635 h 6219825"/>
+              <a:gd name="connsiteX31" fmla="*/ 9186882 w 12192000"/>
+              <a:gd name="connsiteY31" fmla="*/ 6018631 h 6219825"/>
+              <a:gd name="connsiteX32" fmla="*/ 8578198 w 12192000"/>
+              <a:gd name="connsiteY32" fmla="*/ 6088179 h 6219825"/>
+              <a:gd name="connsiteX33" fmla="*/ 7864358 w 12192000"/>
+              <a:gd name="connsiteY33" fmla="*/ 6149656 h 6219825"/>
+              <a:gd name="connsiteX34" fmla="*/ 6935502 w 12192000"/>
+              <a:gd name="connsiteY34" fmla="*/ 6201071 h 6219825"/>
+              <a:gd name="connsiteX35" fmla="*/ 6477750 w 12192000"/>
+              <a:gd name="connsiteY35" fmla="*/ 6214980 h 6219825"/>
+              <a:gd name="connsiteX36" fmla="*/ 6362294 w 12192000"/>
+              <a:gd name="connsiteY36" fmla="*/ 6219825 h 6219825"/>
+              <a:gd name="connsiteX37" fmla="*/ 6057129 w 12192000"/>
+              <a:gd name="connsiteY37" fmla="*/ 6219825 h 6219825"/>
+              <a:gd name="connsiteX38" fmla="*/ 5977784 w 12192000"/>
+              <a:gd name="connsiteY38" fmla="*/ 6215229 h 6219825"/>
+              <a:gd name="connsiteX39" fmla="*/ 5265087 w 12192000"/>
+              <a:gd name="connsiteY39" fmla="*/ 6178965 h 6219825"/>
+              <a:gd name="connsiteX40" fmla="*/ 4346277 w 12192000"/>
+              <a:gd name="connsiteY40" fmla="*/ 6116869 h 6219825"/>
+              <a:gd name="connsiteX41" fmla="*/ 3373045 w 12192000"/>
+              <a:gd name="connsiteY41" fmla="*/ 6018259 h 6219825"/>
+              <a:gd name="connsiteX42" fmla="*/ 2362173 w 12192000"/>
+              <a:gd name="connsiteY42" fmla="*/ 5899282 h 6219825"/>
+              <a:gd name="connsiteX43" fmla="*/ 1233178 w 12192000"/>
+              <a:gd name="connsiteY43" fmla="*/ 5726033 h 6219825"/>
+              <a:gd name="connsiteX44" fmla="*/ 68500 w 12192000"/>
+              <a:gd name="connsiteY44" fmla="*/ 5486226 h 6219825"/>
+              <a:gd name="connsiteX45" fmla="*/ 0 w 12192000"/>
+              <a:gd name="connsiteY45" fmla="*/ 5468863 h 6219825"/>
+              <a:gd name="connsiteX46" fmla="*/ 0 w 12192000"/>
+              <a:gd name="connsiteY46" fmla="*/ 5412351 h 6219825"/>
+              <a:gd name="connsiteX47" fmla="*/ 72441 w 12192000"/>
+              <a:gd name="connsiteY47" fmla="*/ 5431135 h 6219825"/>
+              <a:gd name="connsiteX48" fmla="*/ 600716 w 12192000"/>
+              <a:gd name="connsiteY48" fmla="*/ 5549555 h 6219825"/>
+              <a:gd name="connsiteX49" fmla="*/ 1769512 w 12192000"/>
+              <a:gd name="connsiteY49" fmla="*/ 5759811 h 6219825"/>
+              <a:gd name="connsiteX50" fmla="*/ 2613554 w 12192000"/>
+              <a:gd name="connsiteY50" fmla="*/ 5876802 h 6219825"/>
+              <a:gd name="connsiteX51" fmla="*/ 2581134 w 12192000"/>
+              <a:gd name="connsiteY51" fmla="*/ 5866867 h 6219825"/>
+              <a:gd name="connsiteX52" fmla="*/ 1112635 w 12192000"/>
+              <a:gd name="connsiteY52" fmla="*/ 5534031 h 6219825"/>
+              <a:gd name="connsiteX53" fmla="*/ 420412 w 12192000"/>
+              <a:gd name="connsiteY53" fmla="*/ 5334514 h 6219825"/>
+              <a:gd name="connsiteX54" fmla="*/ 0 w 12192000"/>
+              <a:gd name="connsiteY54" fmla="*/ 5195539 h 6219825"/>
+              <a:gd name="connsiteX55" fmla="*/ 60 w 12192000"/>
+              <a:gd name="connsiteY55" fmla="*/ 5105401 h 6219825"/>
+              <a:gd name="connsiteX56" fmla="*/ 0 w 12192000"/>
+              <a:gd name="connsiteY56" fmla="*/ 5105401 h 6219825"/>
+              <a:gd name="connsiteX57" fmla="*/ 0 w 12192000"/>
+              <a:gd name="connsiteY57" fmla="*/ 1 h 6219825"/>
+              <a:gd name="connsiteX58" fmla="*/ 9834 w 12192000"/>
+              <a:gd name="connsiteY58" fmla="*/ 1 h 6219825"/>
             </a:gdLst>
             <a:ahLst/>
             <a:cxnLst>
@@ -21127,30 +20649,417 @@
               <a:cxn ang="0">
                 <a:pos x="connsiteX3" y="connsiteY3"/>
               </a:cxn>
+              <a:cxn ang="0">
+                <a:pos x="connsiteX4" y="connsiteY4"/>
+              </a:cxn>
+              <a:cxn ang="0">
+                <a:pos x="connsiteX5" y="connsiteY5"/>
+              </a:cxn>
+              <a:cxn ang="0">
+                <a:pos x="connsiteX6" y="connsiteY6"/>
+              </a:cxn>
+              <a:cxn ang="0">
+                <a:pos x="connsiteX7" y="connsiteY7"/>
+              </a:cxn>
+              <a:cxn ang="0">
+                <a:pos x="connsiteX8" y="connsiteY8"/>
+              </a:cxn>
+              <a:cxn ang="0">
+                <a:pos x="connsiteX9" y="connsiteY9"/>
+              </a:cxn>
+              <a:cxn ang="0">
+                <a:pos x="connsiteX10" y="connsiteY10"/>
+              </a:cxn>
+              <a:cxn ang="0">
+                <a:pos x="connsiteX11" y="connsiteY11"/>
+              </a:cxn>
+              <a:cxn ang="0">
+                <a:pos x="connsiteX12" y="connsiteY12"/>
+              </a:cxn>
+              <a:cxn ang="0">
+                <a:pos x="connsiteX13" y="connsiteY13"/>
+              </a:cxn>
+              <a:cxn ang="0">
+                <a:pos x="connsiteX14" y="connsiteY14"/>
+              </a:cxn>
+              <a:cxn ang="0">
+                <a:pos x="connsiteX15" y="connsiteY15"/>
+              </a:cxn>
+              <a:cxn ang="0">
+                <a:pos x="connsiteX16" y="connsiteY16"/>
+              </a:cxn>
+              <a:cxn ang="0">
+                <a:pos x="connsiteX17" y="connsiteY17"/>
+              </a:cxn>
+              <a:cxn ang="0">
+                <a:pos x="connsiteX18" y="connsiteY18"/>
+              </a:cxn>
+              <a:cxn ang="0">
+                <a:pos x="connsiteX19" y="connsiteY19"/>
+              </a:cxn>
+              <a:cxn ang="0">
+                <a:pos x="connsiteX20" y="connsiteY20"/>
+              </a:cxn>
+              <a:cxn ang="0">
+                <a:pos x="connsiteX21" y="connsiteY21"/>
+              </a:cxn>
+              <a:cxn ang="0">
+                <a:pos x="connsiteX22" y="connsiteY22"/>
+              </a:cxn>
+              <a:cxn ang="0">
+                <a:pos x="connsiteX23" y="connsiteY23"/>
+              </a:cxn>
+              <a:cxn ang="0">
+                <a:pos x="connsiteX24" y="connsiteY24"/>
+              </a:cxn>
+              <a:cxn ang="0">
+                <a:pos x="connsiteX25" y="connsiteY25"/>
+              </a:cxn>
+              <a:cxn ang="0">
+                <a:pos x="connsiteX26" y="connsiteY26"/>
+              </a:cxn>
+              <a:cxn ang="0">
+                <a:pos x="connsiteX27" y="connsiteY27"/>
+              </a:cxn>
+              <a:cxn ang="0">
+                <a:pos x="connsiteX28" y="connsiteY28"/>
+              </a:cxn>
+              <a:cxn ang="0">
+                <a:pos x="connsiteX29" y="connsiteY29"/>
+              </a:cxn>
+              <a:cxn ang="0">
+                <a:pos x="connsiteX30" y="connsiteY30"/>
+              </a:cxn>
+              <a:cxn ang="0">
+                <a:pos x="connsiteX31" y="connsiteY31"/>
+              </a:cxn>
+              <a:cxn ang="0">
+                <a:pos x="connsiteX32" y="connsiteY32"/>
+              </a:cxn>
+              <a:cxn ang="0">
+                <a:pos x="connsiteX33" y="connsiteY33"/>
+              </a:cxn>
+              <a:cxn ang="0">
+                <a:pos x="connsiteX34" y="connsiteY34"/>
+              </a:cxn>
+              <a:cxn ang="0">
+                <a:pos x="connsiteX35" y="connsiteY35"/>
+              </a:cxn>
+              <a:cxn ang="0">
+                <a:pos x="connsiteX36" y="connsiteY36"/>
+              </a:cxn>
+              <a:cxn ang="0">
+                <a:pos x="connsiteX37" y="connsiteY37"/>
+              </a:cxn>
+              <a:cxn ang="0">
+                <a:pos x="connsiteX38" y="connsiteY38"/>
+              </a:cxn>
+              <a:cxn ang="0">
+                <a:pos x="connsiteX39" y="connsiteY39"/>
+              </a:cxn>
+              <a:cxn ang="0">
+                <a:pos x="connsiteX40" y="connsiteY40"/>
+              </a:cxn>
+              <a:cxn ang="0">
+                <a:pos x="connsiteX41" y="connsiteY41"/>
+              </a:cxn>
+              <a:cxn ang="0">
+                <a:pos x="connsiteX42" y="connsiteY42"/>
+              </a:cxn>
+              <a:cxn ang="0">
+                <a:pos x="connsiteX43" y="connsiteY43"/>
+              </a:cxn>
+              <a:cxn ang="0">
+                <a:pos x="connsiteX44" y="connsiteY44"/>
+              </a:cxn>
+              <a:cxn ang="0">
+                <a:pos x="connsiteX45" y="connsiteY45"/>
+              </a:cxn>
+              <a:cxn ang="0">
+                <a:pos x="connsiteX46" y="connsiteY46"/>
+              </a:cxn>
+              <a:cxn ang="0">
+                <a:pos x="connsiteX47" y="connsiteY47"/>
+              </a:cxn>
+              <a:cxn ang="0">
+                <a:pos x="connsiteX48" y="connsiteY48"/>
+              </a:cxn>
+              <a:cxn ang="0">
+                <a:pos x="connsiteX49" y="connsiteY49"/>
+              </a:cxn>
+              <a:cxn ang="0">
+                <a:pos x="connsiteX50" y="connsiteY50"/>
+              </a:cxn>
+              <a:cxn ang="0">
+                <a:pos x="connsiteX51" y="connsiteY51"/>
+              </a:cxn>
+              <a:cxn ang="0">
+                <a:pos x="connsiteX52" y="connsiteY52"/>
+              </a:cxn>
+              <a:cxn ang="0">
+                <a:pos x="connsiteX53" y="connsiteY53"/>
+              </a:cxn>
+              <a:cxn ang="0">
+                <a:pos x="connsiteX54" y="connsiteY54"/>
+              </a:cxn>
+              <a:cxn ang="0">
+                <a:pos x="connsiteX55" y="connsiteY55"/>
+              </a:cxn>
+              <a:cxn ang="0">
+                <a:pos x="connsiteX56" y="connsiteY56"/>
+              </a:cxn>
+              <a:cxn ang="0">
+                <a:pos x="connsiteX57" y="connsiteY57"/>
+              </a:cxn>
+              <a:cxn ang="0">
+                <a:pos x="connsiteX58" y="connsiteY58"/>
+              </a:cxn>
             </a:cxnLst>
             <a:rect l="l" t="t" r="r" b="b"/>
             <a:pathLst>
-              <a:path w="2835357" h="1480837">
+              <a:path w="12192000" h="6219825">
                 <a:moveTo>
-                  <a:pt x="2835357" y="1480837"/>
+                  <a:pt x="6789701" y="6151588"/>
                 </a:moveTo>
                 <a:lnTo>
-                  <a:pt x="0" y="1480837"/>
+                  <a:pt x="6788702" y="6151666"/>
+                </a:lnTo>
+                <a:cubicBezTo>
+                  <a:pt x="6788627" y="6151844"/>
+                  <a:pt x="6788551" y="6152022"/>
+                  <a:pt x="6788476" y="6152200"/>
+                </a:cubicBezTo>
+                <a:close/>
+                <a:moveTo>
+                  <a:pt x="9834" y="0"/>
+                </a:moveTo>
+                <a:lnTo>
+                  <a:pt x="12357" y="1"/>
                 </a:lnTo>
                 <a:lnTo>
-                  <a:pt x="1552727" y="0"/>
+                  <a:pt x="12192000" y="1"/>
                 </a:lnTo>
                 <a:lnTo>
-                  <a:pt x="2835357" y="1223245"/>
+                  <a:pt x="12192000" y="5105401"/>
+                </a:lnTo>
+                <a:lnTo>
+                  <a:pt x="12191716" y="5105401"/>
+                </a:lnTo>
+                <a:lnTo>
+                  <a:pt x="12192000" y="5256977"/>
+                </a:lnTo>
+                <a:lnTo>
+                  <a:pt x="12061096" y="5296034"/>
+                </a:lnTo>
+                <a:cubicBezTo>
+                  <a:pt x="11933500" y="5332263"/>
+                  <a:pt x="11805390" y="5366806"/>
+                  <a:pt x="11676800" y="5399652"/>
+                </a:cubicBezTo>
+                <a:cubicBezTo>
+                  <a:pt x="11262789" y="5507204"/>
+                  <a:pt x="10845343" y="5600846"/>
+                  <a:pt x="10425355" y="5683310"/>
+                </a:cubicBezTo>
+                <a:cubicBezTo>
+                  <a:pt x="10092810" y="5748549"/>
+                  <a:pt x="9759033" y="5806970"/>
+                  <a:pt x="9424022" y="5858546"/>
+                </a:cubicBezTo>
+                <a:cubicBezTo>
+                  <a:pt x="9102997" y="5908224"/>
+                  <a:pt x="8781133" y="5952809"/>
+                  <a:pt x="8458419" y="5992303"/>
+                </a:cubicBezTo>
+                <a:cubicBezTo>
+                  <a:pt x="8211360" y="6022481"/>
+                  <a:pt x="7963792" y="6048065"/>
+                  <a:pt x="7715970" y="6072283"/>
+                </a:cubicBezTo>
+                <a:lnTo>
+                  <a:pt x="6951716" y="6138091"/>
+                </a:lnTo>
+                <a:lnTo>
+                  <a:pt x="6936303" y="6140163"/>
+                </a:lnTo>
+                <a:lnTo>
+                  <a:pt x="6790448" y="6151529"/>
+                </a:lnTo>
+                <a:lnTo>
+                  <a:pt x="6799941" y="6153349"/>
+                </a:lnTo>
+                <a:cubicBezTo>
+                  <a:pt x="6811623" y="6153816"/>
+                  <a:pt x="6823734" y="6151642"/>
+                  <a:pt x="6835432" y="6151642"/>
+                </a:cubicBezTo>
+                <a:cubicBezTo>
+                  <a:pt x="6851580" y="6151642"/>
+                  <a:pt x="6867729" y="6149034"/>
+                  <a:pt x="6884003" y="6148662"/>
+                </a:cubicBezTo>
+                <a:cubicBezTo>
+                  <a:pt x="7115805" y="6143198"/>
+                  <a:pt x="7347351" y="6131026"/>
+                  <a:pt x="7578771" y="6116122"/>
+                </a:cubicBezTo>
+                <a:cubicBezTo>
+                  <a:pt x="7927552" y="6093644"/>
+                  <a:pt x="8276080" y="6065453"/>
+                  <a:pt x="8623845" y="6029188"/>
+                </a:cubicBezTo>
+                <a:cubicBezTo>
+                  <a:pt x="8909939" y="5999878"/>
+                  <a:pt x="9195310" y="5965228"/>
+                  <a:pt x="9479970" y="5925239"/>
+                </a:cubicBezTo>
+                <a:cubicBezTo>
+                  <a:pt x="9864901" y="5870842"/>
+                  <a:pt x="10248014" y="5806101"/>
+                  <a:pt x="10629308" y="5731000"/>
+                </a:cubicBezTo>
+                <a:cubicBezTo>
+                  <a:pt x="11090114" y="5639842"/>
+                  <a:pt x="11546975" y="5532291"/>
+                  <a:pt x="11998498" y="5404869"/>
+                </a:cubicBezTo>
+                <a:lnTo>
+                  <a:pt x="12192000" y="5347846"/>
+                </a:lnTo>
+                <a:lnTo>
+                  <a:pt x="12192000" y="5402606"/>
+                </a:lnTo>
+                <a:lnTo>
+                  <a:pt x="11829257" y="5507950"/>
+                </a:lnTo>
+                <a:cubicBezTo>
+                  <a:pt x="11534769" y="5587680"/>
+                  <a:pt x="11238120" y="5658596"/>
+                  <a:pt x="10939183" y="5722555"/>
+                </a:cubicBezTo>
+                <a:cubicBezTo>
+                  <a:pt x="10622824" y="5790365"/>
+                  <a:pt x="10304941" y="5850387"/>
+                  <a:pt x="9985530" y="5902635"/>
+                </a:cubicBezTo>
+                <a:cubicBezTo>
+                  <a:pt x="9720036" y="5946102"/>
+                  <a:pt x="9453814" y="5984764"/>
+                  <a:pt x="9186882" y="6018631"/>
+                </a:cubicBezTo>
+                <a:cubicBezTo>
+                  <a:pt x="8984197" y="6044216"/>
+                  <a:pt x="8781514" y="6068309"/>
+                  <a:pt x="8578198" y="6088179"/>
+                </a:cubicBezTo>
+                <a:lnTo>
+                  <a:pt x="7864358" y="6149656"/>
+                </a:lnTo>
+                <a:cubicBezTo>
+                  <a:pt x="7554994" y="6172009"/>
+                  <a:pt x="7245502" y="6189895"/>
+                  <a:pt x="6935502" y="6201071"/>
+                </a:cubicBezTo>
+                <a:lnTo>
+                  <a:pt x="6477750" y="6214980"/>
+                </a:lnTo>
+                <a:cubicBezTo>
+                  <a:pt x="6439195" y="6212895"/>
+                  <a:pt x="6400529" y="6214521"/>
+                  <a:pt x="6362294" y="6219825"/>
+                </a:cubicBezTo>
+                <a:lnTo>
+                  <a:pt x="6057129" y="6219825"/>
+                </a:lnTo>
+                <a:lnTo>
+                  <a:pt x="5977784" y="6215229"/>
+                </a:lnTo>
+                <a:lnTo>
+                  <a:pt x="5265087" y="6178965"/>
+                </a:lnTo>
+                <a:cubicBezTo>
+                  <a:pt x="4958267" y="6166544"/>
+                  <a:pt x="4651826" y="6146055"/>
+                  <a:pt x="4346277" y="6116869"/>
+                </a:cubicBezTo>
+                <a:lnTo>
+                  <a:pt x="3373045" y="6018259"/>
+                </a:lnTo>
+                <a:cubicBezTo>
+                  <a:pt x="3035412" y="5983982"/>
+                  <a:pt x="2698456" y="5944327"/>
+                  <a:pt x="2362173" y="5899282"/>
+                </a:cubicBezTo>
+                <a:cubicBezTo>
+                  <a:pt x="1984692" y="5849108"/>
+                  <a:pt x="1608364" y="5791358"/>
+                  <a:pt x="1233178" y="5726033"/>
+                </a:cubicBezTo>
+                <a:cubicBezTo>
+                  <a:pt x="842181" y="5657291"/>
+                  <a:pt x="453758" y="5578770"/>
+                  <a:pt x="68500" y="5486226"/>
+                </a:cubicBezTo>
+                <a:lnTo>
+                  <a:pt x="0" y="5468863"/>
+                </a:lnTo>
+                <a:lnTo>
+                  <a:pt x="0" y="5412351"/>
+                </a:lnTo>
+                <a:lnTo>
+                  <a:pt x="72441" y="5431135"/>
+                </a:lnTo>
+                <a:cubicBezTo>
+                  <a:pt x="247961" y="5473331"/>
+                  <a:pt x="424164" y="5512608"/>
+                  <a:pt x="600716" y="5549555"/>
+                </a:cubicBezTo>
+                <a:cubicBezTo>
+                  <a:pt x="988279" y="5630403"/>
+                  <a:pt x="1378133" y="5699330"/>
+                  <a:pt x="1769512" y="5759811"/>
+                </a:cubicBezTo>
+                <a:cubicBezTo>
+                  <a:pt x="2052426" y="5803406"/>
+                  <a:pt x="2335725" y="5843519"/>
+                  <a:pt x="2613554" y="5876802"/>
+                </a:cubicBezTo>
+                <a:cubicBezTo>
+                  <a:pt x="2605544" y="5879410"/>
+                  <a:pt x="2594611" y="5869350"/>
+                  <a:pt x="2581134" y="5866867"/>
+                </a:cubicBezTo>
+                <a:cubicBezTo>
+                  <a:pt x="2087178" y="5774877"/>
+                  <a:pt x="1597684" y="5663937"/>
+                  <a:pt x="1112635" y="5534031"/>
+                </a:cubicBezTo>
+                <a:cubicBezTo>
+                  <a:pt x="880453" y="5471934"/>
+                  <a:pt x="649713" y="5405428"/>
+                  <a:pt x="420412" y="5334514"/>
+                </a:cubicBezTo>
+                <a:lnTo>
+                  <a:pt x="0" y="5195539"/>
+                </a:lnTo>
+                <a:lnTo>
+                  <a:pt x="60" y="5105401"/>
+                </a:lnTo>
+                <a:lnTo>
+                  <a:pt x="0" y="5105401"/>
+                </a:lnTo>
+                <a:lnTo>
+                  <a:pt x="0" y="1"/>
+                </a:lnTo>
+                <a:lnTo>
+                  <a:pt x="9834" y="1"/>
                 </a:lnTo>
                 <a:close/>
               </a:path>
             </a:pathLst>
           </a:custGeom>
           <a:solidFill>
-            <a:schemeClr val="accent4">
-              <a:alpha val="30000"/>
-            </a:schemeClr>
+            <a:schemeClr val="bg1"/>
           </a:solidFill>
           <a:ln>
             <a:noFill/>
@@ -21176,136 +21085,6 @@
           <a:bodyPr wrap="square" rtlCol="0" anchor="ctr">
             <a:noAutofit/>
           </a:bodyPr>
-          <a:lstStyle/>
-          <a:p>
-            <a:pPr algn="ctr"/>
-            <a:endParaRPr lang="en-US" dirty="0"/>
-          </a:p>
-        </p:txBody>
-      </p:sp>
-      <p:sp>
-        <p:nvSpPr>
-          <p:cNvPr id="20" name="Isosceles Triangle 19">
-            <a:extLst>
-              <a:ext uri="{FF2B5EF4-FFF2-40B4-BE49-F238E27FC236}">
-                <a16:creationId xmlns:a16="http://schemas.microsoft.com/office/drawing/2014/main" id="{FF9F2414-84E8-453E-B1F3-389FDE8192D9}"/>
-              </a:ext>
-              <a:ext uri="{C183D7F6-B498-43B3-948B-1728B52AA6E4}">
-                <adec:decorative xmlns:adec="http://schemas.microsoft.com/office/drawing/2017/decorative" val="1"/>
-              </a:ext>
-            </a:extLst>
-          </p:cNvPr>
-          <p:cNvSpPr>
-            <a:spLocks noGrp="1" noRot="1" noChangeAspect="1" noMove="1" noResize="1" noEditPoints="1" noAdjustHandles="1" noChangeArrowheads="1" noChangeShapeType="1" noTextEdit="1"/>
-          </p:cNvSpPr>
-          <p:nvPr>
-            <p:extLst>
-              <p:ext uri="{386F3935-93C4-4BCD-93E2-E3B085C9AB24}">
-                <p16:designElem xmlns:p16="http://schemas.microsoft.com/office/powerpoint/2015/main" val="1"/>
-              </p:ext>
-            </p:extLst>
-          </p:nvPr>
-        </p:nvSpPr>
-        <p:spPr>
-          <a:xfrm flipH="1">
-            <a:off x="7976344" y="6115501"/>
-            <a:ext cx="1494513" cy="742499"/>
-          </a:xfrm>
-          <a:prstGeom prst="triangle">
-            <a:avLst/>
-          </a:prstGeom>
-          <a:solidFill>
-            <a:schemeClr val="accent1">
-              <a:alpha val="30000"/>
-            </a:schemeClr>
-          </a:solidFill>
-          <a:ln>
-            <a:noFill/>
-          </a:ln>
-        </p:spPr>
-        <p:style>
-          <a:lnRef idx="2">
-            <a:schemeClr val="accent1">
-              <a:shade val="50000"/>
-            </a:schemeClr>
-          </a:lnRef>
-          <a:fillRef idx="1">
-            <a:schemeClr val="accent1"/>
-          </a:fillRef>
-          <a:effectRef idx="0">
-            <a:schemeClr val="accent1"/>
-          </a:effectRef>
-          <a:fontRef idx="minor">
-            <a:schemeClr val="lt1"/>
-          </a:fontRef>
-        </p:style>
-        <p:txBody>
-          <a:bodyPr rtlCol="0" anchor="ctr"/>
-          <a:lstStyle/>
-          <a:p>
-            <a:pPr algn="ctr"/>
-            <a:endParaRPr lang="en-US"/>
-          </a:p>
-        </p:txBody>
-      </p:sp>
-      <p:sp>
-        <p:nvSpPr>
-          <p:cNvPr id="22" name="Isosceles Triangle 21">
-            <a:extLst>
-              <a:ext uri="{FF2B5EF4-FFF2-40B4-BE49-F238E27FC236}">
-                <a16:creationId xmlns:a16="http://schemas.microsoft.com/office/drawing/2014/main" id="{3ECA69A1-7536-43AC-85EF-C7106179F5ED}"/>
-              </a:ext>
-              <a:ext uri="{C183D7F6-B498-43B3-948B-1728B52AA6E4}">
-                <adec:decorative xmlns:adec="http://schemas.microsoft.com/office/drawing/2017/decorative" val="1"/>
-              </a:ext>
-            </a:extLst>
-          </p:cNvPr>
-          <p:cNvSpPr>
-            <a:spLocks noGrp="1" noRot="1" noChangeAspect="1" noMove="1" noResize="1" noEditPoints="1" noAdjustHandles="1" noChangeArrowheads="1" noChangeShapeType="1" noTextEdit="1"/>
-          </p:cNvSpPr>
-          <p:nvPr>
-            <p:extLst>
-              <p:ext uri="{386F3935-93C4-4BCD-93E2-E3B085C9AB24}">
-                <p16:designElem xmlns:p16="http://schemas.microsoft.com/office/powerpoint/2015/main" val="1"/>
-              </p:ext>
-            </p:extLst>
-          </p:nvPr>
-        </p:nvSpPr>
-        <p:spPr>
-          <a:xfrm flipH="1">
-            <a:off x="7604080" y="6453143"/>
-            <a:ext cx="814903" cy="404857"/>
-          </a:xfrm>
-          <a:prstGeom prst="triangle">
-            <a:avLst/>
-          </a:prstGeom>
-          <a:solidFill>
-            <a:schemeClr val="accent1">
-              <a:alpha val="30000"/>
-            </a:schemeClr>
-          </a:solidFill>
-          <a:ln>
-            <a:noFill/>
-          </a:ln>
-        </p:spPr>
-        <p:style>
-          <a:lnRef idx="2">
-            <a:schemeClr val="accent1">
-              <a:shade val="50000"/>
-            </a:schemeClr>
-          </a:lnRef>
-          <a:fillRef idx="1">
-            <a:schemeClr val="accent1"/>
-          </a:fillRef>
-          <a:effectRef idx="0">
-            <a:schemeClr val="accent1"/>
-          </a:effectRef>
-          <a:fontRef idx="minor">
-            <a:schemeClr val="lt1"/>
-          </a:fontRef>
-        </p:style>
-        <p:txBody>
-          <a:bodyPr rtlCol="0" anchor="ctr"/>
           <a:lstStyle/>
           <a:p>
             <a:pPr algn="ctr"/>
@@ -21335,8 +21114,8 @@
         </p:blipFill>
         <p:spPr>
           <a:xfrm>
-            <a:off x="4387850" y="787400"/>
-            <a:ext cx="3416300" cy="5283200"/>
+            <a:off x="4460558" y="228600"/>
+            <a:ext cx="3194684" cy="4953000"/>
           </a:xfrm>
           <a:prstGeom prst="rect">
             <a:avLst/>

</xml_diff>